<commit_message>
modified design of the use case diagram
</commit_message>
<xml_diff>
--- a/Diagram/Use case diagram.pptx
+++ b/Diagram/Use case diagram.pptx
@@ -2,7 +2,7 @@
 <file path=ppt/presentation.xml><?xml version="1.0" encoding="utf-8"?>
 <p:presentation xmlns:a="http://schemas.openxmlformats.org/drawingml/2006/main" xmlns:r="http://schemas.openxmlformats.org/officeDocument/2006/relationships" xmlns:p="http://schemas.openxmlformats.org/presentationml/2006/main" saveSubsetFonts="1">
   <p:sldMasterIdLst>
-    <p:sldMasterId id="2147483648" r:id="rId1"/>
+    <p:sldMasterId id="2147483672" r:id="rId1"/>
   </p:sldMasterIdLst>
   <p:sldIdLst>
     <p:sldId id="256" r:id="rId2"/>
@@ -13,7 +13,7 @@
     <a:defPPr>
       <a:defRPr lang="en-US"/>
     </a:defPPr>
-    <a:lvl1pPr marL="0" algn="l" defTabSz="914400" rtl="0" eaLnBrk="1" latinLnBrk="0" hangingPunct="1">
+    <a:lvl1pPr marL="0" algn="l" defTabSz="457200" rtl="0" eaLnBrk="1" latinLnBrk="0" hangingPunct="1">
       <a:defRPr sz="1800" kern="1200">
         <a:solidFill>
           <a:schemeClr val="tx1"/>
@@ -23,7 +23,7 @@
         <a:cs typeface="+mn-cs"/>
       </a:defRPr>
     </a:lvl1pPr>
-    <a:lvl2pPr marL="457200" algn="l" defTabSz="914400" rtl="0" eaLnBrk="1" latinLnBrk="0" hangingPunct="1">
+    <a:lvl2pPr marL="457200" algn="l" defTabSz="457200" rtl="0" eaLnBrk="1" latinLnBrk="0" hangingPunct="1">
       <a:defRPr sz="1800" kern="1200">
         <a:solidFill>
           <a:schemeClr val="tx1"/>
@@ -33,7 +33,7 @@
         <a:cs typeface="+mn-cs"/>
       </a:defRPr>
     </a:lvl2pPr>
-    <a:lvl3pPr marL="914400" algn="l" defTabSz="914400" rtl="0" eaLnBrk="1" latinLnBrk="0" hangingPunct="1">
+    <a:lvl3pPr marL="914400" algn="l" defTabSz="457200" rtl="0" eaLnBrk="1" latinLnBrk="0" hangingPunct="1">
       <a:defRPr sz="1800" kern="1200">
         <a:solidFill>
           <a:schemeClr val="tx1"/>
@@ -43,7 +43,7 @@
         <a:cs typeface="+mn-cs"/>
       </a:defRPr>
     </a:lvl3pPr>
-    <a:lvl4pPr marL="1371600" algn="l" defTabSz="914400" rtl="0" eaLnBrk="1" latinLnBrk="0" hangingPunct="1">
+    <a:lvl4pPr marL="1371600" algn="l" defTabSz="457200" rtl="0" eaLnBrk="1" latinLnBrk="0" hangingPunct="1">
       <a:defRPr sz="1800" kern="1200">
         <a:solidFill>
           <a:schemeClr val="tx1"/>
@@ -53,7 +53,7 @@
         <a:cs typeface="+mn-cs"/>
       </a:defRPr>
     </a:lvl4pPr>
-    <a:lvl5pPr marL="1828800" algn="l" defTabSz="914400" rtl="0" eaLnBrk="1" latinLnBrk="0" hangingPunct="1">
+    <a:lvl5pPr marL="1828800" algn="l" defTabSz="457200" rtl="0" eaLnBrk="1" latinLnBrk="0" hangingPunct="1">
       <a:defRPr sz="1800" kern="1200">
         <a:solidFill>
           <a:schemeClr val="tx1"/>
@@ -63,7 +63,7 @@
         <a:cs typeface="+mn-cs"/>
       </a:defRPr>
     </a:lvl5pPr>
-    <a:lvl6pPr marL="2286000" algn="l" defTabSz="914400" rtl="0" eaLnBrk="1" latinLnBrk="0" hangingPunct="1">
+    <a:lvl6pPr marL="2286000" algn="l" defTabSz="457200" rtl="0" eaLnBrk="1" latinLnBrk="0" hangingPunct="1">
       <a:defRPr sz="1800" kern="1200">
         <a:solidFill>
           <a:schemeClr val="tx1"/>
@@ -73,7 +73,7 @@
         <a:cs typeface="+mn-cs"/>
       </a:defRPr>
     </a:lvl6pPr>
-    <a:lvl7pPr marL="2743200" algn="l" defTabSz="914400" rtl="0" eaLnBrk="1" latinLnBrk="0" hangingPunct="1">
+    <a:lvl7pPr marL="2743200" algn="l" defTabSz="457200" rtl="0" eaLnBrk="1" latinLnBrk="0" hangingPunct="1">
       <a:defRPr sz="1800" kern="1200">
         <a:solidFill>
           <a:schemeClr val="tx1"/>
@@ -83,7 +83,7 @@
         <a:cs typeface="+mn-cs"/>
       </a:defRPr>
     </a:lvl7pPr>
-    <a:lvl8pPr marL="3200400" algn="l" defTabSz="914400" rtl="0" eaLnBrk="1" latinLnBrk="0" hangingPunct="1">
+    <a:lvl8pPr marL="3200400" algn="l" defTabSz="457200" rtl="0" eaLnBrk="1" latinLnBrk="0" hangingPunct="1">
       <a:defRPr sz="1800" kern="1200">
         <a:solidFill>
           <a:schemeClr val="tx1"/>
@@ -93,7 +93,7 @@
         <a:cs typeface="+mn-cs"/>
       </a:defRPr>
     </a:lvl8pPr>
-    <a:lvl9pPr marL="3657600" algn="l" defTabSz="914400" rtl="0" eaLnBrk="1" latinLnBrk="0" hangingPunct="1">
+    <a:lvl9pPr marL="3657600" algn="l" defTabSz="457200" rtl="0" eaLnBrk="1" latinLnBrk="0" hangingPunct="1">
       <a:defRPr sz="1800" kern="1200">
         <a:solidFill>
           <a:schemeClr val="tx1"/>
@@ -131,13 +131,7 @@
       </p:grpSpPr>
       <p:sp>
         <p:nvSpPr>
-          <p:cNvPr id="2" name="Title 1">
-            <a:extLst>
-              <a:ext uri="{FF2B5EF4-FFF2-40B4-BE49-F238E27FC236}">
-                <a16:creationId xmlns:a16="http://schemas.microsoft.com/office/drawing/2014/main" id="{7DFB275C-89D7-C3DE-547C-A49EB58825B1}"/>
-              </a:ext>
-            </a:extLst>
-          </p:cNvPr>
+          <p:cNvPr id="2" name="Title 1"/>
           <p:cNvSpPr>
             <a:spLocks noGrp="1"/>
           </p:cNvSpPr>
@@ -163,18 +157,13 @@
               <a:rPr lang="en-US"/>
               <a:t>Click to edit Master title style</a:t>
             </a:r>
-          </a:p>
-        </p:txBody>
-      </p:sp>
-      <p:sp>
-        <p:nvSpPr>
-          <p:cNvPr id="3" name="Subtitle 2">
-            <a:extLst>
-              <a:ext uri="{FF2B5EF4-FFF2-40B4-BE49-F238E27FC236}">
-                <a16:creationId xmlns:a16="http://schemas.microsoft.com/office/drawing/2014/main" id="{777048D4-36AE-141D-CAE1-893F121C1C40}"/>
-              </a:ext>
-            </a:extLst>
-          </p:cNvPr>
+            <a:endParaRPr lang="en-US" dirty="0"/>
+          </a:p>
+        </p:txBody>
+      </p:sp>
+      <p:sp>
+        <p:nvSpPr>
+          <p:cNvPr id="3" name="Subtitle 2"/>
           <p:cNvSpPr>
             <a:spLocks noGrp="1"/>
           </p:cNvSpPr>
@@ -233,18 +222,13 @@
               <a:rPr lang="en-US"/>
               <a:t>Click to edit Master subtitle style</a:t>
             </a:r>
-          </a:p>
-        </p:txBody>
-      </p:sp>
-      <p:sp>
-        <p:nvSpPr>
-          <p:cNvPr id="4" name="Date Placeholder 3">
-            <a:extLst>
-              <a:ext uri="{FF2B5EF4-FFF2-40B4-BE49-F238E27FC236}">
-                <a16:creationId xmlns:a16="http://schemas.microsoft.com/office/drawing/2014/main" id="{4BD4E1C4-546E-3A73-D81B-37C40AEB428B}"/>
-              </a:ext>
-            </a:extLst>
-          </p:cNvPr>
+            <a:endParaRPr lang="en-US" dirty="0"/>
+          </a:p>
+        </p:txBody>
+      </p:sp>
+      <p:sp>
+        <p:nvSpPr>
+          <p:cNvPr id="4" name="Date Placeholder 3"/>
           <p:cNvSpPr>
             <a:spLocks noGrp="1"/>
           </p:cNvSpPr>
@@ -267,13 +251,7 @@
       </p:sp>
       <p:sp>
         <p:nvSpPr>
-          <p:cNvPr id="5" name="Footer Placeholder 4">
-            <a:extLst>
-              <a:ext uri="{FF2B5EF4-FFF2-40B4-BE49-F238E27FC236}">
-                <a16:creationId xmlns:a16="http://schemas.microsoft.com/office/drawing/2014/main" id="{CAA1F300-FAC4-6A77-8CA2-54D03931963C}"/>
-              </a:ext>
-            </a:extLst>
-          </p:cNvPr>
+          <p:cNvPr id="5" name="Footer Placeholder 4"/>
           <p:cNvSpPr>
             <a:spLocks noGrp="1"/>
           </p:cNvSpPr>
@@ -292,13 +270,7 @@
       </p:sp>
       <p:sp>
         <p:nvSpPr>
-          <p:cNvPr id="6" name="Slide Number Placeholder 5">
-            <a:extLst>
-              <a:ext uri="{FF2B5EF4-FFF2-40B4-BE49-F238E27FC236}">
-                <a16:creationId xmlns:a16="http://schemas.microsoft.com/office/drawing/2014/main" id="{73B31C29-E852-3ADE-407E-0BFFE7C3D215}"/>
-              </a:ext>
-            </a:extLst>
-          </p:cNvPr>
+          <p:cNvPr id="6" name="Slide Number Placeholder 5"/>
           <p:cNvSpPr>
             <a:spLocks noGrp="1"/>
           </p:cNvSpPr>
@@ -313,7 +285,7 @@
           <a:p>
             <a:fld id="{351946EB-CC5B-4C7F-90DE-B507D3CE6B7D}" type="slidenum">
               <a:rPr lang="en-US" smtClean="0"/>
-              <a:t>‹N°›</a:t>
+              <a:t>‹#›</a:t>
             </a:fld>
             <a:endParaRPr lang="en-US"/>
           </a:p>
@@ -322,7 +294,7 @@
     </p:spTree>
     <p:extLst>
       <p:ext uri="{BB962C8B-B14F-4D97-AF65-F5344CB8AC3E}">
-        <p14:creationId xmlns:p14="http://schemas.microsoft.com/office/powerpoint/2010/main" val="1826755494"/>
+        <p14:creationId xmlns:p14="http://schemas.microsoft.com/office/powerpoint/2010/main" val="3377562319"/>
       </p:ext>
     </p:extLst>
   </p:cSld>
@@ -351,13 +323,7 @@
       </p:grpSpPr>
       <p:sp>
         <p:nvSpPr>
-          <p:cNvPr id="2" name="Title 1">
-            <a:extLst>
-              <a:ext uri="{FF2B5EF4-FFF2-40B4-BE49-F238E27FC236}">
-                <a16:creationId xmlns:a16="http://schemas.microsoft.com/office/drawing/2014/main" id="{A2A04B86-84E3-38B9-8D90-FDC8B7C1F675}"/>
-              </a:ext>
-            </a:extLst>
-          </p:cNvPr>
+          <p:cNvPr id="2" name="Title 1"/>
           <p:cNvSpPr>
             <a:spLocks noGrp="1"/>
           </p:cNvSpPr>
@@ -374,18 +340,13 @@
               <a:rPr lang="en-US"/>
               <a:t>Click to edit Master title style</a:t>
             </a:r>
-          </a:p>
-        </p:txBody>
-      </p:sp>
-      <p:sp>
-        <p:nvSpPr>
-          <p:cNvPr id="3" name="Vertical Text Placeholder 2">
-            <a:extLst>
-              <a:ext uri="{FF2B5EF4-FFF2-40B4-BE49-F238E27FC236}">
-                <a16:creationId xmlns:a16="http://schemas.microsoft.com/office/drawing/2014/main" id="{67884F93-3183-32B0-8A79-A75DAF933544}"/>
-              </a:ext>
-            </a:extLst>
-          </p:cNvPr>
+            <a:endParaRPr lang="en-US" dirty="0"/>
+          </a:p>
+        </p:txBody>
+      </p:sp>
+      <p:sp>
+        <p:nvSpPr>
+          <p:cNvPr id="3" name="Vertical Text Placeholder 2"/>
           <p:cNvSpPr>
             <a:spLocks noGrp="1"/>
           </p:cNvSpPr>
@@ -431,18 +392,13 @@
               <a:rPr lang="en-US"/>
               <a:t>Fifth level</a:t>
             </a:r>
-          </a:p>
-        </p:txBody>
-      </p:sp>
-      <p:sp>
-        <p:nvSpPr>
-          <p:cNvPr id="4" name="Date Placeholder 3">
-            <a:extLst>
-              <a:ext uri="{FF2B5EF4-FFF2-40B4-BE49-F238E27FC236}">
-                <a16:creationId xmlns:a16="http://schemas.microsoft.com/office/drawing/2014/main" id="{B6EFD6C1-A981-AF77-DC83-83D86FB512AC}"/>
-              </a:ext>
-            </a:extLst>
-          </p:cNvPr>
+            <a:endParaRPr lang="en-US" dirty="0"/>
+          </a:p>
+        </p:txBody>
+      </p:sp>
+      <p:sp>
+        <p:nvSpPr>
+          <p:cNvPr id="4" name="Date Placeholder 3"/>
           <p:cNvSpPr>
             <a:spLocks noGrp="1"/>
           </p:cNvSpPr>
@@ -465,13 +421,7 @@
       </p:sp>
       <p:sp>
         <p:nvSpPr>
-          <p:cNvPr id="5" name="Footer Placeholder 4">
-            <a:extLst>
-              <a:ext uri="{FF2B5EF4-FFF2-40B4-BE49-F238E27FC236}">
-                <a16:creationId xmlns:a16="http://schemas.microsoft.com/office/drawing/2014/main" id="{644CA10B-C8FB-7313-5833-C9D9D0066AB2}"/>
-              </a:ext>
-            </a:extLst>
-          </p:cNvPr>
+          <p:cNvPr id="5" name="Footer Placeholder 4"/>
           <p:cNvSpPr>
             <a:spLocks noGrp="1"/>
           </p:cNvSpPr>
@@ -490,13 +440,7 @@
       </p:sp>
       <p:sp>
         <p:nvSpPr>
-          <p:cNvPr id="6" name="Slide Number Placeholder 5">
-            <a:extLst>
-              <a:ext uri="{FF2B5EF4-FFF2-40B4-BE49-F238E27FC236}">
-                <a16:creationId xmlns:a16="http://schemas.microsoft.com/office/drawing/2014/main" id="{9444848E-2BBC-830C-6BBC-8D0203155875}"/>
-              </a:ext>
-            </a:extLst>
-          </p:cNvPr>
+          <p:cNvPr id="6" name="Slide Number Placeholder 5"/>
           <p:cNvSpPr>
             <a:spLocks noGrp="1"/>
           </p:cNvSpPr>
@@ -511,7 +455,7 @@
           <a:p>
             <a:fld id="{351946EB-CC5B-4C7F-90DE-B507D3CE6B7D}" type="slidenum">
               <a:rPr lang="en-US" smtClean="0"/>
-              <a:t>‹N°›</a:t>
+              <a:t>‹#›</a:t>
             </a:fld>
             <a:endParaRPr lang="en-US"/>
           </a:p>
@@ -520,7 +464,7 @@
     </p:spTree>
     <p:extLst>
       <p:ext uri="{BB962C8B-B14F-4D97-AF65-F5344CB8AC3E}">
-        <p14:creationId xmlns:p14="http://schemas.microsoft.com/office/powerpoint/2010/main" val="140208257"/>
+        <p14:creationId xmlns:p14="http://schemas.microsoft.com/office/powerpoint/2010/main" val="4166580324"/>
       </p:ext>
     </p:extLst>
   </p:cSld>
@@ -549,13 +493,7 @@
       </p:grpSpPr>
       <p:sp>
         <p:nvSpPr>
-          <p:cNvPr id="2" name="Vertical Title 1">
-            <a:extLst>
-              <a:ext uri="{FF2B5EF4-FFF2-40B4-BE49-F238E27FC236}">
-                <a16:creationId xmlns:a16="http://schemas.microsoft.com/office/drawing/2014/main" id="{A9571457-F2D5-0B99-04EE-71FD5B6AB40F}"/>
-              </a:ext>
-            </a:extLst>
-          </p:cNvPr>
+          <p:cNvPr id="2" name="Vertical Title 1"/>
           <p:cNvSpPr>
             <a:spLocks noGrp="1"/>
           </p:cNvSpPr>
@@ -577,18 +515,13 @@
               <a:rPr lang="en-US"/>
               <a:t>Click to edit Master title style</a:t>
             </a:r>
-          </a:p>
-        </p:txBody>
-      </p:sp>
-      <p:sp>
-        <p:nvSpPr>
-          <p:cNvPr id="3" name="Vertical Text Placeholder 2">
-            <a:extLst>
-              <a:ext uri="{FF2B5EF4-FFF2-40B4-BE49-F238E27FC236}">
-                <a16:creationId xmlns:a16="http://schemas.microsoft.com/office/drawing/2014/main" id="{A6C4041D-22FA-6E18-E6B1-3AD88363D0D2}"/>
-              </a:ext>
-            </a:extLst>
-          </p:cNvPr>
+            <a:endParaRPr lang="en-US" dirty="0"/>
+          </a:p>
+        </p:txBody>
+      </p:sp>
+      <p:sp>
+        <p:nvSpPr>
+          <p:cNvPr id="3" name="Vertical Text Placeholder 2"/>
           <p:cNvSpPr>
             <a:spLocks noGrp="1"/>
           </p:cNvSpPr>
@@ -639,18 +572,13 @@
               <a:rPr lang="en-US"/>
               <a:t>Fifth level</a:t>
             </a:r>
-          </a:p>
-        </p:txBody>
-      </p:sp>
-      <p:sp>
-        <p:nvSpPr>
-          <p:cNvPr id="4" name="Date Placeholder 3">
-            <a:extLst>
-              <a:ext uri="{FF2B5EF4-FFF2-40B4-BE49-F238E27FC236}">
-                <a16:creationId xmlns:a16="http://schemas.microsoft.com/office/drawing/2014/main" id="{AC86768E-B485-C5D5-53B4-44F75F6A29B3}"/>
-              </a:ext>
-            </a:extLst>
-          </p:cNvPr>
+            <a:endParaRPr lang="en-US" dirty="0"/>
+          </a:p>
+        </p:txBody>
+      </p:sp>
+      <p:sp>
+        <p:nvSpPr>
+          <p:cNvPr id="4" name="Date Placeholder 3"/>
           <p:cNvSpPr>
             <a:spLocks noGrp="1"/>
           </p:cNvSpPr>
@@ -673,13 +601,7 @@
       </p:sp>
       <p:sp>
         <p:nvSpPr>
-          <p:cNvPr id="5" name="Footer Placeholder 4">
-            <a:extLst>
-              <a:ext uri="{FF2B5EF4-FFF2-40B4-BE49-F238E27FC236}">
-                <a16:creationId xmlns:a16="http://schemas.microsoft.com/office/drawing/2014/main" id="{037EA320-0FEF-73C3-F239-67F854E3E106}"/>
-              </a:ext>
-            </a:extLst>
-          </p:cNvPr>
+          <p:cNvPr id="5" name="Footer Placeholder 4"/>
           <p:cNvSpPr>
             <a:spLocks noGrp="1"/>
           </p:cNvSpPr>
@@ -698,13 +620,7 @@
       </p:sp>
       <p:sp>
         <p:nvSpPr>
-          <p:cNvPr id="6" name="Slide Number Placeholder 5">
-            <a:extLst>
-              <a:ext uri="{FF2B5EF4-FFF2-40B4-BE49-F238E27FC236}">
-                <a16:creationId xmlns:a16="http://schemas.microsoft.com/office/drawing/2014/main" id="{53B8A862-A251-4BF1-5937-082D6F25CCBD}"/>
-              </a:ext>
-            </a:extLst>
-          </p:cNvPr>
+          <p:cNvPr id="6" name="Slide Number Placeholder 5"/>
           <p:cNvSpPr>
             <a:spLocks noGrp="1"/>
           </p:cNvSpPr>
@@ -719,7 +635,7 @@
           <a:p>
             <a:fld id="{351946EB-CC5B-4C7F-90DE-B507D3CE6B7D}" type="slidenum">
               <a:rPr lang="en-US" smtClean="0"/>
-              <a:t>‹N°›</a:t>
+              <a:t>‹#›</a:t>
             </a:fld>
             <a:endParaRPr lang="en-US"/>
           </a:p>
@@ -728,7 +644,7 @@
     </p:spTree>
     <p:extLst>
       <p:ext uri="{BB962C8B-B14F-4D97-AF65-F5344CB8AC3E}">
-        <p14:creationId xmlns:p14="http://schemas.microsoft.com/office/powerpoint/2010/main" val="208554482"/>
+        <p14:creationId xmlns:p14="http://schemas.microsoft.com/office/powerpoint/2010/main" val="1571031655"/>
       </p:ext>
     </p:extLst>
   </p:cSld>
@@ -757,13 +673,7 @@
       </p:grpSpPr>
       <p:sp>
         <p:nvSpPr>
-          <p:cNvPr id="2" name="Title 1">
-            <a:extLst>
-              <a:ext uri="{FF2B5EF4-FFF2-40B4-BE49-F238E27FC236}">
-                <a16:creationId xmlns:a16="http://schemas.microsoft.com/office/drawing/2014/main" id="{66789D2A-A64C-4FC5-3549-9C7350CC5FB2}"/>
-              </a:ext>
-            </a:extLst>
-          </p:cNvPr>
+          <p:cNvPr id="2" name="Title 1"/>
           <p:cNvSpPr>
             <a:spLocks noGrp="1"/>
           </p:cNvSpPr>
@@ -780,18 +690,13 @@
               <a:rPr lang="en-US"/>
               <a:t>Click to edit Master title style</a:t>
             </a:r>
-          </a:p>
-        </p:txBody>
-      </p:sp>
-      <p:sp>
-        <p:nvSpPr>
-          <p:cNvPr id="3" name="Content Placeholder 2">
-            <a:extLst>
-              <a:ext uri="{FF2B5EF4-FFF2-40B4-BE49-F238E27FC236}">
-                <a16:creationId xmlns:a16="http://schemas.microsoft.com/office/drawing/2014/main" id="{02CC7430-DEE2-E65D-53F2-3D337380101A}"/>
-              </a:ext>
-            </a:extLst>
-          </p:cNvPr>
+            <a:endParaRPr lang="en-US" dirty="0"/>
+          </a:p>
+        </p:txBody>
+      </p:sp>
+      <p:sp>
+        <p:nvSpPr>
+          <p:cNvPr id="3" name="Content Placeholder 2"/>
           <p:cNvSpPr>
             <a:spLocks noGrp="1"/>
           </p:cNvSpPr>
@@ -837,18 +742,13 @@
               <a:rPr lang="en-US"/>
               <a:t>Fifth level</a:t>
             </a:r>
-          </a:p>
-        </p:txBody>
-      </p:sp>
-      <p:sp>
-        <p:nvSpPr>
-          <p:cNvPr id="4" name="Date Placeholder 3">
-            <a:extLst>
-              <a:ext uri="{FF2B5EF4-FFF2-40B4-BE49-F238E27FC236}">
-                <a16:creationId xmlns:a16="http://schemas.microsoft.com/office/drawing/2014/main" id="{A6D0E22F-4022-456B-1621-4907C1D8797B}"/>
-              </a:ext>
-            </a:extLst>
-          </p:cNvPr>
+            <a:endParaRPr lang="en-US" dirty="0"/>
+          </a:p>
+        </p:txBody>
+      </p:sp>
+      <p:sp>
+        <p:nvSpPr>
+          <p:cNvPr id="4" name="Date Placeholder 3"/>
           <p:cNvSpPr>
             <a:spLocks noGrp="1"/>
           </p:cNvSpPr>
@@ -871,13 +771,7 @@
       </p:sp>
       <p:sp>
         <p:nvSpPr>
-          <p:cNvPr id="5" name="Footer Placeholder 4">
-            <a:extLst>
-              <a:ext uri="{FF2B5EF4-FFF2-40B4-BE49-F238E27FC236}">
-                <a16:creationId xmlns:a16="http://schemas.microsoft.com/office/drawing/2014/main" id="{C98BB694-29BB-4D72-9A90-15BDD74CCF78}"/>
-              </a:ext>
-            </a:extLst>
-          </p:cNvPr>
+          <p:cNvPr id="5" name="Footer Placeholder 4"/>
           <p:cNvSpPr>
             <a:spLocks noGrp="1"/>
           </p:cNvSpPr>
@@ -896,13 +790,7 @@
       </p:sp>
       <p:sp>
         <p:nvSpPr>
-          <p:cNvPr id="6" name="Slide Number Placeholder 5">
-            <a:extLst>
-              <a:ext uri="{FF2B5EF4-FFF2-40B4-BE49-F238E27FC236}">
-                <a16:creationId xmlns:a16="http://schemas.microsoft.com/office/drawing/2014/main" id="{7FBF1445-3E2E-B1F8-DC0B-DAC5F8E88EF2}"/>
-              </a:ext>
-            </a:extLst>
-          </p:cNvPr>
+          <p:cNvPr id="6" name="Slide Number Placeholder 5"/>
           <p:cNvSpPr>
             <a:spLocks noGrp="1"/>
           </p:cNvSpPr>
@@ -917,7 +805,7 @@
           <a:p>
             <a:fld id="{351946EB-CC5B-4C7F-90DE-B507D3CE6B7D}" type="slidenum">
               <a:rPr lang="en-US" smtClean="0"/>
-              <a:t>‹N°›</a:t>
+              <a:t>‹#›</a:t>
             </a:fld>
             <a:endParaRPr lang="en-US"/>
           </a:p>
@@ -926,7 +814,7 @@
     </p:spTree>
     <p:extLst>
       <p:ext uri="{BB962C8B-B14F-4D97-AF65-F5344CB8AC3E}">
-        <p14:creationId xmlns:p14="http://schemas.microsoft.com/office/powerpoint/2010/main" val="3000643775"/>
+        <p14:creationId xmlns:p14="http://schemas.microsoft.com/office/powerpoint/2010/main" val="2735273484"/>
       </p:ext>
     </p:extLst>
   </p:cSld>
@@ -955,13 +843,7 @@
       </p:grpSpPr>
       <p:sp>
         <p:nvSpPr>
-          <p:cNvPr id="2" name="Title 1">
-            <a:extLst>
-              <a:ext uri="{FF2B5EF4-FFF2-40B4-BE49-F238E27FC236}">
-                <a16:creationId xmlns:a16="http://schemas.microsoft.com/office/drawing/2014/main" id="{2DDE53F2-D444-638E-3ABD-5DACC2F59679}"/>
-              </a:ext>
-            </a:extLst>
-          </p:cNvPr>
+          <p:cNvPr id="2" name="Title 1"/>
           <p:cNvSpPr>
             <a:spLocks noGrp="1"/>
           </p:cNvSpPr>
@@ -987,18 +869,13 @@
               <a:rPr lang="en-US"/>
               <a:t>Click to edit Master title style</a:t>
             </a:r>
-          </a:p>
-        </p:txBody>
-      </p:sp>
-      <p:sp>
-        <p:nvSpPr>
-          <p:cNvPr id="3" name="Text Placeholder 2">
-            <a:extLst>
-              <a:ext uri="{FF2B5EF4-FFF2-40B4-BE49-F238E27FC236}">
-                <a16:creationId xmlns:a16="http://schemas.microsoft.com/office/drawing/2014/main" id="{5722578E-C15A-3BDA-7FD4-0D78227BE4F4}"/>
-              </a:ext>
-            </a:extLst>
-          </p:cNvPr>
+            <a:endParaRPr lang="en-US" dirty="0"/>
+          </a:p>
+        </p:txBody>
+      </p:sp>
+      <p:sp>
+        <p:nvSpPr>
+          <p:cNvPr id="3" name="Text Placeholder 2"/>
           <p:cNvSpPr>
             <a:spLocks noGrp="1"/>
           </p:cNvSpPr>
@@ -1117,13 +994,7 @@
       </p:sp>
       <p:sp>
         <p:nvSpPr>
-          <p:cNvPr id="4" name="Date Placeholder 3">
-            <a:extLst>
-              <a:ext uri="{FF2B5EF4-FFF2-40B4-BE49-F238E27FC236}">
-                <a16:creationId xmlns:a16="http://schemas.microsoft.com/office/drawing/2014/main" id="{E7E43BEE-2A92-60DB-AA5B-10F050EFB3A0}"/>
-              </a:ext>
-            </a:extLst>
-          </p:cNvPr>
+          <p:cNvPr id="4" name="Date Placeholder 3"/>
           <p:cNvSpPr>
             <a:spLocks noGrp="1"/>
           </p:cNvSpPr>
@@ -1146,13 +1017,7 @@
       </p:sp>
       <p:sp>
         <p:nvSpPr>
-          <p:cNvPr id="5" name="Footer Placeholder 4">
-            <a:extLst>
-              <a:ext uri="{FF2B5EF4-FFF2-40B4-BE49-F238E27FC236}">
-                <a16:creationId xmlns:a16="http://schemas.microsoft.com/office/drawing/2014/main" id="{5DBAED2E-B896-E872-6F7D-9CF29D66862C}"/>
-              </a:ext>
-            </a:extLst>
-          </p:cNvPr>
+          <p:cNvPr id="5" name="Footer Placeholder 4"/>
           <p:cNvSpPr>
             <a:spLocks noGrp="1"/>
           </p:cNvSpPr>
@@ -1171,13 +1036,7 @@
       </p:sp>
       <p:sp>
         <p:nvSpPr>
-          <p:cNvPr id="6" name="Slide Number Placeholder 5">
-            <a:extLst>
-              <a:ext uri="{FF2B5EF4-FFF2-40B4-BE49-F238E27FC236}">
-                <a16:creationId xmlns:a16="http://schemas.microsoft.com/office/drawing/2014/main" id="{6C516134-EDEF-E0BA-FB7C-66D6817E2FE3}"/>
-              </a:ext>
-            </a:extLst>
-          </p:cNvPr>
+          <p:cNvPr id="6" name="Slide Number Placeholder 5"/>
           <p:cNvSpPr>
             <a:spLocks noGrp="1"/>
           </p:cNvSpPr>
@@ -1192,7 +1051,7 @@
           <a:p>
             <a:fld id="{351946EB-CC5B-4C7F-90DE-B507D3CE6B7D}" type="slidenum">
               <a:rPr lang="en-US" smtClean="0"/>
-              <a:t>‹N°›</a:t>
+              <a:t>‹#›</a:t>
             </a:fld>
             <a:endParaRPr lang="en-US"/>
           </a:p>
@@ -1201,7 +1060,7 @@
     </p:spTree>
     <p:extLst>
       <p:ext uri="{BB962C8B-B14F-4D97-AF65-F5344CB8AC3E}">
-        <p14:creationId xmlns:p14="http://schemas.microsoft.com/office/powerpoint/2010/main" val="2590111465"/>
+        <p14:creationId xmlns:p14="http://schemas.microsoft.com/office/powerpoint/2010/main" val="1162722684"/>
       </p:ext>
     </p:extLst>
   </p:cSld>
@@ -1230,13 +1089,7 @@
       </p:grpSpPr>
       <p:sp>
         <p:nvSpPr>
-          <p:cNvPr id="2" name="Title 1">
-            <a:extLst>
-              <a:ext uri="{FF2B5EF4-FFF2-40B4-BE49-F238E27FC236}">
-                <a16:creationId xmlns:a16="http://schemas.microsoft.com/office/drawing/2014/main" id="{FCC90388-52E9-FA90-8543-71FF1DE89C7F}"/>
-              </a:ext>
-            </a:extLst>
-          </p:cNvPr>
+          <p:cNvPr id="2" name="Title 1"/>
           <p:cNvSpPr>
             <a:spLocks noGrp="1"/>
           </p:cNvSpPr>
@@ -1253,18 +1106,13 @@
               <a:rPr lang="en-US"/>
               <a:t>Click to edit Master title style</a:t>
             </a:r>
-          </a:p>
-        </p:txBody>
-      </p:sp>
-      <p:sp>
-        <p:nvSpPr>
-          <p:cNvPr id="3" name="Content Placeholder 2">
-            <a:extLst>
-              <a:ext uri="{FF2B5EF4-FFF2-40B4-BE49-F238E27FC236}">
-                <a16:creationId xmlns:a16="http://schemas.microsoft.com/office/drawing/2014/main" id="{9ECE938B-13AC-EF14-1192-6190AF257401}"/>
-              </a:ext>
-            </a:extLst>
-          </p:cNvPr>
+            <a:endParaRPr lang="en-US" dirty="0"/>
+          </a:p>
+        </p:txBody>
+      </p:sp>
+      <p:sp>
+        <p:nvSpPr>
+          <p:cNvPr id="3" name="Content Placeholder 2"/>
           <p:cNvSpPr>
             <a:spLocks noGrp="1"/>
           </p:cNvSpPr>
@@ -1315,18 +1163,13 @@
               <a:rPr lang="en-US"/>
               <a:t>Fifth level</a:t>
             </a:r>
-          </a:p>
-        </p:txBody>
-      </p:sp>
-      <p:sp>
-        <p:nvSpPr>
-          <p:cNvPr id="4" name="Content Placeholder 3">
-            <a:extLst>
-              <a:ext uri="{FF2B5EF4-FFF2-40B4-BE49-F238E27FC236}">
-                <a16:creationId xmlns:a16="http://schemas.microsoft.com/office/drawing/2014/main" id="{590FD74E-65B6-01AC-033C-357C71620F29}"/>
-              </a:ext>
-            </a:extLst>
-          </p:cNvPr>
+            <a:endParaRPr lang="en-US" dirty="0"/>
+          </a:p>
+        </p:txBody>
+      </p:sp>
+      <p:sp>
+        <p:nvSpPr>
+          <p:cNvPr id="4" name="Content Placeholder 3"/>
           <p:cNvSpPr>
             <a:spLocks noGrp="1"/>
           </p:cNvSpPr>
@@ -1377,18 +1220,13 @@
               <a:rPr lang="en-US"/>
               <a:t>Fifth level</a:t>
             </a:r>
-          </a:p>
-        </p:txBody>
-      </p:sp>
-      <p:sp>
-        <p:nvSpPr>
-          <p:cNvPr id="5" name="Date Placeholder 4">
-            <a:extLst>
-              <a:ext uri="{FF2B5EF4-FFF2-40B4-BE49-F238E27FC236}">
-                <a16:creationId xmlns:a16="http://schemas.microsoft.com/office/drawing/2014/main" id="{2D7957BC-6843-B562-5489-EE4DF18AF7AD}"/>
-              </a:ext>
-            </a:extLst>
-          </p:cNvPr>
+            <a:endParaRPr lang="en-US" dirty="0"/>
+          </a:p>
+        </p:txBody>
+      </p:sp>
+      <p:sp>
+        <p:nvSpPr>
+          <p:cNvPr id="5" name="Date Placeholder 4"/>
           <p:cNvSpPr>
             <a:spLocks noGrp="1"/>
           </p:cNvSpPr>
@@ -1411,13 +1249,7 @@
       </p:sp>
       <p:sp>
         <p:nvSpPr>
-          <p:cNvPr id="6" name="Footer Placeholder 5">
-            <a:extLst>
-              <a:ext uri="{FF2B5EF4-FFF2-40B4-BE49-F238E27FC236}">
-                <a16:creationId xmlns:a16="http://schemas.microsoft.com/office/drawing/2014/main" id="{ED3F250A-2AA5-987E-5764-8C9DD5E81533}"/>
-              </a:ext>
-            </a:extLst>
-          </p:cNvPr>
+          <p:cNvPr id="6" name="Footer Placeholder 5"/>
           <p:cNvSpPr>
             <a:spLocks noGrp="1"/>
           </p:cNvSpPr>
@@ -1436,13 +1268,7 @@
       </p:sp>
       <p:sp>
         <p:nvSpPr>
-          <p:cNvPr id="7" name="Slide Number Placeholder 6">
-            <a:extLst>
-              <a:ext uri="{FF2B5EF4-FFF2-40B4-BE49-F238E27FC236}">
-                <a16:creationId xmlns:a16="http://schemas.microsoft.com/office/drawing/2014/main" id="{6DC69D7B-5BA1-65A3-D74B-B25663F784C6}"/>
-              </a:ext>
-            </a:extLst>
-          </p:cNvPr>
+          <p:cNvPr id="7" name="Slide Number Placeholder 6"/>
           <p:cNvSpPr>
             <a:spLocks noGrp="1"/>
           </p:cNvSpPr>
@@ -1457,7 +1283,7 @@
           <a:p>
             <a:fld id="{351946EB-CC5B-4C7F-90DE-B507D3CE6B7D}" type="slidenum">
               <a:rPr lang="en-US" smtClean="0"/>
-              <a:t>‹N°›</a:t>
+              <a:t>‹#›</a:t>
             </a:fld>
             <a:endParaRPr lang="en-US"/>
           </a:p>
@@ -1466,7 +1292,7 @@
     </p:spTree>
     <p:extLst>
       <p:ext uri="{BB962C8B-B14F-4D97-AF65-F5344CB8AC3E}">
-        <p14:creationId xmlns:p14="http://schemas.microsoft.com/office/powerpoint/2010/main" val="1533156186"/>
+        <p14:creationId xmlns:p14="http://schemas.microsoft.com/office/powerpoint/2010/main" val="1712520050"/>
       </p:ext>
     </p:extLst>
   </p:cSld>
@@ -1495,13 +1321,7 @@
       </p:grpSpPr>
       <p:sp>
         <p:nvSpPr>
-          <p:cNvPr id="2" name="Title 1">
-            <a:extLst>
-              <a:ext uri="{FF2B5EF4-FFF2-40B4-BE49-F238E27FC236}">
-                <a16:creationId xmlns:a16="http://schemas.microsoft.com/office/drawing/2014/main" id="{6959EB6A-0569-2BA9-61A2-0E04792F90C3}"/>
-              </a:ext>
-            </a:extLst>
-          </p:cNvPr>
+          <p:cNvPr id="2" name="Title 1"/>
           <p:cNvSpPr>
             <a:spLocks noGrp="1"/>
           </p:cNvSpPr>
@@ -1523,18 +1343,13 @@
               <a:rPr lang="en-US"/>
               <a:t>Click to edit Master title style</a:t>
             </a:r>
-          </a:p>
-        </p:txBody>
-      </p:sp>
-      <p:sp>
-        <p:nvSpPr>
-          <p:cNvPr id="3" name="Text Placeholder 2">
-            <a:extLst>
-              <a:ext uri="{FF2B5EF4-FFF2-40B4-BE49-F238E27FC236}">
-                <a16:creationId xmlns:a16="http://schemas.microsoft.com/office/drawing/2014/main" id="{D8E9CFA3-18FE-C108-B670-141B8E5392F9}"/>
-              </a:ext>
-            </a:extLst>
-          </p:cNvPr>
+            <a:endParaRPr lang="en-US" dirty="0"/>
+          </a:p>
+        </p:txBody>
+      </p:sp>
+      <p:sp>
+        <p:nvSpPr>
+          <p:cNvPr id="3" name="Text Placeholder 2"/>
           <p:cNvSpPr>
             <a:spLocks noGrp="1"/>
           </p:cNvSpPr>
@@ -1599,13 +1414,7 @@
       </p:sp>
       <p:sp>
         <p:nvSpPr>
-          <p:cNvPr id="4" name="Content Placeholder 3">
-            <a:extLst>
-              <a:ext uri="{FF2B5EF4-FFF2-40B4-BE49-F238E27FC236}">
-                <a16:creationId xmlns:a16="http://schemas.microsoft.com/office/drawing/2014/main" id="{6221F4EA-4900-C2F6-4617-7A0440C90828}"/>
-              </a:ext>
-            </a:extLst>
-          </p:cNvPr>
+          <p:cNvPr id="4" name="Content Placeholder 3"/>
           <p:cNvSpPr>
             <a:spLocks noGrp="1"/>
           </p:cNvSpPr>
@@ -1656,18 +1465,13 @@
               <a:rPr lang="en-US"/>
               <a:t>Fifth level</a:t>
             </a:r>
-          </a:p>
-        </p:txBody>
-      </p:sp>
-      <p:sp>
-        <p:nvSpPr>
-          <p:cNvPr id="5" name="Text Placeholder 4">
-            <a:extLst>
-              <a:ext uri="{FF2B5EF4-FFF2-40B4-BE49-F238E27FC236}">
-                <a16:creationId xmlns:a16="http://schemas.microsoft.com/office/drawing/2014/main" id="{A8E86059-FAF3-9153-C2BB-1360A51D7A33}"/>
-              </a:ext>
-            </a:extLst>
-          </p:cNvPr>
+            <a:endParaRPr lang="en-US" dirty="0"/>
+          </a:p>
+        </p:txBody>
+      </p:sp>
+      <p:sp>
+        <p:nvSpPr>
+          <p:cNvPr id="5" name="Text Placeholder 4"/>
           <p:cNvSpPr>
             <a:spLocks noGrp="1"/>
           </p:cNvSpPr>
@@ -1732,13 +1536,7 @@
       </p:sp>
       <p:sp>
         <p:nvSpPr>
-          <p:cNvPr id="6" name="Content Placeholder 5">
-            <a:extLst>
-              <a:ext uri="{FF2B5EF4-FFF2-40B4-BE49-F238E27FC236}">
-                <a16:creationId xmlns:a16="http://schemas.microsoft.com/office/drawing/2014/main" id="{8786DD14-77D3-8886-7CA7-A76EB9C88FF3}"/>
-              </a:ext>
-            </a:extLst>
-          </p:cNvPr>
+          <p:cNvPr id="6" name="Content Placeholder 5"/>
           <p:cNvSpPr>
             <a:spLocks noGrp="1"/>
           </p:cNvSpPr>
@@ -1789,18 +1587,13 @@
               <a:rPr lang="en-US"/>
               <a:t>Fifth level</a:t>
             </a:r>
-          </a:p>
-        </p:txBody>
-      </p:sp>
-      <p:sp>
-        <p:nvSpPr>
-          <p:cNvPr id="7" name="Date Placeholder 6">
-            <a:extLst>
-              <a:ext uri="{FF2B5EF4-FFF2-40B4-BE49-F238E27FC236}">
-                <a16:creationId xmlns:a16="http://schemas.microsoft.com/office/drawing/2014/main" id="{CDCAC33C-E7ED-C7EF-1A5D-EDA4A61694EF}"/>
-              </a:ext>
-            </a:extLst>
-          </p:cNvPr>
+            <a:endParaRPr lang="en-US" dirty="0"/>
+          </a:p>
+        </p:txBody>
+      </p:sp>
+      <p:sp>
+        <p:nvSpPr>
+          <p:cNvPr id="7" name="Date Placeholder 6"/>
           <p:cNvSpPr>
             <a:spLocks noGrp="1"/>
           </p:cNvSpPr>
@@ -1823,13 +1616,7 @@
       </p:sp>
       <p:sp>
         <p:nvSpPr>
-          <p:cNvPr id="8" name="Footer Placeholder 7">
-            <a:extLst>
-              <a:ext uri="{FF2B5EF4-FFF2-40B4-BE49-F238E27FC236}">
-                <a16:creationId xmlns:a16="http://schemas.microsoft.com/office/drawing/2014/main" id="{762A2BEC-8B77-E604-5F6D-E756BEF4A1A1}"/>
-              </a:ext>
-            </a:extLst>
-          </p:cNvPr>
+          <p:cNvPr id="8" name="Footer Placeholder 7"/>
           <p:cNvSpPr>
             <a:spLocks noGrp="1"/>
           </p:cNvSpPr>
@@ -1848,13 +1635,7 @@
       </p:sp>
       <p:sp>
         <p:nvSpPr>
-          <p:cNvPr id="9" name="Slide Number Placeholder 8">
-            <a:extLst>
-              <a:ext uri="{FF2B5EF4-FFF2-40B4-BE49-F238E27FC236}">
-                <a16:creationId xmlns:a16="http://schemas.microsoft.com/office/drawing/2014/main" id="{680A824C-95DA-C08D-E501-AB58ADDEB6FB}"/>
-              </a:ext>
-            </a:extLst>
-          </p:cNvPr>
+          <p:cNvPr id="9" name="Slide Number Placeholder 8"/>
           <p:cNvSpPr>
             <a:spLocks noGrp="1"/>
           </p:cNvSpPr>
@@ -1869,7 +1650,7 @@
           <a:p>
             <a:fld id="{351946EB-CC5B-4C7F-90DE-B507D3CE6B7D}" type="slidenum">
               <a:rPr lang="en-US" smtClean="0"/>
-              <a:t>‹N°›</a:t>
+              <a:t>‹#›</a:t>
             </a:fld>
             <a:endParaRPr lang="en-US"/>
           </a:p>
@@ -1878,7 +1659,7 @@
     </p:spTree>
     <p:extLst>
       <p:ext uri="{BB962C8B-B14F-4D97-AF65-F5344CB8AC3E}">
-        <p14:creationId xmlns:p14="http://schemas.microsoft.com/office/powerpoint/2010/main" val="3931613041"/>
+        <p14:creationId xmlns:p14="http://schemas.microsoft.com/office/powerpoint/2010/main" val="1102588852"/>
       </p:ext>
     </p:extLst>
   </p:cSld>
@@ -1907,13 +1688,7 @@
       </p:grpSpPr>
       <p:sp>
         <p:nvSpPr>
-          <p:cNvPr id="2" name="Title 1">
-            <a:extLst>
-              <a:ext uri="{FF2B5EF4-FFF2-40B4-BE49-F238E27FC236}">
-                <a16:creationId xmlns:a16="http://schemas.microsoft.com/office/drawing/2014/main" id="{70988210-380F-83FE-2CD8-B9161D0099F4}"/>
-              </a:ext>
-            </a:extLst>
-          </p:cNvPr>
+          <p:cNvPr id="2" name="Title 1"/>
           <p:cNvSpPr>
             <a:spLocks noGrp="1"/>
           </p:cNvSpPr>
@@ -1930,18 +1705,13 @@
               <a:rPr lang="en-US"/>
               <a:t>Click to edit Master title style</a:t>
             </a:r>
-          </a:p>
-        </p:txBody>
-      </p:sp>
-      <p:sp>
-        <p:nvSpPr>
-          <p:cNvPr id="3" name="Date Placeholder 2">
-            <a:extLst>
-              <a:ext uri="{FF2B5EF4-FFF2-40B4-BE49-F238E27FC236}">
-                <a16:creationId xmlns:a16="http://schemas.microsoft.com/office/drawing/2014/main" id="{039527C7-24F6-F217-AE9C-F2EB320E9194}"/>
-              </a:ext>
-            </a:extLst>
-          </p:cNvPr>
+            <a:endParaRPr lang="en-US" dirty="0"/>
+          </a:p>
+        </p:txBody>
+      </p:sp>
+      <p:sp>
+        <p:nvSpPr>
+          <p:cNvPr id="3" name="Date Placeholder 2"/>
           <p:cNvSpPr>
             <a:spLocks noGrp="1"/>
           </p:cNvSpPr>
@@ -1964,13 +1734,7 @@
       </p:sp>
       <p:sp>
         <p:nvSpPr>
-          <p:cNvPr id="4" name="Footer Placeholder 3">
-            <a:extLst>
-              <a:ext uri="{FF2B5EF4-FFF2-40B4-BE49-F238E27FC236}">
-                <a16:creationId xmlns:a16="http://schemas.microsoft.com/office/drawing/2014/main" id="{F487A00B-7FDA-0F27-4298-4A002E539775}"/>
-              </a:ext>
-            </a:extLst>
-          </p:cNvPr>
+          <p:cNvPr id="4" name="Footer Placeholder 3"/>
           <p:cNvSpPr>
             <a:spLocks noGrp="1"/>
           </p:cNvSpPr>
@@ -1989,13 +1753,7 @@
       </p:sp>
       <p:sp>
         <p:nvSpPr>
-          <p:cNvPr id="5" name="Slide Number Placeholder 4">
-            <a:extLst>
-              <a:ext uri="{FF2B5EF4-FFF2-40B4-BE49-F238E27FC236}">
-                <a16:creationId xmlns:a16="http://schemas.microsoft.com/office/drawing/2014/main" id="{F2CB5CEC-2E17-FE53-EC3B-719B27B1481A}"/>
-              </a:ext>
-            </a:extLst>
-          </p:cNvPr>
+          <p:cNvPr id="5" name="Slide Number Placeholder 4"/>
           <p:cNvSpPr>
             <a:spLocks noGrp="1"/>
           </p:cNvSpPr>
@@ -2010,7 +1768,7 @@
           <a:p>
             <a:fld id="{351946EB-CC5B-4C7F-90DE-B507D3CE6B7D}" type="slidenum">
               <a:rPr lang="en-US" smtClean="0"/>
-              <a:t>‹N°›</a:t>
+              <a:t>‹#›</a:t>
             </a:fld>
             <a:endParaRPr lang="en-US"/>
           </a:p>
@@ -2019,7 +1777,7 @@
     </p:spTree>
     <p:extLst>
       <p:ext uri="{BB962C8B-B14F-4D97-AF65-F5344CB8AC3E}">
-        <p14:creationId xmlns:p14="http://schemas.microsoft.com/office/powerpoint/2010/main" val="1407575794"/>
+        <p14:creationId xmlns:p14="http://schemas.microsoft.com/office/powerpoint/2010/main" val="1681819773"/>
       </p:ext>
     </p:extLst>
   </p:cSld>
@@ -2048,13 +1806,7 @@
       </p:grpSpPr>
       <p:sp>
         <p:nvSpPr>
-          <p:cNvPr id="2" name="Date Placeholder 1">
-            <a:extLst>
-              <a:ext uri="{FF2B5EF4-FFF2-40B4-BE49-F238E27FC236}">
-                <a16:creationId xmlns:a16="http://schemas.microsoft.com/office/drawing/2014/main" id="{108AA176-9BEE-7515-4926-D5B6B3CA2264}"/>
-              </a:ext>
-            </a:extLst>
-          </p:cNvPr>
+          <p:cNvPr id="2" name="Date Placeholder 1"/>
           <p:cNvSpPr>
             <a:spLocks noGrp="1"/>
           </p:cNvSpPr>
@@ -2077,13 +1829,7 @@
       </p:sp>
       <p:sp>
         <p:nvSpPr>
-          <p:cNvPr id="3" name="Footer Placeholder 2">
-            <a:extLst>
-              <a:ext uri="{FF2B5EF4-FFF2-40B4-BE49-F238E27FC236}">
-                <a16:creationId xmlns:a16="http://schemas.microsoft.com/office/drawing/2014/main" id="{748F14E0-9627-EA61-39D8-1D35A42DBAC0}"/>
-              </a:ext>
-            </a:extLst>
-          </p:cNvPr>
+          <p:cNvPr id="3" name="Footer Placeholder 2"/>
           <p:cNvSpPr>
             <a:spLocks noGrp="1"/>
           </p:cNvSpPr>
@@ -2102,13 +1848,7 @@
       </p:sp>
       <p:sp>
         <p:nvSpPr>
-          <p:cNvPr id="4" name="Slide Number Placeholder 3">
-            <a:extLst>
-              <a:ext uri="{FF2B5EF4-FFF2-40B4-BE49-F238E27FC236}">
-                <a16:creationId xmlns:a16="http://schemas.microsoft.com/office/drawing/2014/main" id="{3B29AE80-4A8C-6B89-C82E-D8911BB423A0}"/>
-              </a:ext>
-            </a:extLst>
-          </p:cNvPr>
+          <p:cNvPr id="4" name="Slide Number Placeholder 3"/>
           <p:cNvSpPr>
             <a:spLocks noGrp="1"/>
           </p:cNvSpPr>
@@ -2123,7 +1863,7 @@
           <a:p>
             <a:fld id="{351946EB-CC5B-4C7F-90DE-B507D3CE6B7D}" type="slidenum">
               <a:rPr lang="en-US" smtClean="0"/>
-              <a:t>‹N°›</a:t>
+              <a:t>‹#›</a:t>
             </a:fld>
             <a:endParaRPr lang="en-US"/>
           </a:p>
@@ -2132,7 +1872,7 @@
     </p:spTree>
     <p:extLst>
       <p:ext uri="{BB962C8B-B14F-4D97-AF65-F5344CB8AC3E}">
-        <p14:creationId xmlns:p14="http://schemas.microsoft.com/office/powerpoint/2010/main" val="33670389"/>
+        <p14:creationId xmlns:p14="http://schemas.microsoft.com/office/powerpoint/2010/main" val="2124782383"/>
       </p:ext>
     </p:extLst>
   </p:cSld>
@@ -2161,13 +1901,7 @@
       </p:grpSpPr>
       <p:sp>
         <p:nvSpPr>
-          <p:cNvPr id="2" name="Title 1">
-            <a:extLst>
-              <a:ext uri="{FF2B5EF4-FFF2-40B4-BE49-F238E27FC236}">
-                <a16:creationId xmlns:a16="http://schemas.microsoft.com/office/drawing/2014/main" id="{46EA8BA7-DC90-451B-1D8F-AD2303E9B753}"/>
-              </a:ext>
-            </a:extLst>
-          </p:cNvPr>
+          <p:cNvPr id="2" name="Title 1"/>
           <p:cNvSpPr>
             <a:spLocks noGrp="1"/>
           </p:cNvSpPr>
@@ -2193,18 +1927,13 @@
               <a:rPr lang="en-US"/>
               <a:t>Click to edit Master title style</a:t>
             </a:r>
-          </a:p>
-        </p:txBody>
-      </p:sp>
-      <p:sp>
-        <p:nvSpPr>
-          <p:cNvPr id="3" name="Content Placeholder 2">
-            <a:extLst>
-              <a:ext uri="{FF2B5EF4-FFF2-40B4-BE49-F238E27FC236}">
-                <a16:creationId xmlns:a16="http://schemas.microsoft.com/office/drawing/2014/main" id="{98140120-409D-8EBE-DD81-2AF008000920}"/>
-              </a:ext>
-            </a:extLst>
-          </p:cNvPr>
+            <a:endParaRPr lang="en-US" dirty="0"/>
+          </a:p>
+        </p:txBody>
+      </p:sp>
+      <p:sp>
+        <p:nvSpPr>
+          <p:cNvPr id="3" name="Content Placeholder 2"/>
           <p:cNvSpPr>
             <a:spLocks noGrp="1"/>
           </p:cNvSpPr>
@@ -2283,18 +2012,13 @@
               <a:rPr lang="en-US"/>
               <a:t>Fifth level</a:t>
             </a:r>
-          </a:p>
-        </p:txBody>
-      </p:sp>
-      <p:sp>
-        <p:nvSpPr>
-          <p:cNvPr id="4" name="Text Placeholder 3">
-            <a:extLst>
-              <a:ext uri="{FF2B5EF4-FFF2-40B4-BE49-F238E27FC236}">
-                <a16:creationId xmlns:a16="http://schemas.microsoft.com/office/drawing/2014/main" id="{1A7F207A-F640-B7A6-D1EC-2E31DDA9EA7E}"/>
-              </a:ext>
-            </a:extLst>
-          </p:cNvPr>
+            <a:endParaRPr lang="en-US" dirty="0"/>
+          </a:p>
+        </p:txBody>
+      </p:sp>
+      <p:sp>
+        <p:nvSpPr>
+          <p:cNvPr id="4" name="Text Placeholder 3"/>
           <p:cNvSpPr>
             <a:spLocks noGrp="1"/>
           </p:cNvSpPr>
@@ -2359,13 +2083,7 @@
       </p:sp>
       <p:sp>
         <p:nvSpPr>
-          <p:cNvPr id="5" name="Date Placeholder 4">
-            <a:extLst>
-              <a:ext uri="{FF2B5EF4-FFF2-40B4-BE49-F238E27FC236}">
-                <a16:creationId xmlns:a16="http://schemas.microsoft.com/office/drawing/2014/main" id="{517C90C4-5C23-0C1B-3C63-3E252E7C28A9}"/>
-              </a:ext>
-            </a:extLst>
-          </p:cNvPr>
+          <p:cNvPr id="5" name="Date Placeholder 4"/>
           <p:cNvSpPr>
             <a:spLocks noGrp="1"/>
           </p:cNvSpPr>
@@ -2388,13 +2106,7 @@
       </p:sp>
       <p:sp>
         <p:nvSpPr>
-          <p:cNvPr id="6" name="Footer Placeholder 5">
-            <a:extLst>
-              <a:ext uri="{FF2B5EF4-FFF2-40B4-BE49-F238E27FC236}">
-                <a16:creationId xmlns:a16="http://schemas.microsoft.com/office/drawing/2014/main" id="{02CFC34D-EC59-E72A-E208-547D63A8FE70}"/>
-              </a:ext>
-            </a:extLst>
-          </p:cNvPr>
+          <p:cNvPr id="6" name="Footer Placeholder 5"/>
           <p:cNvSpPr>
             <a:spLocks noGrp="1"/>
           </p:cNvSpPr>
@@ -2413,13 +2125,7 @@
       </p:sp>
       <p:sp>
         <p:nvSpPr>
-          <p:cNvPr id="7" name="Slide Number Placeholder 6">
-            <a:extLst>
-              <a:ext uri="{FF2B5EF4-FFF2-40B4-BE49-F238E27FC236}">
-                <a16:creationId xmlns:a16="http://schemas.microsoft.com/office/drawing/2014/main" id="{1376E67D-08C8-7922-1867-E52B7237D6F0}"/>
-              </a:ext>
-            </a:extLst>
-          </p:cNvPr>
+          <p:cNvPr id="7" name="Slide Number Placeholder 6"/>
           <p:cNvSpPr>
             <a:spLocks noGrp="1"/>
           </p:cNvSpPr>
@@ -2434,7 +2140,7 @@
           <a:p>
             <a:fld id="{351946EB-CC5B-4C7F-90DE-B507D3CE6B7D}" type="slidenum">
               <a:rPr lang="en-US" smtClean="0"/>
-              <a:t>‹N°›</a:t>
+              <a:t>‹#›</a:t>
             </a:fld>
             <a:endParaRPr lang="en-US"/>
           </a:p>
@@ -2443,7 +2149,7 @@
     </p:spTree>
     <p:extLst>
       <p:ext uri="{BB962C8B-B14F-4D97-AF65-F5344CB8AC3E}">
-        <p14:creationId xmlns:p14="http://schemas.microsoft.com/office/powerpoint/2010/main" val="1129625748"/>
+        <p14:creationId xmlns:p14="http://schemas.microsoft.com/office/powerpoint/2010/main" val="4216664882"/>
       </p:ext>
     </p:extLst>
   </p:cSld>
@@ -2472,13 +2178,7 @@
       </p:grpSpPr>
       <p:sp>
         <p:nvSpPr>
-          <p:cNvPr id="2" name="Title 1">
-            <a:extLst>
-              <a:ext uri="{FF2B5EF4-FFF2-40B4-BE49-F238E27FC236}">
-                <a16:creationId xmlns:a16="http://schemas.microsoft.com/office/drawing/2014/main" id="{DCC3A653-5803-8D34-8917-C3887D1DEDB9}"/>
-              </a:ext>
-            </a:extLst>
-          </p:cNvPr>
+          <p:cNvPr id="2" name="Title 1"/>
           <p:cNvSpPr>
             <a:spLocks noGrp="1"/>
           </p:cNvSpPr>
@@ -2504,20 +2204,15 @@
               <a:rPr lang="en-US"/>
               <a:t>Click to edit Master title style</a:t>
             </a:r>
-          </a:p>
-        </p:txBody>
-      </p:sp>
-      <p:sp>
-        <p:nvSpPr>
-          <p:cNvPr id="3" name="Picture Placeholder 2">
-            <a:extLst>
-              <a:ext uri="{FF2B5EF4-FFF2-40B4-BE49-F238E27FC236}">
-                <a16:creationId xmlns:a16="http://schemas.microsoft.com/office/drawing/2014/main" id="{F2E266B5-B8AC-6AB0-99D2-E890242B7B45}"/>
-              </a:ext>
-            </a:extLst>
-          </p:cNvPr>
-          <p:cNvSpPr>
-            <a:spLocks noGrp="1"/>
+            <a:endParaRPr lang="en-US" dirty="0"/>
+          </a:p>
+        </p:txBody>
+      </p:sp>
+      <p:sp>
+        <p:nvSpPr>
+          <p:cNvPr id="3" name="Picture Placeholder 2"/>
+          <p:cNvSpPr>
+            <a:spLocks noGrp="1" noChangeAspect="1"/>
           </p:cNvSpPr>
           <p:nvPr>
             <p:ph type="pic" idx="1"/>
@@ -2530,7 +2225,7 @@
           </a:xfrm>
         </p:spPr>
         <p:txBody>
-          <a:bodyPr/>
+          <a:bodyPr anchor="t"/>
           <a:lstStyle>
             <a:lvl1pPr marL="0" indent="0">
               <a:buNone/>
@@ -2570,19 +2265,17 @@
             </a:lvl9pPr>
           </a:lstStyle>
           <a:p>
-            <a:endParaRPr lang="en-US"/>
-          </a:p>
-        </p:txBody>
-      </p:sp>
-      <p:sp>
-        <p:nvSpPr>
-          <p:cNvPr id="4" name="Text Placeholder 3">
-            <a:extLst>
-              <a:ext uri="{FF2B5EF4-FFF2-40B4-BE49-F238E27FC236}">
-                <a16:creationId xmlns:a16="http://schemas.microsoft.com/office/drawing/2014/main" id="{365C8BA1-78F7-3202-AF12-E9F5A34D1A6B}"/>
-              </a:ext>
-            </a:extLst>
-          </p:cNvPr>
+            <a:r>
+              <a:rPr lang="en-US"/>
+              <a:t>Click icon to add picture</a:t>
+            </a:r>
+            <a:endParaRPr lang="en-US" dirty="0"/>
+          </a:p>
+        </p:txBody>
+      </p:sp>
+      <p:sp>
+        <p:nvSpPr>
+          <p:cNvPr id="4" name="Text Placeholder 3"/>
           <p:cNvSpPr>
             <a:spLocks noGrp="1"/>
           </p:cNvSpPr>
@@ -2647,13 +2340,7 @@
       </p:sp>
       <p:sp>
         <p:nvSpPr>
-          <p:cNvPr id="5" name="Date Placeholder 4">
-            <a:extLst>
-              <a:ext uri="{FF2B5EF4-FFF2-40B4-BE49-F238E27FC236}">
-                <a16:creationId xmlns:a16="http://schemas.microsoft.com/office/drawing/2014/main" id="{3FCE7A36-803B-5ED9-6BCC-54723E55B8CE}"/>
-              </a:ext>
-            </a:extLst>
-          </p:cNvPr>
+          <p:cNvPr id="5" name="Date Placeholder 4"/>
           <p:cNvSpPr>
             <a:spLocks noGrp="1"/>
           </p:cNvSpPr>
@@ -2676,13 +2363,7 @@
       </p:sp>
       <p:sp>
         <p:nvSpPr>
-          <p:cNvPr id="6" name="Footer Placeholder 5">
-            <a:extLst>
-              <a:ext uri="{FF2B5EF4-FFF2-40B4-BE49-F238E27FC236}">
-                <a16:creationId xmlns:a16="http://schemas.microsoft.com/office/drawing/2014/main" id="{90E0CB71-2821-A472-6690-371FBC45A77C}"/>
-              </a:ext>
-            </a:extLst>
-          </p:cNvPr>
+          <p:cNvPr id="6" name="Footer Placeholder 5"/>
           <p:cNvSpPr>
             <a:spLocks noGrp="1"/>
           </p:cNvSpPr>
@@ -2701,13 +2382,7 @@
       </p:sp>
       <p:sp>
         <p:nvSpPr>
-          <p:cNvPr id="7" name="Slide Number Placeholder 6">
-            <a:extLst>
-              <a:ext uri="{FF2B5EF4-FFF2-40B4-BE49-F238E27FC236}">
-                <a16:creationId xmlns:a16="http://schemas.microsoft.com/office/drawing/2014/main" id="{014D2D53-3D90-7C5C-3373-6CC9CB6DC10C}"/>
-              </a:ext>
-            </a:extLst>
-          </p:cNvPr>
+          <p:cNvPr id="7" name="Slide Number Placeholder 6"/>
           <p:cNvSpPr>
             <a:spLocks noGrp="1"/>
           </p:cNvSpPr>
@@ -2722,7 +2397,7 @@
           <a:p>
             <a:fld id="{351946EB-CC5B-4C7F-90DE-B507D3CE6B7D}" type="slidenum">
               <a:rPr lang="en-US" smtClean="0"/>
-              <a:t>‹N°›</a:t>
+              <a:t>‹#›</a:t>
             </a:fld>
             <a:endParaRPr lang="en-US"/>
           </a:p>
@@ -2731,7 +2406,7 @@
     </p:spTree>
     <p:extLst>
       <p:ext uri="{BB962C8B-B14F-4D97-AF65-F5344CB8AC3E}">
-        <p14:creationId xmlns:p14="http://schemas.microsoft.com/office/powerpoint/2010/main" val="2096503842"/>
+        <p14:creationId xmlns:p14="http://schemas.microsoft.com/office/powerpoint/2010/main" val="4086637444"/>
       </p:ext>
     </p:extLst>
   </p:cSld>
@@ -2765,13 +2440,7 @@
       </p:grpSpPr>
       <p:sp>
         <p:nvSpPr>
-          <p:cNvPr id="2" name="Title Placeholder 1">
-            <a:extLst>
-              <a:ext uri="{FF2B5EF4-FFF2-40B4-BE49-F238E27FC236}">
-                <a16:creationId xmlns:a16="http://schemas.microsoft.com/office/drawing/2014/main" id="{9AEFF189-BD19-9648-3526-42EA5A717CB5}"/>
-              </a:ext>
-            </a:extLst>
-          </p:cNvPr>
+          <p:cNvPr id="2" name="Title Placeholder 1"/>
           <p:cNvSpPr>
             <a:spLocks noGrp="1"/>
           </p:cNvSpPr>
@@ -2798,18 +2467,13 @@
               <a:rPr lang="en-US"/>
               <a:t>Click to edit Master title style</a:t>
             </a:r>
-          </a:p>
-        </p:txBody>
-      </p:sp>
-      <p:sp>
-        <p:nvSpPr>
-          <p:cNvPr id="3" name="Text Placeholder 2">
-            <a:extLst>
-              <a:ext uri="{FF2B5EF4-FFF2-40B4-BE49-F238E27FC236}">
-                <a16:creationId xmlns:a16="http://schemas.microsoft.com/office/drawing/2014/main" id="{F5A08588-A7B2-6F4C-19B3-DEF4FB371C0B}"/>
-              </a:ext>
-            </a:extLst>
-          </p:cNvPr>
+            <a:endParaRPr lang="en-US" dirty="0"/>
+          </a:p>
+        </p:txBody>
+      </p:sp>
+      <p:sp>
+        <p:nvSpPr>
+          <p:cNvPr id="3" name="Text Placeholder 2"/>
           <p:cNvSpPr>
             <a:spLocks noGrp="1"/>
           </p:cNvSpPr>
@@ -2865,18 +2529,13 @@
               <a:rPr lang="en-US"/>
               <a:t>Fifth level</a:t>
             </a:r>
-          </a:p>
-        </p:txBody>
-      </p:sp>
-      <p:sp>
-        <p:nvSpPr>
-          <p:cNvPr id="4" name="Date Placeholder 3">
-            <a:extLst>
-              <a:ext uri="{FF2B5EF4-FFF2-40B4-BE49-F238E27FC236}">
-                <a16:creationId xmlns:a16="http://schemas.microsoft.com/office/drawing/2014/main" id="{B4300392-50A3-471E-6B2E-64FE75D54776}"/>
-              </a:ext>
-            </a:extLst>
-          </p:cNvPr>
+            <a:endParaRPr lang="en-US" dirty="0"/>
+          </a:p>
+        </p:txBody>
+      </p:sp>
+      <p:sp>
+        <p:nvSpPr>
+          <p:cNvPr id="4" name="Date Placeholder 3"/>
           <p:cNvSpPr>
             <a:spLocks noGrp="1"/>
           </p:cNvSpPr>
@@ -2917,13 +2576,7 @@
       </p:sp>
       <p:sp>
         <p:nvSpPr>
-          <p:cNvPr id="5" name="Footer Placeholder 4">
-            <a:extLst>
-              <a:ext uri="{FF2B5EF4-FFF2-40B4-BE49-F238E27FC236}">
-                <a16:creationId xmlns:a16="http://schemas.microsoft.com/office/drawing/2014/main" id="{5CB7C4F7-E3CF-A92C-3C6A-94D0DB345176}"/>
-              </a:ext>
-            </a:extLst>
-          </p:cNvPr>
+          <p:cNvPr id="5" name="Footer Placeholder 4"/>
           <p:cNvSpPr>
             <a:spLocks noGrp="1"/>
           </p:cNvSpPr>
@@ -2960,13 +2613,7 @@
       </p:sp>
       <p:sp>
         <p:nvSpPr>
-          <p:cNvPr id="6" name="Slide Number Placeholder 5">
-            <a:extLst>
-              <a:ext uri="{FF2B5EF4-FFF2-40B4-BE49-F238E27FC236}">
-                <a16:creationId xmlns:a16="http://schemas.microsoft.com/office/drawing/2014/main" id="{9F278873-A030-D114-E994-D2256C8D6454}"/>
-              </a:ext>
-            </a:extLst>
-          </p:cNvPr>
+          <p:cNvPr id="6" name="Slide Number Placeholder 5"/>
           <p:cNvSpPr>
             <a:spLocks noGrp="1"/>
           </p:cNvSpPr>
@@ -2999,7 +2646,7 @@
           <a:p>
             <a:fld id="{351946EB-CC5B-4C7F-90DE-B507D3CE6B7D}" type="slidenum">
               <a:rPr lang="en-US" smtClean="0"/>
-              <a:t>‹N°›</a:t>
+              <a:t>‹#›</a:t>
             </a:fld>
             <a:endParaRPr lang="en-US"/>
           </a:p>
@@ -3008,23 +2655,23 @@
     </p:spTree>
     <p:extLst>
       <p:ext uri="{BB962C8B-B14F-4D97-AF65-F5344CB8AC3E}">
-        <p14:creationId xmlns:p14="http://schemas.microsoft.com/office/powerpoint/2010/main" val="493277950"/>
+        <p14:creationId xmlns:p14="http://schemas.microsoft.com/office/powerpoint/2010/main" val="1772593589"/>
       </p:ext>
     </p:extLst>
   </p:cSld>
   <p:clrMap bg1="lt1" tx1="dk1" bg2="lt2" tx2="dk2" accent1="accent1" accent2="accent2" accent3="accent3" accent4="accent4" accent5="accent5" accent6="accent6" hlink="hlink" folHlink="folHlink"/>
   <p:sldLayoutIdLst>
-    <p:sldLayoutId id="2147483649" r:id="rId1"/>
-    <p:sldLayoutId id="2147483650" r:id="rId2"/>
-    <p:sldLayoutId id="2147483651" r:id="rId3"/>
-    <p:sldLayoutId id="2147483652" r:id="rId4"/>
-    <p:sldLayoutId id="2147483653" r:id="rId5"/>
-    <p:sldLayoutId id="2147483654" r:id="rId6"/>
-    <p:sldLayoutId id="2147483655" r:id="rId7"/>
-    <p:sldLayoutId id="2147483656" r:id="rId8"/>
-    <p:sldLayoutId id="2147483657" r:id="rId9"/>
-    <p:sldLayoutId id="2147483658" r:id="rId10"/>
-    <p:sldLayoutId id="2147483659" r:id="rId11"/>
+    <p:sldLayoutId id="2147483673" r:id="rId1"/>
+    <p:sldLayoutId id="2147483674" r:id="rId2"/>
+    <p:sldLayoutId id="2147483675" r:id="rId3"/>
+    <p:sldLayoutId id="2147483676" r:id="rId4"/>
+    <p:sldLayoutId id="2147483677" r:id="rId5"/>
+    <p:sldLayoutId id="2147483678" r:id="rId6"/>
+    <p:sldLayoutId id="2147483679" r:id="rId7"/>
+    <p:sldLayoutId id="2147483680" r:id="rId8"/>
+    <p:sldLayoutId id="2147483681" r:id="rId9"/>
+    <p:sldLayoutId id="2147483682" r:id="rId10"/>
+    <p:sldLayoutId id="2147483683" r:id="rId11"/>
   </p:sldLayoutIdLst>
   <p:txStyles>
     <p:titleStyle>
@@ -3328,10 +2975,10 @@
       </p:grpSpPr>
       <p:sp>
         <p:nvSpPr>
-          <p:cNvPr id="30" name="Rectangle 29">
+          <p:cNvPr id="16" name="Arrow: Chevron 15">
             <a:extLst>
               <a:ext uri="{FF2B5EF4-FFF2-40B4-BE49-F238E27FC236}">
-                <a16:creationId xmlns:a16="http://schemas.microsoft.com/office/drawing/2014/main" id="{CF0599EE-056A-F1A8-F0EC-914050CACF05}"/>
+                <a16:creationId xmlns:a16="http://schemas.microsoft.com/office/drawing/2014/main" id="{5CA8368A-1351-3C2D-7170-1C2E99C9EBCB}"/>
               </a:ext>
             </a:extLst>
           </p:cNvPr>
@@ -3340,25 +2987,38 @@
         </p:nvSpPr>
         <p:spPr>
           <a:xfrm>
-            <a:off x="1764561" y="4598416"/>
-            <a:ext cx="3842373" cy="2068731"/>
+            <a:off x="282388" y="1413117"/>
+            <a:ext cx="11753968" cy="900000"/>
           </a:xfrm>
-          <a:prstGeom prst="rect">
-            <a:avLst/>
+          <a:prstGeom prst="chevron">
+            <a:avLst>
+              <a:gd name="adj" fmla="val 35343"/>
+            </a:avLst>
           </a:prstGeom>
+          <a:solidFill>
+            <a:schemeClr val="accent1">
+              <a:lumMod val="75000"/>
+              <a:alpha val="38000"/>
+            </a:schemeClr>
+          </a:solidFill>
+          <a:ln>
+            <a:noFill/>
+          </a:ln>
         </p:spPr>
         <p:style>
           <a:lnRef idx="2">
-            <a:schemeClr val="dk1"/>
+            <a:schemeClr val="accent1">
+              <a:shade val="50000"/>
+            </a:schemeClr>
           </a:lnRef>
           <a:fillRef idx="1">
-            <a:schemeClr val="lt1"/>
+            <a:schemeClr val="accent1"/>
           </a:fillRef>
           <a:effectRef idx="0">
-            <a:schemeClr val="dk1"/>
+            <a:schemeClr val="accent1"/>
           </a:effectRef>
           <a:fontRef idx="minor">
-            <a:schemeClr val="dk1"/>
+            <a:schemeClr val="lt1"/>
           </a:fontRef>
         </p:style>
         <p:txBody>
@@ -3366,95 +3026,13 @@
           <a:lstStyle/>
           <a:p>
             <a:pPr algn="ctr"/>
-            <a:endParaRPr lang="fr-FR"/>
-          </a:p>
-        </p:txBody>
-      </p:sp>
-      <p:sp>
-        <p:nvSpPr>
-          <p:cNvPr id="26" name="Rectangle 25">
-            <a:extLst>
-              <a:ext uri="{FF2B5EF4-FFF2-40B4-BE49-F238E27FC236}">
-                <a16:creationId xmlns:a16="http://schemas.microsoft.com/office/drawing/2014/main" id="{CA334151-289B-AE4E-D540-2BA70D700113}"/>
-              </a:ext>
-            </a:extLst>
-          </p:cNvPr>
-          <p:cNvSpPr/>
-          <p:nvPr/>
-        </p:nvSpPr>
-        <p:spPr>
-          <a:xfrm>
-            <a:off x="8137700" y="3639044"/>
-            <a:ext cx="3723357" cy="2696938"/>
-          </a:xfrm>
-          <a:prstGeom prst="rect">
-            <a:avLst/>
-          </a:prstGeom>
-        </p:spPr>
-        <p:style>
-          <a:lnRef idx="2">
-            <a:schemeClr val="dk1"/>
-          </a:lnRef>
-          <a:fillRef idx="1">
-            <a:schemeClr val="lt1"/>
-          </a:fillRef>
-          <a:effectRef idx="0">
-            <a:schemeClr val="dk1"/>
-          </a:effectRef>
-          <a:fontRef idx="minor">
-            <a:schemeClr val="dk1"/>
-          </a:fontRef>
-        </p:style>
-        <p:txBody>
-          <a:bodyPr rtlCol="0" anchor="ctr"/>
-          <a:lstStyle/>
-          <a:p>
-            <a:pPr algn="ctr"/>
-            <a:endParaRPr lang="fr-FR"/>
-          </a:p>
-        </p:txBody>
-      </p:sp>
-      <p:sp>
-        <p:nvSpPr>
-          <p:cNvPr id="21" name="Rectangle 20">
-            <a:extLst>
-              <a:ext uri="{FF2B5EF4-FFF2-40B4-BE49-F238E27FC236}">
-                <a16:creationId xmlns:a16="http://schemas.microsoft.com/office/drawing/2014/main" id="{EEF53EC2-D62C-EF7E-4A6A-57E41CC9EC35}"/>
-              </a:ext>
-            </a:extLst>
-          </p:cNvPr>
-          <p:cNvSpPr/>
-          <p:nvPr/>
-        </p:nvSpPr>
-        <p:spPr>
-          <a:xfrm>
-            <a:off x="4209925" y="1441562"/>
-            <a:ext cx="3842373" cy="2937438"/>
-          </a:xfrm>
-          <a:prstGeom prst="rect">
-            <a:avLst/>
-          </a:prstGeom>
-        </p:spPr>
-        <p:style>
-          <a:lnRef idx="2">
-            <a:schemeClr val="dk1"/>
-          </a:lnRef>
-          <a:fillRef idx="1">
-            <a:schemeClr val="lt1"/>
-          </a:fillRef>
-          <a:effectRef idx="0">
-            <a:schemeClr val="dk1"/>
-          </a:effectRef>
-          <a:fontRef idx="minor">
-            <a:schemeClr val="dk1"/>
-          </a:fontRef>
-        </p:style>
-        <p:txBody>
-          <a:bodyPr rtlCol="0" anchor="ctr"/>
-          <a:lstStyle/>
-          <a:p>
-            <a:pPr algn="ctr"/>
-            <a:endParaRPr lang="fr-FR"/>
+            <a:endParaRPr lang="en-US" sz="1600">
+              <a:solidFill>
+                <a:schemeClr val="tx1"/>
+              </a:solidFill>
+              <a:latin typeface="Cambria" panose="02040503050406030204" pitchFamily="18" charset="0"/>
+              <a:ea typeface="Cambria" panose="02040503050406030204" pitchFamily="18" charset="0"/>
+            </a:endParaRPr>
           </a:p>
         </p:txBody>
       </p:sp>
@@ -3472,8 +3050,8 @@
         </p:nvSpPr>
         <p:spPr>
           <a:xfrm>
-            <a:off x="4563576" y="224570"/>
-            <a:ext cx="3064848" cy="369332"/>
+            <a:off x="3449503" y="449627"/>
+            <a:ext cx="5292995" cy="584775"/>
           </a:xfrm>
           <a:prstGeom prst="rect">
             <a:avLst/>
@@ -3486,638 +3064,1078 @@
           </a:bodyPr>
           <a:lstStyle/>
           <a:p>
-            <a:r>
-              <a:rPr lang="en-US" dirty="0"/>
+            <a:pPr algn="ctr"/>
+            <a:r>
+              <a:rPr lang="en-US" sz="3200" dirty="0">
+                <a:latin typeface="Cambria" panose="02040503050406030204" pitchFamily="18" charset="0"/>
+                <a:ea typeface="Cambria" panose="02040503050406030204" pitchFamily="18" charset="0"/>
+              </a:rPr>
               <a:t>UAV controlled by hand signs</a:t>
             </a:r>
-            <a:endParaRPr lang="fr-FR" dirty="0"/>
-          </a:p>
-        </p:txBody>
-      </p:sp>
-      <p:pic>
-        <p:nvPicPr>
-          <p:cNvPr id="5" name="Image 4" descr="Un jeune mentonnier lève le petit doigt">
+            <a:endParaRPr lang="fr-FR" sz="3200" dirty="0">
+              <a:latin typeface="Cambria" panose="02040503050406030204" pitchFamily="18" charset="0"/>
+              <a:ea typeface="Cambria" panose="02040503050406030204" pitchFamily="18" charset="0"/>
+            </a:endParaRPr>
+          </a:p>
+        </p:txBody>
+      </p:sp>
+      <p:grpSp>
+        <p:nvGrpSpPr>
+          <p:cNvPr id="43" name="Group 42">
             <a:extLst>
               <a:ext uri="{FF2B5EF4-FFF2-40B4-BE49-F238E27FC236}">
-                <a16:creationId xmlns:a16="http://schemas.microsoft.com/office/drawing/2014/main" id="{6369174D-BF19-2381-C16A-5AA781F14427}"/>
+                <a16:creationId xmlns:a16="http://schemas.microsoft.com/office/drawing/2014/main" id="{738D2C8B-EE86-968A-D4BF-1195016A0817}"/>
               </a:ext>
             </a:extLst>
           </p:cNvPr>
-          <p:cNvPicPr>
-            <a:picLocks noChangeAspect="1"/>
-          </p:cNvPicPr>
+          <p:cNvGrpSpPr/>
           <p:nvPr/>
-        </p:nvPicPr>
-        <p:blipFill>
-          <a:blip r:embed="rId2">
-            <a:extLst>
-              <a:ext uri="{28A0092B-C50C-407E-A947-70E740481C1C}">
-                <a14:useLocalDpi xmlns:a14="http://schemas.microsoft.com/office/drawing/2010/main" val="0"/>
-              </a:ext>
-            </a:extLst>
-          </a:blip>
-          <a:stretch>
-            <a:fillRect/>
-          </a:stretch>
-        </p:blipFill>
-        <p:spPr>
+        </p:nvGrpSpPr>
+        <p:grpSpPr>
           <a:xfrm>
-            <a:off x="315632" y="1517140"/>
-            <a:ext cx="980980" cy="3134838"/>
+            <a:off x="2955328" y="1453461"/>
+            <a:ext cx="1800000" cy="1619415"/>
+            <a:chOff x="2737789" y="1097110"/>
+            <a:chExt cx="1800000" cy="1619415"/>
           </a:xfrm>
-          <a:prstGeom prst="rect">
-            <a:avLst/>
-          </a:prstGeom>
-        </p:spPr>
-      </p:pic>
-      <p:pic>
-        <p:nvPicPr>
-          <p:cNvPr id="13" name="Graphique 12" descr="Synchronisation avec le cloud avec un remplissage uni">
+        </p:grpSpPr>
+        <p:pic>
+          <p:nvPicPr>
+            <p:cNvPr id="17" name="Graphique 16" descr="Webcam avec un remplissage uni">
+              <a:extLst>
+                <a:ext uri="{FF2B5EF4-FFF2-40B4-BE49-F238E27FC236}">
+                  <a16:creationId xmlns:a16="http://schemas.microsoft.com/office/drawing/2014/main" id="{71590CFB-EDE0-AC8A-D089-DF6B9215304D}"/>
+                </a:ext>
+              </a:extLst>
+            </p:cNvPr>
+            <p:cNvPicPr>
+              <a:picLocks noChangeAspect="1"/>
+            </p:cNvPicPr>
+            <p:nvPr/>
+          </p:nvPicPr>
+          <p:blipFill>
+            <a:blip r:embed="rId2">
+              <a:extLst>
+                <a:ext uri="{28A0092B-C50C-407E-A947-70E740481C1C}">
+                  <a14:useLocalDpi xmlns:a14="http://schemas.microsoft.com/office/drawing/2010/main" val="0"/>
+                </a:ext>
+                <a:ext uri="{96DAC541-7B7A-43D3-8B79-37D633B846F1}">
+                  <asvg:svgBlip xmlns:asvg="http://schemas.microsoft.com/office/drawing/2016/SVG/main" r:embed="rId3"/>
+                </a:ext>
+              </a:extLst>
+            </a:blip>
+            <a:stretch>
+              <a:fillRect/>
+            </a:stretch>
+          </p:blipFill>
+          <p:spPr>
+            <a:xfrm>
+              <a:off x="3187789" y="1097110"/>
+              <a:ext cx="900000" cy="900000"/>
+            </a:xfrm>
+            <a:prstGeom prst="rect">
+              <a:avLst/>
+            </a:prstGeom>
+          </p:spPr>
+        </p:pic>
+        <p:sp>
+          <p:nvSpPr>
+            <p:cNvPr id="20" name="Rectangle 19">
+              <a:extLst>
+                <a:ext uri="{FF2B5EF4-FFF2-40B4-BE49-F238E27FC236}">
+                  <a16:creationId xmlns:a16="http://schemas.microsoft.com/office/drawing/2014/main" id="{E3A3DD2E-686F-0C8F-3A8A-C337957D9D68}"/>
+                </a:ext>
+              </a:extLst>
+            </p:cNvPr>
+            <p:cNvSpPr/>
+            <p:nvPr/>
+          </p:nvSpPr>
+          <p:spPr>
+            <a:xfrm>
+              <a:off x="2737789" y="1996525"/>
+              <a:ext cx="1800000" cy="720000"/>
+            </a:xfrm>
+            <a:prstGeom prst="rect">
+              <a:avLst/>
+            </a:prstGeom>
+            <a:solidFill>
+              <a:schemeClr val="accent2">
+                <a:lumMod val="20000"/>
+                <a:lumOff val="80000"/>
+              </a:schemeClr>
+            </a:solidFill>
+            <a:ln>
+              <a:noFill/>
+            </a:ln>
+          </p:spPr>
+          <p:style>
+            <a:lnRef idx="2">
+              <a:schemeClr val="dk1"/>
+            </a:lnRef>
+            <a:fillRef idx="1">
+              <a:schemeClr val="lt1"/>
+            </a:fillRef>
+            <a:effectRef idx="0">
+              <a:schemeClr val="dk1"/>
+            </a:effectRef>
+            <a:fontRef idx="minor">
+              <a:schemeClr val="dk1"/>
+            </a:fontRef>
+          </p:style>
+          <p:txBody>
+            <a:bodyPr rtlCol="0" anchor="ctr"/>
+            <a:lstStyle/>
+            <a:p>
+              <a:pPr algn="ctr"/>
+              <a:r>
+                <a:rPr lang="en-US" sz="1600" dirty="0">
+                  <a:latin typeface="Cambria" panose="02040503050406030204" pitchFamily="18" charset="0"/>
+                  <a:ea typeface="Cambria" panose="02040503050406030204" pitchFamily="18" charset="0"/>
+                </a:rPr>
+                <a:t>Capture images</a:t>
+              </a:r>
+              <a:endParaRPr lang="fr-FR" sz="1600" dirty="0">
+                <a:latin typeface="Cambria" panose="02040503050406030204" pitchFamily="18" charset="0"/>
+                <a:ea typeface="Cambria" panose="02040503050406030204" pitchFamily="18" charset="0"/>
+              </a:endParaRPr>
+            </a:p>
+          </p:txBody>
+        </p:sp>
+      </p:grpSp>
+      <p:grpSp>
+        <p:nvGrpSpPr>
+          <p:cNvPr id="41" name="Group 40">
             <a:extLst>
               <a:ext uri="{FF2B5EF4-FFF2-40B4-BE49-F238E27FC236}">
-                <a16:creationId xmlns:a16="http://schemas.microsoft.com/office/drawing/2014/main" id="{9C3DFEFA-38DC-DF4F-003B-F1F1237D1071}"/>
+                <a16:creationId xmlns:a16="http://schemas.microsoft.com/office/drawing/2014/main" id="{C612C62D-E39A-EA2D-C03E-A7A8F9A3D5F0}"/>
               </a:ext>
             </a:extLst>
           </p:cNvPr>
-          <p:cNvPicPr>
-            <a:picLocks noChangeAspect="1"/>
-          </p:cNvPicPr>
+          <p:cNvGrpSpPr/>
           <p:nvPr/>
-        </p:nvPicPr>
-        <p:blipFill>
-          <a:blip r:embed="rId3">
-            <a:extLst>
-              <a:ext uri="{28A0092B-C50C-407E-A947-70E740481C1C}">
-                <a14:useLocalDpi xmlns:a14="http://schemas.microsoft.com/office/drawing/2010/main" val="0"/>
-              </a:ext>
-              <a:ext uri="{96DAC541-7B7A-43D3-8B79-37D633B846F1}">
-                <asvg:svgBlip xmlns:asvg="http://schemas.microsoft.com/office/drawing/2016/SVG/main" r:embed="rId4"/>
-              </a:ext>
-            </a:extLst>
-          </a:blip>
-          <a:stretch>
-            <a:fillRect/>
-          </a:stretch>
-        </p:blipFill>
-        <p:spPr>
+        </p:nvGrpSpPr>
+        <p:grpSpPr>
           <a:xfrm>
-            <a:off x="10382290" y="3612973"/>
-            <a:ext cx="1331218" cy="1331218"/>
+            <a:off x="7548243" y="1453461"/>
+            <a:ext cx="1800000" cy="2511908"/>
+            <a:chOff x="7293384" y="1097110"/>
+            <a:chExt cx="1800000" cy="2511908"/>
           </a:xfrm>
-          <a:prstGeom prst="rect">
-            <a:avLst/>
-          </a:prstGeom>
-        </p:spPr>
-      </p:pic>
-      <p:pic>
-        <p:nvPicPr>
-          <p:cNvPr id="15" name="Graphique 14" descr="Quadrirotor avec un remplissage uni">
+        </p:grpSpPr>
+        <p:pic>
+          <p:nvPicPr>
+            <p:cNvPr id="13" name="Graphique 12" descr="Synchronisation avec le cloud avec un remplissage uni">
+              <a:extLst>
+                <a:ext uri="{FF2B5EF4-FFF2-40B4-BE49-F238E27FC236}">
+                  <a16:creationId xmlns:a16="http://schemas.microsoft.com/office/drawing/2014/main" id="{9C3DFEFA-38DC-DF4F-003B-F1F1237D1071}"/>
+                </a:ext>
+              </a:extLst>
+            </p:cNvPr>
+            <p:cNvPicPr>
+              <a:picLocks noChangeAspect="1"/>
+            </p:cNvPicPr>
+            <p:nvPr/>
+          </p:nvPicPr>
+          <p:blipFill>
+            <a:blip r:embed="rId4">
+              <a:extLst>
+                <a:ext uri="{28A0092B-C50C-407E-A947-70E740481C1C}">
+                  <a14:useLocalDpi xmlns:a14="http://schemas.microsoft.com/office/drawing/2010/main" val="0"/>
+                </a:ext>
+                <a:ext uri="{96DAC541-7B7A-43D3-8B79-37D633B846F1}">
+                  <asvg:svgBlip xmlns:asvg="http://schemas.microsoft.com/office/drawing/2016/SVG/main" r:embed="rId5"/>
+                </a:ext>
+              </a:extLst>
+            </a:blip>
+            <a:stretch>
+              <a:fillRect/>
+            </a:stretch>
+          </p:blipFill>
+          <p:spPr>
+            <a:xfrm>
+              <a:off x="7743384" y="1097110"/>
+              <a:ext cx="900000" cy="900000"/>
+            </a:xfrm>
+            <a:prstGeom prst="rect">
+              <a:avLst/>
+            </a:prstGeom>
+          </p:spPr>
+        </p:pic>
+        <p:grpSp>
+          <p:nvGrpSpPr>
+            <p:cNvPr id="38" name="Group 37">
+              <a:extLst>
+                <a:ext uri="{FF2B5EF4-FFF2-40B4-BE49-F238E27FC236}">
+                  <a16:creationId xmlns:a16="http://schemas.microsoft.com/office/drawing/2014/main" id="{B5B9CDE3-8A0B-9F2C-D08C-F55D7FDF2A01}"/>
+                </a:ext>
+              </a:extLst>
+            </p:cNvPr>
+            <p:cNvGrpSpPr/>
+            <p:nvPr/>
+          </p:nvGrpSpPr>
+          <p:grpSpPr>
+            <a:xfrm>
+              <a:off x="7293384" y="1997110"/>
+              <a:ext cx="1800000" cy="1611908"/>
+              <a:chOff x="7293384" y="1997110"/>
+              <a:chExt cx="1800000" cy="1611908"/>
+            </a:xfrm>
+          </p:grpSpPr>
+          <p:sp>
+            <p:nvSpPr>
+              <p:cNvPr id="29" name="Rectangle 28">
+                <a:extLst>
+                  <a:ext uri="{FF2B5EF4-FFF2-40B4-BE49-F238E27FC236}">
+                    <a16:creationId xmlns:a16="http://schemas.microsoft.com/office/drawing/2014/main" id="{D37A9FA9-6751-EB66-685E-E50CDA00D452}"/>
+                  </a:ext>
+                </a:extLst>
+              </p:cNvPr>
+              <p:cNvSpPr/>
+              <p:nvPr/>
+            </p:nvSpPr>
+            <p:spPr>
+              <a:xfrm>
+                <a:off x="7293384" y="2709018"/>
+                <a:ext cx="1800000" cy="900000"/>
+              </a:xfrm>
+              <a:prstGeom prst="rect">
+                <a:avLst/>
+              </a:prstGeom>
+              <a:solidFill>
+                <a:schemeClr val="accent2">
+                  <a:lumMod val="40000"/>
+                  <a:lumOff val="60000"/>
+                </a:schemeClr>
+              </a:solidFill>
+              <a:ln>
+                <a:noFill/>
+              </a:ln>
+            </p:spPr>
+            <p:style>
+              <a:lnRef idx="2">
+                <a:schemeClr val="dk1"/>
+              </a:lnRef>
+              <a:fillRef idx="1">
+                <a:schemeClr val="lt1"/>
+              </a:fillRef>
+              <a:effectRef idx="0">
+                <a:schemeClr val="dk1"/>
+              </a:effectRef>
+              <a:fontRef idx="minor">
+                <a:schemeClr val="dk1"/>
+              </a:fontRef>
+            </p:style>
+            <p:txBody>
+              <a:bodyPr rtlCol="0" anchor="ctr"/>
+              <a:lstStyle/>
+              <a:p>
+                <a:pPr algn="ctr"/>
+                <a:endParaRPr lang="en-US" sz="1600" dirty="0">
+                  <a:latin typeface="Cambria" panose="02040503050406030204" pitchFamily="18" charset="0"/>
+                  <a:ea typeface="Cambria" panose="02040503050406030204" pitchFamily="18" charset="0"/>
+                </a:endParaRPr>
+              </a:p>
+              <a:p>
+                <a:pPr algn="ctr"/>
+                <a:r>
+                  <a:rPr lang="en-US" sz="1600" dirty="0">
+                    <a:latin typeface="Cambria" panose="02040503050406030204" pitchFamily="18" charset="0"/>
+                    <a:ea typeface="Cambria" panose="02040503050406030204" pitchFamily="18" charset="0"/>
+                  </a:rPr>
+                  <a:t>Publish instruction</a:t>
+                </a:r>
+                <a:endParaRPr lang="fr-FR" sz="1600" dirty="0">
+                  <a:latin typeface="Cambria" panose="02040503050406030204" pitchFamily="18" charset="0"/>
+                  <a:ea typeface="Cambria" panose="02040503050406030204" pitchFamily="18" charset="0"/>
+                </a:endParaRPr>
+              </a:p>
+            </p:txBody>
+          </p:sp>
+          <p:sp>
+            <p:nvSpPr>
+              <p:cNvPr id="28" name="Flowchart: Off-page Connector 27">
+                <a:extLst>
+                  <a:ext uri="{FF2B5EF4-FFF2-40B4-BE49-F238E27FC236}">
+                    <a16:creationId xmlns:a16="http://schemas.microsoft.com/office/drawing/2014/main" id="{4B1CE382-AE53-6681-24E2-E798118BB02A}"/>
+                  </a:ext>
+                </a:extLst>
+              </p:cNvPr>
+              <p:cNvSpPr/>
+              <p:nvPr/>
+            </p:nvSpPr>
+            <p:spPr>
+              <a:xfrm>
+                <a:off x="7293384" y="1997110"/>
+                <a:ext cx="1800000" cy="900000"/>
+              </a:xfrm>
+              <a:prstGeom prst="flowChartOffpageConnector">
+                <a:avLst/>
+              </a:prstGeom>
+              <a:solidFill>
+                <a:schemeClr val="accent2">
+                  <a:lumMod val="20000"/>
+                  <a:lumOff val="80000"/>
+                </a:schemeClr>
+              </a:solidFill>
+              <a:ln>
+                <a:noFill/>
+              </a:ln>
+            </p:spPr>
+            <p:style>
+              <a:lnRef idx="2">
+                <a:schemeClr val="dk1"/>
+              </a:lnRef>
+              <a:fillRef idx="1">
+                <a:schemeClr val="lt1"/>
+              </a:fillRef>
+              <a:effectRef idx="0">
+                <a:schemeClr val="dk1"/>
+              </a:effectRef>
+              <a:fontRef idx="minor">
+                <a:schemeClr val="dk1"/>
+              </a:fontRef>
+            </p:style>
+            <p:txBody>
+              <a:bodyPr rtlCol="0" anchor="ctr"/>
+              <a:lstStyle/>
+              <a:p>
+                <a:pPr algn="ctr"/>
+                <a:r>
+                  <a:rPr lang="en-US" sz="1600" dirty="0">
+                    <a:latin typeface="Cambria" panose="02040503050406030204" pitchFamily="18" charset="0"/>
+                    <a:ea typeface="Cambria" panose="02040503050406030204" pitchFamily="18" charset="0"/>
+                  </a:rPr>
+                  <a:t>Receive instruction from computer</a:t>
+                </a:r>
+                <a:endParaRPr lang="fr-FR" sz="1600" dirty="0">
+                  <a:latin typeface="Cambria" panose="02040503050406030204" pitchFamily="18" charset="0"/>
+                  <a:ea typeface="Cambria" panose="02040503050406030204" pitchFamily="18" charset="0"/>
+                </a:endParaRPr>
+              </a:p>
+            </p:txBody>
+          </p:sp>
+        </p:grpSp>
+      </p:grpSp>
+      <p:grpSp>
+        <p:nvGrpSpPr>
+          <p:cNvPr id="42" name="Group 41">
             <a:extLst>
               <a:ext uri="{FF2B5EF4-FFF2-40B4-BE49-F238E27FC236}">
-                <a16:creationId xmlns:a16="http://schemas.microsoft.com/office/drawing/2014/main" id="{39E94A4C-2B54-2F14-BE11-E2B0E4E13873}"/>
+                <a16:creationId xmlns:a16="http://schemas.microsoft.com/office/drawing/2014/main" id="{0D4BB994-FDE9-ADB7-C95F-407F686CE420}"/>
               </a:ext>
             </a:extLst>
           </p:cNvPr>
-          <p:cNvPicPr>
-            <a:picLocks noChangeAspect="1"/>
-          </p:cNvPicPr>
+          <p:cNvGrpSpPr/>
           <p:nvPr/>
-        </p:nvPicPr>
-        <p:blipFill>
-          <a:blip r:embed="rId5">
-            <a:extLst>
-              <a:ext uri="{28A0092B-C50C-407E-A947-70E740481C1C}">
-                <a14:useLocalDpi xmlns:a14="http://schemas.microsoft.com/office/drawing/2010/main" val="0"/>
-              </a:ext>
-              <a:ext uri="{96DAC541-7B7A-43D3-8B79-37D633B846F1}">
-                <asvg:svgBlip xmlns:asvg="http://schemas.microsoft.com/office/drawing/2016/SVG/main" r:embed="rId6"/>
-              </a:ext>
-            </a:extLst>
-          </a:blip>
-          <a:stretch>
-            <a:fillRect/>
-          </a:stretch>
-        </p:blipFill>
-        <p:spPr>
+        </p:nvGrpSpPr>
+        <p:grpSpPr>
           <a:xfrm>
-            <a:off x="3995317" y="4465978"/>
-            <a:ext cx="1515576" cy="1515576"/>
+            <a:off x="5251785" y="1453461"/>
+            <a:ext cx="1800001" cy="3246181"/>
+            <a:chOff x="5015586" y="1097110"/>
+            <a:chExt cx="1800001" cy="3246181"/>
           </a:xfrm>
-          <a:prstGeom prst="rect">
-            <a:avLst/>
-          </a:prstGeom>
-        </p:spPr>
-      </p:pic>
-      <p:pic>
-        <p:nvPicPr>
-          <p:cNvPr id="17" name="Graphique 16" descr="Webcam avec un remplissage uni">
+        </p:grpSpPr>
+        <p:pic>
+          <p:nvPicPr>
+            <p:cNvPr id="19" name="Graphique 18" descr="Ordinateur avec un remplissage uni">
+              <a:extLst>
+                <a:ext uri="{FF2B5EF4-FFF2-40B4-BE49-F238E27FC236}">
+                  <a16:creationId xmlns:a16="http://schemas.microsoft.com/office/drawing/2014/main" id="{22F3FCBA-4825-C11A-818E-6B0A6A962A26}"/>
+                </a:ext>
+              </a:extLst>
+            </p:cNvPr>
+            <p:cNvPicPr>
+              <a:picLocks noChangeAspect="1"/>
+            </p:cNvPicPr>
+            <p:nvPr/>
+          </p:nvPicPr>
+          <p:blipFill>
+            <a:blip r:embed="rId6">
+              <a:extLst>
+                <a:ext uri="{28A0092B-C50C-407E-A947-70E740481C1C}">
+                  <a14:useLocalDpi xmlns:a14="http://schemas.microsoft.com/office/drawing/2010/main" val="0"/>
+                </a:ext>
+                <a:ext uri="{96DAC541-7B7A-43D3-8B79-37D633B846F1}">
+                  <asvg:svgBlip xmlns:asvg="http://schemas.microsoft.com/office/drawing/2016/SVG/main" r:embed="rId7"/>
+                </a:ext>
+              </a:extLst>
+            </a:blip>
+            <a:stretch>
+              <a:fillRect/>
+            </a:stretch>
+          </p:blipFill>
+          <p:spPr>
+            <a:xfrm>
+              <a:off x="5465586" y="1097110"/>
+              <a:ext cx="900000" cy="900000"/>
+            </a:xfrm>
+            <a:prstGeom prst="rect">
+              <a:avLst/>
+            </a:prstGeom>
+          </p:spPr>
+        </p:pic>
+        <p:grpSp>
+          <p:nvGrpSpPr>
+            <p:cNvPr id="36" name="Group 35">
+              <a:extLst>
+                <a:ext uri="{FF2B5EF4-FFF2-40B4-BE49-F238E27FC236}">
+                  <a16:creationId xmlns:a16="http://schemas.microsoft.com/office/drawing/2014/main" id="{CAC4E735-5C0C-3193-B8D8-074FCA56090A}"/>
+                </a:ext>
+              </a:extLst>
+            </p:cNvPr>
+            <p:cNvGrpSpPr/>
+            <p:nvPr/>
+          </p:nvGrpSpPr>
+          <p:grpSpPr>
+            <a:xfrm>
+              <a:off x="5015586" y="1997110"/>
+              <a:ext cx="1800001" cy="2346181"/>
+              <a:chOff x="5015586" y="1997110"/>
+              <a:chExt cx="1800001" cy="2346181"/>
+            </a:xfrm>
+          </p:grpSpPr>
+          <p:sp>
+            <p:nvSpPr>
+              <p:cNvPr id="25" name="Rectangle 24">
+                <a:extLst>
+                  <a:ext uri="{FF2B5EF4-FFF2-40B4-BE49-F238E27FC236}">
+                    <a16:creationId xmlns:a16="http://schemas.microsoft.com/office/drawing/2014/main" id="{53E2929C-0C7C-9AB5-D9EF-1AD813CB55D2}"/>
+                  </a:ext>
+                </a:extLst>
+              </p:cNvPr>
+              <p:cNvSpPr/>
+              <p:nvPr/>
+            </p:nvSpPr>
+            <p:spPr>
+              <a:xfrm>
+                <a:off x="5015587" y="3443291"/>
+                <a:ext cx="1800000" cy="900000"/>
+              </a:xfrm>
+              <a:prstGeom prst="rect">
+                <a:avLst/>
+              </a:prstGeom>
+              <a:solidFill>
+                <a:schemeClr val="accent2">
+                  <a:lumMod val="60000"/>
+                  <a:lumOff val="40000"/>
+                </a:schemeClr>
+              </a:solidFill>
+              <a:ln>
+                <a:noFill/>
+              </a:ln>
+            </p:spPr>
+            <p:style>
+              <a:lnRef idx="2">
+                <a:schemeClr val="dk1"/>
+              </a:lnRef>
+              <a:fillRef idx="1">
+                <a:schemeClr val="lt1"/>
+              </a:fillRef>
+              <a:effectRef idx="0">
+                <a:schemeClr val="dk1"/>
+              </a:effectRef>
+              <a:fontRef idx="minor">
+                <a:schemeClr val="dk1"/>
+              </a:fontRef>
+            </p:style>
+            <p:txBody>
+              <a:bodyPr rtlCol="0" anchor="ctr"/>
+              <a:lstStyle/>
+              <a:p>
+                <a:pPr algn="ctr"/>
+                <a:endParaRPr lang="en-US" sz="1600" dirty="0">
+                  <a:latin typeface="Cambria" panose="02040503050406030204" pitchFamily="18" charset="0"/>
+                  <a:ea typeface="Cambria" panose="02040503050406030204" pitchFamily="18" charset="0"/>
+                </a:endParaRPr>
+              </a:p>
+              <a:p>
+                <a:pPr algn="ctr"/>
+                <a:r>
+                  <a:rPr lang="en-US" sz="1600" dirty="0">
+                    <a:latin typeface="Cambria" panose="02040503050406030204" pitchFamily="18" charset="0"/>
+                    <a:ea typeface="Cambria" panose="02040503050406030204" pitchFamily="18" charset="0"/>
+                  </a:rPr>
+                  <a:t>Send instruction to MQTT server</a:t>
+                </a:r>
+                <a:endParaRPr lang="fr-FR" sz="1600" dirty="0">
+                  <a:latin typeface="Cambria" panose="02040503050406030204" pitchFamily="18" charset="0"/>
+                  <a:ea typeface="Cambria" panose="02040503050406030204" pitchFamily="18" charset="0"/>
+                </a:endParaRPr>
+              </a:p>
+            </p:txBody>
+          </p:sp>
+          <p:sp>
+            <p:nvSpPr>
+              <p:cNvPr id="24" name="Flowchart: Off-page Connector 23">
+                <a:extLst>
+                  <a:ext uri="{FF2B5EF4-FFF2-40B4-BE49-F238E27FC236}">
+                    <a16:creationId xmlns:a16="http://schemas.microsoft.com/office/drawing/2014/main" id="{03190A97-7354-A01D-3A50-97EA6E6ED4CD}"/>
+                  </a:ext>
+                </a:extLst>
+              </p:cNvPr>
+              <p:cNvSpPr/>
+              <p:nvPr/>
+            </p:nvSpPr>
+            <p:spPr>
+              <a:xfrm>
+                <a:off x="5015586" y="2725269"/>
+                <a:ext cx="1800000" cy="900000"/>
+              </a:xfrm>
+              <a:prstGeom prst="flowChartOffpageConnector">
+                <a:avLst/>
+              </a:prstGeom>
+              <a:solidFill>
+                <a:schemeClr val="accent2">
+                  <a:lumMod val="40000"/>
+                  <a:lumOff val="60000"/>
+                </a:schemeClr>
+              </a:solidFill>
+              <a:ln>
+                <a:noFill/>
+              </a:ln>
+            </p:spPr>
+            <p:style>
+              <a:lnRef idx="2">
+                <a:schemeClr val="dk1"/>
+              </a:lnRef>
+              <a:fillRef idx="1">
+                <a:schemeClr val="lt1"/>
+              </a:fillRef>
+              <a:effectRef idx="0">
+                <a:schemeClr val="dk1"/>
+              </a:effectRef>
+              <a:fontRef idx="minor">
+                <a:schemeClr val="dk1"/>
+              </a:fontRef>
+            </p:style>
+            <p:txBody>
+              <a:bodyPr rtlCol="0" anchor="ctr"/>
+              <a:lstStyle/>
+              <a:p>
+                <a:pPr algn="ctr"/>
+                <a:endParaRPr lang="en-US" sz="1600" dirty="0">
+                  <a:latin typeface="Cambria" panose="02040503050406030204" pitchFamily="18" charset="0"/>
+                  <a:ea typeface="Cambria" panose="02040503050406030204" pitchFamily="18" charset="0"/>
+                </a:endParaRPr>
+              </a:p>
+              <a:p>
+                <a:pPr algn="ctr"/>
+                <a:r>
+                  <a:rPr lang="en-US" sz="1600" dirty="0">
+                    <a:latin typeface="Cambria" panose="02040503050406030204" pitchFamily="18" charset="0"/>
+                    <a:ea typeface="Cambria" panose="02040503050406030204" pitchFamily="18" charset="0"/>
+                  </a:rPr>
+                  <a:t>Recognize hand sign</a:t>
+                </a:r>
+                <a:endParaRPr lang="fr-FR" sz="1600" dirty="0">
+                  <a:latin typeface="Cambria" panose="02040503050406030204" pitchFamily="18" charset="0"/>
+                  <a:ea typeface="Cambria" panose="02040503050406030204" pitchFamily="18" charset="0"/>
+                </a:endParaRPr>
+              </a:p>
+            </p:txBody>
+          </p:sp>
+          <p:sp>
+            <p:nvSpPr>
+              <p:cNvPr id="23" name="Flowchart: Off-page Connector 22">
+                <a:extLst>
+                  <a:ext uri="{FF2B5EF4-FFF2-40B4-BE49-F238E27FC236}">
+                    <a16:creationId xmlns:a16="http://schemas.microsoft.com/office/drawing/2014/main" id="{5E86563B-D5EA-7C16-6FC2-D4D76032F9C8}"/>
+                  </a:ext>
+                </a:extLst>
+              </p:cNvPr>
+              <p:cNvSpPr/>
+              <p:nvPr/>
+            </p:nvSpPr>
+            <p:spPr>
+              <a:xfrm>
+                <a:off x="5015586" y="1997110"/>
+                <a:ext cx="1800000" cy="900000"/>
+              </a:xfrm>
+              <a:prstGeom prst="flowChartOffpageConnector">
+                <a:avLst/>
+              </a:prstGeom>
+              <a:solidFill>
+                <a:schemeClr val="accent2">
+                  <a:lumMod val="20000"/>
+                  <a:lumOff val="80000"/>
+                </a:schemeClr>
+              </a:solidFill>
+              <a:ln>
+                <a:noFill/>
+              </a:ln>
+            </p:spPr>
+            <p:style>
+              <a:lnRef idx="2">
+                <a:schemeClr val="dk1"/>
+              </a:lnRef>
+              <a:fillRef idx="1">
+                <a:schemeClr val="lt1"/>
+              </a:fillRef>
+              <a:effectRef idx="0">
+                <a:schemeClr val="dk1"/>
+              </a:effectRef>
+              <a:fontRef idx="minor">
+                <a:schemeClr val="dk1"/>
+              </a:fontRef>
+            </p:style>
+            <p:txBody>
+              <a:bodyPr rtlCol="0" anchor="ctr"/>
+              <a:lstStyle/>
+              <a:p>
+                <a:pPr algn="ctr"/>
+                <a:r>
+                  <a:rPr lang="en-US" sz="1600" dirty="0">
+                    <a:latin typeface="Cambria" panose="02040503050406030204" pitchFamily="18" charset="0"/>
+                    <a:ea typeface="Cambria" panose="02040503050406030204" pitchFamily="18" charset="0"/>
+                  </a:rPr>
+                  <a:t>Detect hand</a:t>
+                </a:r>
+                <a:endParaRPr lang="fr-FR" sz="1600" dirty="0">
+                  <a:latin typeface="Cambria" panose="02040503050406030204" pitchFamily="18" charset="0"/>
+                  <a:ea typeface="Cambria" panose="02040503050406030204" pitchFamily="18" charset="0"/>
+                </a:endParaRPr>
+              </a:p>
+            </p:txBody>
+          </p:sp>
+        </p:grpSp>
+      </p:grpSp>
+      <p:grpSp>
+        <p:nvGrpSpPr>
+          <p:cNvPr id="44" name="Group 43">
             <a:extLst>
               <a:ext uri="{FF2B5EF4-FFF2-40B4-BE49-F238E27FC236}">
-                <a16:creationId xmlns:a16="http://schemas.microsoft.com/office/drawing/2014/main" id="{71590CFB-EDE0-AC8A-D089-DF6B9215304D}"/>
+                <a16:creationId xmlns:a16="http://schemas.microsoft.com/office/drawing/2014/main" id="{43FA4867-C48C-AE80-254A-EE59A12C9E7A}"/>
               </a:ext>
             </a:extLst>
           </p:cNvPr>
-          <p:cNvPicPr>
-            <a:picLocks noChangeAspect="1"/>
-          </p:cNvPicPr>
+          <p:cNvGrpSpPr/>
           <p:nvPr/>
-        </p:nvPicPr>
-        <p:blipFill>
-          <a:blip r:embed="rId7">
-            <a:extLst>
-              <a:ext uri="{28A0092B-C50C-407E-A947-70E740481C1C}">
-                <a14:useLocalDpi xmlns:a14="http://schemas.microsoft.com/office/drawing/2010/main" val="0"/>
-              </a:ext>
-              <a:ext uri="{96DAC541-7B7A-43D3-8B79-37D633B846F1}">
-                <asvg:svgBlip xmlns:asvg="http://schemas.microsoft.com/office/drawing/2016/SVG/main" r:embed="rId8"/>
-              </a:ext>
-            </a:extLst>
-          </a:blip>
-          <a:stretch>
-            <a:fillRect/>
-          </a:stretch>
-        </p:blipFill>
-        <p:spPr>
+        </p:nvGrpSpPr>
+        <p:grpSpPr>
           <a:xfrm>
-            <a:off x="2532976" y="1863261"/>
-            <a:ext cx="914400" cy="914400"/>
+            <a:off x="658871" y="1453461"/>
+            <a:ext cx="1800000" cy="4840879"/>
+            <a:chOff x="658871" y="1097110"/>
+            <a:chExt cx="1800000" cy="4840879"/>
           </a:xfrm>
-          <a:prstGeom prst="rect">
-            <a:avLst/>
-          </a:prstGeom>
-        </p:spPr>
-      </p:pic>
-      <p:pic>
-        <p:nvPicPr>
-          <p:cNvPr id="19" name="Graphique 18" descr="Ordinateur avec un remplissage uni">
+        </p:grpSpPr>
+        <p:pic>
+          <p:nvPicPr>
+            <p:cNvPr id="5" name="Image 4" descr="Un jeune mentonnier lève le petit doigt">
+              <a:extLst>
+                <a:ext uri="{FF2B5EF4-FFF2-40B4-BE49-F238E27FC236}">
+                  <a16:creationId xmlns:a16="http://schemas.microsoft.com/office/drawing/2014/main" id="{6369174D-BF19-2381-C16A-5AA781F14427}"/>
+                </a:ext>
+              </a:extLst>
+            </p:cNvPr>
+            <p:cNvPicPr>
+              <a:picLocks noChangeAspect="1"/>
+            </p:cNvPicPr>
+            <p:nvPr/>
+          </p:nvPicPr>
+          <p:blipFill>
+            <a:blip r:embed="rId8">
+              <a:extLst>
+                <a:ext uri="{28A0092B-C50C-407E-A947-70E740481C1C}">
+                  <a14:useLocalDpi xmlns:a14="http://schemas.microsoft.com/office/drawing/2010/main" val="0"/>
+                </a:ext>
+              </a:extLst>
+            </a:blip>
+            <a:stretch>
+              <a:fillRect/>
+            </a:stretch>
+          </p:blipFill>
+          <p:spPr>
+            <a:xfrm>
+              <a:off x="1068381" y="2803151"/>
+              <a:ext cx="980980" cy="3134838"/>
+            </a:xfrm>
+            <a:prstGeom prst="rect">
+              <a:avLst/>
+            </a:prstGeom>
+          </p:spPr>
+        </p:pic>
+        <p:sp>
+          <p:nvSpPr>
+            <p:cNvPr id="33" name="Rectangle 32">
+              <a:extLst>
+                <a:ext uri="{FF2B5EF4-FFF2-40B4-BE49-F238E27FC236}">
+                  <a16:creationId xmlns:a16="http://schemas.microsoft.com/office/drawing/2014/main" id="{AA7E1676-3DA9-8D6C-414A-50B0E109BF5F}"/>
+                </a:ext>
+              </a:extLst>
+            </p:cNvPr>
+            <p:cNvSpPr/>
+            <p:nvPr/>
+          </p:nvSpPr>
+          <p:spPr>
+            <a:xfrm>
+              <a:off x="658871" y="1994969"/>
+              <a:ext cx="1800000" cy="720000"/>
+            </a:xfrm>
+            <a:prstGeom prst="rect">
+              <a:avLst/>
+            </a:prstGeom>
+            <a:solidFill>
+              <a:schemeClr val="accent2">
+                <a:lumMod val="20000"/>
+                <a:lumOff val="80000"/>
+              </a:schemeClr>
+            </a:solidFill>
+            <a:ln>
+              <a:noFill/>
+            </a:ln>
+          </p:spPr>
+          <p:style>
+            <a:lnRef idx="2">
+              <a:schemeClr val="dk1"/>
+            </a:lnRef>
+            <a:fillRef idx="1">
+              <a:schemeClr val="lt1"/>
+            </a:fillRef>
+            <a:effectRef idx="0">
+              <a:schemeClr val="dk1"/>
+            </a:effectRef>
+            <a:fontRef idx="minor">
+              <a:schemeClr val="dk1"/>
+            </a:fontRef>
+          </p:style>
+          <p:txBody>
+            <a:bodyPr rtlCol="0" anchor="ctr"/>
+            <a:lstStyle/>
+            <a:p>
+              <a:pPr algn="ctr"/>
+              <a:r>
+                <a:rPr lang="en-US" sz="1600" dirty="0">
+                  <a:latin typeface="Cambria" panose="02040503050406030204" pitchFamily="18" charset="0"/>
+                  <a:ea typeface="Cambria" panose="02040503050406030204" pitchFamily="18" charset="0"/>
+                </a:rPr>
+                <a:t>Give instruction with hand signs</a:t>
+              </a:r>
+              <a:endParaRPr lang="fr-FR" sz="1600" dirty="0">
+                <a:latin typeface="Cambria" panose="02040503050406030204" pitchFamily="18" charset="0"/>
+                <a:ea typeface="Cambria" panose="02040503050406030204" pitchFamily="18" charset="0"/>
+              </a:endParaRPr>
+            </a:p>
+          </p:txBody>
+        </p:sp>
+        <p:pic>
+          <p:nvPicPr>
+            <p:cNvPr id="22" name="Graphic 21" descr="Hang Loose Hand Gesture with solid fill">
+              <a:extLst>
+                <a:ext uri="{FF2B5EF4-FFF2-40B4-BE49-F238E27FC236}">
+                  <a16:creationId xmlns:a16="http://schemas.microsoft.com/office/drawing/2014/main" id="{EFA74D91-E152-4B58-C989-2D3EE4C1208C}"/>
+                </a:ext>
+              </a:extLst>
+            </p:cNvPr>
+            <p:cNvPicPr>
+              <a:picLocks noChangeAspect="1"/>
+            </p:cNvPicPr>
+            <p:nvPr/>
+          </p:nvPicPr>
+          <p:blipFill>
+            <a:blip r:embed="rId9">
+              <a:extLst>
+                <a:ext uri="{28A0092B-C50C-407E-A947-70E740481C1C}">
+                  <a14:useLocalDpi xmlns:a14="http://schemas.microsoft.com/office/drawing/2010/main" val="0"/>
+                </a:ext>
+                <a:ext uri="{96DAC541-7B7A-43D3-8B79-37D633B846F1}">
+                  <asvg:svgBlip xmlns:asvg="http://schemas.microsoft.com/office/drawing/2016/SVG/main" r:embed="rId10"/>
+                </a:ext>
+              </a:extLst>
+            </a:blip>
+            <a:stretch>
+              <a:fillRect/>
+            </a:stretch>
+          </p:blipFill>
+          <p:spPr>
+            <a:xfrm>
+              <a:off x="1108871" y="1097110"/>
+              <a:ext cx="900000" cy="900000"/>
+            </a:xfrm>
+            <a:prstGeom prst="rect">
+              <a:avLst/>
+            </a:prstGeom>
+          </p:spPr>
+        </p:pic>
+      </p:grpSp>
+      <p:grpSp>
+        <p:nvGrpSpPr>
+          <p:cNvPr id="40" name="Group 39">
             <a:extLst>
               <a:ext uri="{FF2B5EF4-FFF2-40B4-BE49-F238E27FC236}">
-                <a16:creationId xmlns:a16="http://schemas.microsoft.com/office/drawing/2014/main" id="{22F3FCBA-4825-C11A-818E-6B0A6A962A26}"/>
+                <a16:creationId xmlns:a16="http://schemas.microsoft.com/office/drawing/2014/main" id="{559D5785-7969-47DA-AB26-D67EB91BAAFC}"/>
               </a:ext>
             </a:extLst>
           </p:cNvPr>
-          <p:cNvPicPr>
-            <a:picLocks noChangeAspect="1"/>
-          </p:cNvPicPr>
+          <p:cNvGrpSpPr/>
           <p:nvPr/>
-        </p:nvPicPr>
-        <p:blipFill>
-          <a:blip r:embed="rId9">
-            <a:extLst>
-              <a:ext uri="{28A0092B-C50C-407E-A947-70E740481C1C}">
-                <a14:useLocalDpi xmlns:a14="http://schemas.microsoft.com/office/drawing/2010/main" val="0"/>
-              </a:ext>
-              <a:ext uri="{96DAC541-7B7A-43D3-8B79-37D633B846F1}">
-                <asvg:svgBlip xmlns:asvg="http://schemas.microsoft.com/office/drawing/2016/SVG/main" r:embed="rId10"/>
-              </a:ext>
-            </a:extLst>
-          </a:blip>
-          <a:stretch>
-            <a:fillRect/>
-          </a:stretch>
-        </p:blipFill>
-        <p:spPr>
+        </p:nvGrpSpPr>
+        <p:grpSpPr>
           <a:xfrm>
-            <a:off x="5695838" y="1321872"/>
-            <a:ext cx="990807" cy="990807"/>
+            <a:off x="9844700" y="1453461"/>
+            <a:ext cx="1800000" cy="3231890"/>
+            <a:chOff x="9844700" y="1097110"/>
+            <a:chExt cx="1800000" cy="3231890"/>
           </a:xfrm>
-          <a:prstGeom prst="rect">
-            <a:avLst/>
-          </a:prstGeom>
-        </p:spPr>
-      </p:pic>
-      <p:sp>
-        <p:nvSpPr>
-          <p:cNvPr id="20" name="Rectangle 19">
-            <a:extLst>
-              <a:ext uri="{FF2B5EF4-FFF2-40B4-BE49-F238E27FC236}">
-                <a16:creationId xmlns:a16="http://schemas.microsoft.com/office/drawing/2014/main" id="{E3A3DD2E-686F-0C8F-3A8A-C337957D9D68}"/>
-              </a:ext>
-            </a:extLst>
-          </p:cNvPr>
-          <p:cNvSpPr/>
-          <p:nvPr/>
-        </p:nvSpPr>
-        <p:spPr>
-          <a:xfrm>
-            <a:off x="2192269" y="2699546"/>
-            <a:ext cx="1612836" cy="629512"/>
-          </a:xfrm>
-          <a:prstGeom prst="rect">
-            <a:avLst/>
-          </a:prstGeom>
-        </p:spPr>
-        <p:style>
-          <a:lnRef idx="2">
-            <a:schemeClr val="dk1"/>
-          </a:lnRef>
-          <a:fillRef idx="1">
-            <a:schemeClr val="lt1"/>
-          </a:fillRef>
-          <a:effectRef idx="0">
-            <a:schemeClr val="dk1"/>
-          </a:effectRef>
-          <a:fontRef idx="minor">
-            <a:schemeClr val="dk1"/>
-          </a:fontRef>
-        </p:style>
-        <p:txBody>
-          <a:bodyPr rtlCol="0" anchor="ctr"/>
-          <a:lstStyle/>
-          <a:p>
-            <a:pPr algn="ctr"/>
-            <a:r>
-              <a:rPr lang="en-US" dirty="0"/>
-              <a:t>Capture images</a:t>
-            </a:r>
-            <a:endParaRPr lang="fr-FR" dirty="0"/>
-          </a:p>
-        </p:txBody>
-      </p:sp>
-      <p:sp>
-        <p:nvSpPr>
-          <p:cNvPr id="23" name="Rectangle 22">
-            <a:extLst>
-              <a:ext uri="{FF2B5EF4-FFF2-40B4-BE49-F238E27FC236}">
-                <a16:creationId xmlns:a16="http://schemas.microsoft.com/office/drawing/2014/main" id="{5E86563B-D5EA-7C16-6FC2-D4D76032F9C8}"/>
-              </a:ext>
-            </a:extLst>
-          </p:cNvPr>
-          <p:cNvSpPr/>
-          <p:nvPr/>
-        </p:nvSpPr>
-        <p:spPr>
-          <a:xfrm>
-            <a:off x="4381967" y="2399657"/>
-            <a:ext cx="1612836" cy="629512"/>
-          </a:xfrm>
-          <a:prstGeom prst="rect">
-            <a:avLst/>
-          </a:prstGeom>
-        </p:spPr>
-        <p:style>
-          <a:lnRef idx="2">
-            <a:schemeClr val="dk1"/>
-          </a:lnRef>
-          <a:fillRef idx="1">
-            <a:schemeClr val="lt1"/>
-          </a:fillRef>
-          <a:effectRef idx="0">
-            <a:schemeClr val="dk1"/>
-          </a:effectRef>
-          <a:fontRef idx="minor">
-            <a:schemeClr val="dk1"/>
-          </a:fontRef>
-        </p:style>
-        <p:txBody>
-          <a:bodyPr rtlCol="0" anchor="ctr"/>
-          <a:lstStyle/>
-          <a:p>
-            <a:pPr algn="ctr"/>
-            <a:r>
-              <a:rPr lang="en-US" dirty="0"/>
-              <a:t>Detect hand</a:t>
-            </a:r>
-            <a:endParaRPr lang="fr-FR" dirty="0"/>
-          </a:p>
-        </p:txBody>
-      </p:sp>
-      <p:sp>
-        <p:nvSpPr>
-          <p:cNvPr id="24" name="Rectangle 23">
-            <a:extLst>
-              <a:ext uri="{FF2B5EF4-FFF2-40B4-BE49-F238E27FC236}">
-                <a16:creationId xmlns:a16="http://schemas.microsoft.com/office/drawing/2014/main" id="{03190A97-7354-A01D-3A50-97EA6E6ED4CD}"/>
-              </a:ext>
-            </a:extLst>
-          </p:cNvPr>
-          <p:cNvSpPr/>
-          <p:nvPr/>
-        </p:nvSpPr>
-        <p:spPr>
-          <a:xfrm>
-            <a:off x="6291100" y="2384790"/>
-            <a:ext cx="1612836" cy="629512"/>
-          </a:xfrm>
-          <a:prstGeom prst="rect">
-            <a:avLst/>
-          </a:prstGeom>
-        </p:spPr>
-        <p:style>
-          <a:lnRef idx="2">
-            <a:schemeClr val="dk1"/>
-          </a:lnRef>
-          <a:fillRef idx="1">
-            <a:schemeClr val="lt1"/>
-          </a:fillRef>
-          <a:effectRef idx="0">
-            <a:schemeClr val="dk1"/>
-          </a:effectRef>
-          <a:fontRef idx="minor">
-            <a:schemeClr val="dk1"/>
-          </a:fontRef>
-        </p:style>
-        <p:txBody>
-          <a:bodyPr rtlCol="0" anchor="ctr"/>
-          <a:lstStyle/>
-          <a:p>
-            <a:pPr algn="ctr"/>
-            <a:r>
-              <a:rPr lang="en-US" dirty="0"/>
-              <a:t>Recognize hand sign</a:t>
-            </a:r>
-            <a:endParaRPr lang="fr-FR" dirty="0"/>
-          </a:p>
-        </p:txBody>
-      </p:sp>
-      <p:sp>
-        <p:nvSpPr>
-          <p:cNvPr id="25" name="Rectangle 24">
-            <a:extLst>
-              <a:ext uri="{FF2B5EF4-FFF2-40B4-BE49-F238E27FC236}">
-                <a16:creationId xmlns:a16="http://schemas.microsoft.com/office/drawing/2014/main" id="{53E2929C-0C7C-9AB5-D9EF-1AD813CB55D2}"/>
-              </a:ext>
-            </a:extLst>
-          </p:cNvPr>
-          <p:cNvSpPr/>
-          <p:nvPr/>
-        </p:nvSpPr>
-        <p:spPr>
-          <a:xfrm>
-            <a:off x="5218125" y="3297655"/>
-            <a:ext cx="1654192" cy="949428"/>
-          </a:xfrm>
-          <a:prstGeom prst="rect">
-            <a:avLst/>
-          </a:prstGeom>
-        </p:spPr>
-        <p:style>
-          <a:lnRef idx="2">
-            <a:schemeClr val="dk1"/>
-          </a:lnRef>
-          <a:fillRef idx="1">
-            <a:schemeClr val="lt1"/>
-          </a:fillRef>
-          <a:effectRef idx="0">
-            <a:schemeClr val="dk1"/>
-          </a:effectRef>
-          <a:fontRef idx="minor">
-            <a:schemeClr val="dk1"/>
-          </a:fontRef>
-        </p:style>
-        <p:txBody>
-          <a:bodyPr rtlCol="0" anchor="ctr"/>
-          <a:lstStyle/>
-          <a:p>
-            <a:pPr algn="ctr"/>
-            <a:r>
-              <a:rPr lang="en-US" dirty="0"/>
-              <a:t>Send instruction to MQTT server</a:t>
-            </a:r>
-            <a:endParaRPr lang="fr-FR" dirty="0"/>
-          </a:p>
-        </p:txBody>
-      </p:sp>
-      <p:sp>
-        <p:nvSpPr>
-          <p:cNvPr id="28" name="Rectangle 27">
-            <a:extLst>
-              <a:ext uri="{FF2B5EF4-FFF2-40B4-BE49-F238E27FC236}">
-                <a16:creationId xmlns:a16="http://schemas.microsoft.com/office/drawing/2014/main" id="{4B1CE382-AE53-6681-24E2-E798118BB02A}"/>
-              </a:ext>
-            </a:extLst>
-          </p:cNvPr>
-          <p:cNvSpPr/>
-          <p:nvPr/>
-        </p:nvSpPr>
-        <p:spPr>
-          <a:xfrm>
-            <a:off x="8325132" y="3879408"/>
-            <a:ext cx="1886355" cy="1004562"/>
-          </a:xfrm>
-          <a:prstGeom prst="rect">
-            <a:avLst/>
-          </a:prstGeom>
-        </p:spPr>
-        <p:style>
-          <a:lnRef idx="2">
-            <a:schemeClr val="dk1"/>
-          </a:lnRef>
-          <a:fillRef idx="1">
-            <a:schemeClr val="lt1"/>
-          </a:fillRef>
-          <a:effectRef idx="0">
-            <a:schemeClr val="dk1"/>
-          </a:effectRef>
-          <a:fontRef idx="minor">
-            <a:schemeClr val="dk1"/>
-          </a:fontRef>
-        </p:style>
-        <p:txBody>
-          <a:bodyPr rtlCol="0" anchor="ctr"/>
-          <a:lstStyle/>
-          <a:p>
-            <a:pPr algn="ctr"/>
-            <a:r>
-              <a:rPr lang="en-US" dirty="0"/>
-              <a:t>Receive instruction from computer</a:t>
-            </a:r>
-            <a:endParaRPr lang="fr-FR" dirty="0"/>
-          </a:p>
-        </p:txBody>
-      </p:sp>
-      <p:sp>
-        <p:nvSpPr>
-          <p:cNvPr id="29" name="Rectangle 28">
-            <a:extLst>
-              <a:ext uri="{FF2B5EF4-FFF2-40B4-BE49-F238E27FC236}">
-                <a16:creationId xmlns:a16="http://schemas.microsoft.com/office/drawing/2014/main" id="{D37A9FA9-6751-EB66-685E-E50CDA00D452}"/>
-              </a:ext>
-            </a:extLst>
-          </p:cNvPr>
-          <p:cNvSpPr/>
-          <p:nvPr/>
-        </p:nvSpPr>
-        <p:spPr>
-          <a:xfrm>
-            <a:off x="8325132" y="5124335"/>
-            <a:ext cx="1872053" cy="1004562"/>
-          </a:xfrm>
-          <a:prstGeom prst="rect">
-            <a:avLst/>
-          </a:prstGeom>
-        </p:spPr>
-        <p:style>
-          <a:lnRef idx="2">
-            <a:schemeClr val="dk1"/>
-          </a:lnRef>
-          <a:fillRef idx="1">
-            <a:schemeClr val="lt1"/>
-          </a:fillRef>
-          <a:effectRef idx="0">
-            <a:schemeClr val="dk1"/>
-          </a:effectRef>
-          <a:fontRef idx="minor">
-            <a:schemeClr val="dk1"/>
-          </a:fontRef>
-        </p:style>
-        <p:txBody>
-          <a:bodyPr rtlCol="0" anchor="ctr"/>
-          <a:lstStyle/>
-          <a:p>
-            <a:pPr algn="ctr"/>
-            <a:r>
-              <a:rPr lang="en-US" dirty="0"/>
-              <a:t>Publish instruction to the subscribers</a:t>
-            </a:r>
-            <a:endParaRPr lang="fr-FR" dirty="0"/>
-          </a:p>
-        </p:txBody>
-      </p:sp>
-      <p:sp>
-        <p:nvSpPr>
-          <p:cNvPr id="31" name="Rectangle 30">
-            <a:extLst>
-              <a:ext uri="{FF2B5EF4-FFF2-40B4-BE49-F238E27FC236}">
-                <a16:creationId xmlns:a16="http://schemas.microsoft.com/office/drawing/2014/main" id="{03FA5EFB-93FB-FDFE-1430-733FC6BB9E5B}"/>
-              </a:ext>
-            </a:extLst>
-          </p:cNvPr>
-          <p:cNvSpPr/>
-          <p:nvPr/>
-        </p:nvSpPr>
-        <p:spPr>
-          <a:xfrm>
-            <a:off x="1949125" y="4708731"/>
-            <a:ext cx="1984264" cy="970496"/>
-          </a:xfrm>
-          <a:prstGeom prst="rect">
-            <a:avLst/>
-          </a:prstGeom>
-        </p:spPr>
-        <p:style>
-          <a:lnRef idx="2">
-            <a:schemeClr val="dk1"/>
-          </a:lnRef>
-          <a:fillRef idx="1">
-            <a:schemeClr val="lt1"/>
-          </a:fillRef>
-          <a:effectRef idx="0">
-            <a:schemeClr val="dk1"/>
-          </a:effectRef>
-          <a:fontRef idx="minor">
-            <a:schemeClr val="dk1"/>
-          </a:fontRef>
-        </p:style>
-        <p:txBody>
-          <a:bodyPr rtlCol="0" anchor="ctr"/>
-          <a:lstStyle/>
-          <a:p>
-            <a:pPr algn="ctr"/>
-            <a:r>
-              <a:rPr lang="en-US" dirty="0"/>
-              <a:t>Receive instruction from MQTT server</a:t>
-            </a:r>
-            <a:endParaRPr lang="fr-FR" dirty="0"/>
-          </a:p>
-        </p:txBody>
-      </p:sp>
-      <p:sp>
-        <p:nvSpPr>
-          <p:cNvPr id="32" name="Rectangle 31">
-            <a:extLst>
-              <a:ext uri="{FF2B5EF4-FFF2-40B4-BE49-F238E27FC236}">
-                <a16:creationId xmlns:a16="http://schemas.microsoft.com/office/drawing/2014/main" id="{33670C0C-9224-13A4-4C5C-9A8FB346A605}"/>
-              </a:ext>
-            </a:extLst>
-          </p:cNvPr>
-          <p:cNvSpPr/>
-          <p:nvPr/>
-        </p:nvSpPr>
-        <p:spPr>
-          <a:xfrm>
-            <a:off x="1949125" y="5794137"/>
-            <a:ext cx="1984264" cy="747386"/>
-          </a:xfrm>
-          <a:prstGeom prst="rect">
-            <a:avLst/>
-          </a:prstGeom>
-        </p:spPr>
-        <p:style>
-          <a:lnRef idx="2">
-            <a:schemeClr val="dk1"/>
-          </a:lnRef>
-          <a:fillRef idx="1">
-            <a:schemeClr val="lt1"/>
-          </a:fillRef>
-          <a:effectRef idx="0">
-            <a:schemeClr val="dk1"/>
-          </a:effectRef>
-          <a:fontRef idx="minor">
-            <a:schemeClr val="dk1"/>
-          </a:fontRef>
-        </p:style>
-        <p:txBody>
-          <a:bodyPr rtlCol="0" anchor="ctr"/>
-          <a:lstStyle/>
-          <a:p>
-            <a:pPr algn="ctr"/>
-            <a:r>
-              <a:rPr lang="en-US" dirty="0"/>
-              <a:t>Execute instruction</a:t>
-            </a:r>
-            <a:endParaRPr lang="fr-FR" dirty="0"/>
-          </a:p>
-        </p:txBody>
-      </p:sp>
-      <p:sp>
-        <p:nvSpPr>
-          <p:cNvPr id="33" name="Rectangle 32">
-            <a:extLst>
-              <a:ext uri="{FF2B5EF4-FFF2-40B4-BE49-F238E27FC236}">
-                <a16:creationId xmlns:a16="http://schemas.microsoft.com/office/drawing/2014/main" id="{AA7E1676-3DA9-8D6C-414A-50B0E109BF5F}"/>
-              </a:ext>
-            </a:extLst>
-          </p:cNvPr>
-          <p:cNvSpPr/>
-          <p:nvPr/>
-        </p:nvSpPr>
-        <p:spPr>
-          <a:xfrm>
-            <a:off x="93518" y="678687"/>
-            <a:ext cx="1709792" cy="762875"/>
-          </a:xfrm>
-          <a:prstGeom prst="rect">
-            <a:avLst/>
-          </a:prstGeom>
-        </p:spPr>
-        <p:style>
-          <a:lnRef idx="2">
-            <a:schemeClr val="dk1"/>
-          </a:lnRef>
-          <a:fillRef idx="1">
-            <a:schemeClr val="lt1"/>
-          </a:fillRef>
-          <a:effectRef idx="0">
-            <a:schemeClr val="dk1"/>
-          </a:effectRef>
-          <a:fontRef idx="minor">
-            <a:schemeClr val="dk1"/>
-          </a:fontRef>
-        </p:style>
-        <p:txBody>
-          <a:bodyPr rtlCol="0" anchor="ctr"/>
-          <a:lstStyle/>
-          <a:p>
-            <a:pPr algn="ctr"/>
-            <a:r>
-              <a:rPr lang="en-US" dirty="0"/>
-              <a:t>Give instruction with hand signs</a:t>
-            </a:r>
-            <a:endParaRPr lang="fr-FR" dirty="0"/>
-          </a:p>
-        </p:txBody>
-      </p:sp>
+        </p:grpSpPr>
+        <p:pic>
+          <p:nvPicPr>
+            <p:cNvPr id="15" name="Graphique 14" descr="Quadrirotor avec un remplissage uni">
+              <a:extLst>
+                <a:ext uri="{FF2B5EF4-FFF2-40B4-BE49-F238E27FC236}">
+                  <a16:creationId xmlns:a16="http://schemas.microsoft.com/office/drawing/2014/main" id="{39E94A4C-2B54-2F14-BE11-E2B0E4E13873}"/>
+                </a:ext>
+              </a:extLst>
+            </p:cNvPr>
+            <p:cNvPicPr>
+              <a:picLocks noChangeAspect="1"/>
+            </p:cNvPicPr>
+            <p:nvPr/>
+          </p:nvPicPr>
+          <p:blipFill>
+            <a:blip r:embed="rId11">
+              <a:extLst>
+                <a:ext uri="{28A0092B-C50C-407E-A947-70E740481C1C}">
+                  <a14:useLocalDpi xmlns:a14="http://schemas.microsoft.com/office/drawing/2010/main" val="0"/>
+                </a:ext>
+                <a:ext uri="{96DAC541-7B7A-43D3-8B79-37D633B846F1}">
+                  <asvg:svgBlip xmlns:asvg="http://schemas.microsoft.com/office/drawing/2016/SVG/main" r:embed="rId12"/>
+                </a:ext>
+              </a:extLst>
+            </a:blip>
+            <a:stretch>
+              <a:fillRect/>
+            </a:stretch>
+          </p:blipFill>
+          <p:spPr>
+            <a:xfrm>
+              <a:off x="10294700" y="1097110"/>
+              <a:ext cx="900000" cy="900000"/>
+            </a:xfrm>
+            <a:prstGeom prst="rect">
+              <a:avLst/>
+            </a:prstGeom>
+          </p:spPr>
+        </p:pic>
+        <p:grpSp>
+          <p:nvGrpSpPr>
+            <p:cNvPr id="39" name="Group 38">
+              <a:extLst>
+                <a:ext uri="{FF2B5EF4-FFF2-40B4-BE49-F238E27FC236}">
+                  <a16:creationId xmlns:a16="http://schemas.microsoft.com/office/drawing/2014/main" id="{CB58834D-639A-2D02-2E26-A9C305E576FB}"/>
+                </a:ext>
+              </a:extLst>
+            </p:cNvPr>
+            <p:cNvGrpSpPr/>
+            <p:nvPr/>
+          </p:nvGrpSpPr>
+          <p:grpSpPr>
+            <a:xfrm>
+              <a:off x="9844700" y="1997110"/>
+              <a:ext cx="1800000" cy="2331890"/>
+              <a:chOff x="9844700" y="1997110"/>
+              <a:chExt cx="1800000" cy="2331890"/>
+            </a:xfrm>
+          </p:grpSpPr>
+          <p:sp>
+            <p:nvSpPr>
+              <p:cNvPr id="32" name="Rectangle 31">
+                <a:extLst>
+                  <a:ext uri="{FF2B5EF4-FFF2-40B4-BE49-F238E27FC236}">
+                    <a16:creationId xmlns:a16="http://schemas.microsoft.com/office/drawing/2014/main" id="{33670C0C-9224-13A4-4C5C-9A8FB346A605}"/>
+                  </a:ext>
+                </a:extLst>
+              </p:cNvPr>
+              <p:cNvSpPr/>
+              <p:nvPr/>
+            </p:nvSpPr>
+            <p:spPr>
+              <a:xfrm>
+                <a:off x="9844700" y="3429000"/>
+                <a:ext cx="1800000" cy="900000"/>
+              </a:xfrm>
+              <a:prstGeom prst="rect">
+                <a:avLst/>
+              </a:prstGeom>
+              <a:solidFill>
+                <a:schemeClr val="accent2">
+                  <a:lumMod val="60000"/>
+                  <a:lumOff val="40000"/>
+                </a:schemeClr>
+              </a:solidFill>
+              <a:ln>
+                <a:noFill/>
+              </a:ln>
+            </p:spPr>
+            <p:style>
+              <a:lnRef idx="2">
+                <a:schemeClr val="dk1"/>
+              </a:lnRef>
+              <a:fillRef idx="1">
+                <a:schemeClr val="lt1"/>
+              </a:fillRef>
+              <a:effectRef idx="0">
+                <a:schemeClr val="dk1"/>
+              </a:effectRef>
+              <a:fontRef idx="minor">
+                <a:schemeClr val="dk1"/>
+              </a:fontRef>
+            </p:style>
+            <p:txBody>
+              <a:bodyPr rtlCol="0" anchor="ctr"/>
+              <a:lstStyle/>
+              <a:p>
+                <a:pPr algn="ctr"/>
+                <a:r>
+                  <a:rPr lang="en-US" sz="1600" dirty="0">
+                    <a:latin typeface="Cambria" panose="02040503050406030204" pitchFamily="18" charset="0"/>
+                    <a:ea typeface="Cambria" panose="02040503050406030204" pitchFamily="18" charset="0"/>
+                  </a:rPr>
+                  <a:t>Execute instruction</a:t>
+                </a:r>
+                <a:endParaRPr lang="fr-FR" sz="1600" dirty="0">
+                  <a:latin typeface="Cambria" panose="02040503050406030204" pitchFamily="18" charset="0"/>
+                  <a:ea typeface="Cambria" panose="02040503050406030204" pitchFamily="18" charset="0"/>
+                </a:endParaRPr>
+              </a:p>
+            </p:txBody>
+          </p:sp>
+          <p:sp>
+            <p:nvSpPr>
+              <p:cNvPr id="35" name="Flowchart: Off-page Connector 34">
+                <a:extLst>
+                  <a:ext uri="{FF2B5EF4-FFF2-40B4-BE49-F238E27FC236}">
+                    <a16:creationId xmlns:a16="http://schemas.microsoft.com/office/drawing/2014/main" id="{A1761186-FBC0-3438-17B6-C96857676355}"/>
+                  </a:ext>
+                </a:extLst>
+              </p:cNvPr>
+              <p:cNvSpPr/>
+              <p:nvPr/>
+            </p:nvSpPr>
+            <p:spPr>
+              <a:xfrm>
+                <a:off x="9844700" y="2709018"/>
+                <a:ext cx="1800000" cy="900000"/>
+              </a:xfrm>
+              <a:prstGeom prst="flowChartOffpageConnector">
+                <a:avLst/>
+              </a:prstGeom>
+              <a:solidFill>
+                <a:schemeClr val="accent2">
+                  <a:lumMod val="40000"/>
+                  <a:lumOff val="60000"/>
+                </a:schemeClr>
+              </a:solidFill>
+              <a:ln>
+                <a:noFill/>
+              </a:ln>
+            </p:spPr>
+            <p:style>
+              <a:lnRef idx="2">
+                <a:schemeClr val="dk1"/>
+              </a:lnRef>
+              <a:fillRef idx="1">
+                <a:schemeClr val="lt1"/>
+              </a:fillRef>
+              <a:effectRef idx="0">
+                <a:schemeClr val="dk1"/>
+              </a:effectRef>
+              <a:fontRef idx="minor">
+                <a:schemeClr val="dk1"/>
+              </a:fontRef>
+            </p:style>
+            <p:txBody>
+              <a:bodyPr rtlCol="0" anchor="ctr"/>
+              <a:lstStyle/>
+              <a:p>
+                <a:pPr algn="ctr"/>
+                <a:endParaRPr lang="en-US" sz="1600" dirty="0">
+                  <a:latin typeface="Cambria" panose="02040503050406030204" pitchFamily="18" charset="0"/>
+                  <a:ea typeface="Cambria" panose="02040503050406030204" pitchFamily="18" charset="0"/>
+                </a:endParaRPr>
+              </a:p>
+              <a:p>
+                <a:pPr algn="ctr"/>
+                <a:r>
+                  <a:rPr lang="en-US" sz="1600" dirty="0">
+                    <a:latin typeface="Cambria" panose="02040503050406030204" pitchFamily="18" charset="0"/>
+                    <a:ea typeface="Cambria" panose="02040503050406030204" pitchFamily="18" charset="0"/>
+                  </a:rPr>
+                  <a:t>Receive instruction</a:t>
+                </a:r>
+                <a:endParaRPr lang="fr-FR" sz="1600" dirty="0">
+                  <a:latin typeface="Cambria" panose="02040503050406030204" pitchFamily="18" charset="0"/>
+                  <a:ea typeface="Cambria" panose="02040503050406030204" pitchFamily="18" charset="0"/>
+                </a:endParaRPr>
+              </a:p>
+            </p:txBody>
+          </p:sp>
+          <p:sp>
+            <p:nvSpPr>
+              <p:cNvPr id="31" name="Flowchart: Off-page Connector 30">
+                <a:extLst>
+                  <a:ext uri="{FF2B5EF4-FFF2-40B4-BE49-F238E27FC236}">
+                    <a16:creationId xmlns:a16="http://schemas.microsoft.com/office/drawing/2014/main" id="{03FA5EFB-93FB-FDFE-1430-733FC6BB9E5B}"/>
+                  </a:ext>
+                </a:extLst>
+              </p:cNvPr>
+              <p:cNvSpPr/>
+              <p:nvPr/>
+            </p:nvSpPr>
+            <p:spPr>
+              <a:xfrm>
+                <a:off x="9844700" y="1997110"/>
+                <a:ext cx="1800000" cy="900000"/>
+              </a:xfrm>
+              <a:prstGeom prst="flowChartOffpageConnector">
+                <a:avLst/>
+              </a:prstGeom>
+              <a:solidFill>
+                <a:schemeClr val="accent2">
+                  <a:lumMod val="20000"/>
+                  <a:lumOff val="80000"/>
+                </a:schemeClr>
+              </a:solidFill>
+              <a:ln>
+                <a:noFill/>
+              </a:ln>
+            </p:spPr>
+            <p:style>
+              <a:lnRef idx="2">
+                <a:schemeClr val="dk1"/>
+              </a:lnRef>
+              <a:fillRef idx="1">
+                <a:schemeClr val="lt1"/>
+              </a:fillRef>
+              <a:effectRef idx="0">
+                <a:schemeClr val="dk1"/>
+              </a:effectRef>
+              <a:fontRef idx="minor">
+                <a:schemeClr val="dk1"/>
+              </a:fontRef>
+            </p:style>
+            <p:txBody>
+              <a:bodyPr rtlCol="0" anchor="ctr"/>
+              <a:lstStyle/>
+              <a:p>
+                <a:pPr algn="ctr"/>
+                <a:r>
+                  <a:rPr lang="en-US" sz="1600" dirty="0">
+                    <a:latin typeface="Cambria" panose="02040503050406030204" pitchFamily="18" charset="0"/>
+                    <a:ea typeface="Cambria" panose="02040503050406030204" pitchFamily="18" charset="0"/>
+                  </a:rPr>
+                  <a:t>Subscribe to MQTT server</a:t>
+                </a:r>
+                <a:endParaRPr lang="fr-FR" sz="1600" dirty="0">
+                  <a:latin typeface="Cambria" panose="02040503050406030204" pitchFamily="18" charset="0"/>
+                  <a:ea typeface="Cambria" panose="02040503050406030204" pitchFamily="18" charset="0"/>
+                </a:endParaRPr>
+              </a:p>
+            </p:txBody>
+          </p:sp>
+        </p:grpSp>
+      </p:grpSp>
     </p:spTree>
     <p:extLst>
       <p:ext uri="{BB962C8B-B14F-4D97-AF65-F5344CB8AC3E}">
@@ -4134,7 +4152,7 @@
 <file path=ppt/theme/theme1.xml><?xml version="1.0" encoding="utf-8"?>
 <a:theme xmlns:a="http://schemas.openxmlformats.org/drawingml/2006/main" name="Office Theme">
   <a:themeElements>
-    <a:clrScheme name="Office">
+    <a:clrScheme name="Office Theme">
       <a:dk1>
         <a:sysClr val="windowText" lastClr="000000"/>
       </a:dk1>
@@ -4148,22 +4166,22 @@
         <a:srgbClr val="E7E6E6"/>
       </a:lt2>
       <a:accent1>
-        <a:srgbClr val="4472C4"/>
+        <a:srgbClr val="1D9A78"/>
       </a:accent1>
       <a:accent2>
-        <a:srgbClr val="ED7D31"/>
+        <a:srgbClr val="8BC145"/>
       </a:accent2>
       <a:accent3>
-        <a:srgbClr val="A5A5A5"/>
+        <a:srgbClr val="36AFCE"/>
       </a:accent3>
       <a:accent4>
-        <a:srgbClr val="FFC000"/>
+        <a:srgbClr val="1D6FA9"/>
       </a:accent4>
       <a:accent5>
-        <a:srgbClr val="5B9BD5"/>
+        <a:srgbClr val="B74919"/>
       </a:accent5>
       <a:accent6>
-        <a:srgbClr val="70AD47"/>
+        <a:srgbClr val="F19D19"/>
       </a:accent6>
       <a:hlink>
         <a:srgbClr val="0563C1"/>
@@ -4172,7 +4190,7 @@
         <a:srgbClr val="954F72"/>
       </a:folHlink>
     </a:clrScheme>
-    <a:fontScheme name="Office">
+    <a:fontScheme name="Office Theme">
       <a:majorFont>
         <a:latin typeface="Calibri Light" panose="020F0302020204030204"/>
         <a:ea typeface=""/>
@@ -4207,23 +4225,6 @@
         <a:font script="Viet" typeface="Times New Roman"/>
         <a:font script="Uigh" typeface="Microsoft Uighur"/>
         <a:font script="Geor" typeface="Sylfaen"/>
-        <a:font script="Armn" typeface="Arial"/>
-        <a:font script="Bugi" typeface="Leelawadee UI"/>
-        <a:font script="Bopo" typeface="Microsoft JhengHei"/>
-        <a:font script="Java" typeface="Javanese Text"/>
-        <a:font script="Lisu" typeface="Segoe UI"/>
-        <a:font script="Mymr" typeface="Myanmar Text"/>
-        <a:font script="Nkoo" typeface="Ebrima"/>
-        <a:font script="Olck" typeface="Nirmala UI"/>
-        <a:font script="Osma" typeface="Ebrima"/>
-        <a:font script="Phag" typeface="Phagspa"/>
-        <a:font script="Syrn" typeface="Estrangelo Edessa"/>
-        <a:font script="Syrj" typeface="Estrangelo Edessa"/>
-        <a:font script="Syre" typeface="Estrangelo Edessa"/>
-        <a:font script="Sora" typeface="Nirmala UI"/>
-        <a:font script="Tale" typeface="Microsoft Tai Le"/>
-        <a:font script="Talu" typeface="Microsoft New Tai Lue"/>
-        <a:font script="Tfng" typeface="Ebrima"/>
       </a:majorFont>
       <a:minorFont>
         <a:latin typeface="Calibri" panose="020F0502020204030204"/>
@@ -4259,26 +4260,9 @@
         <a:font script="Viet" typeface="Arial"/>
         <a:font script="Uigh" typeface="Microsoft Uighur"/>
         <a:font script="Geor" typeface="Sylfaen"/>
-        <a:font script="Armn" typeface="Arial"/>
-        <a:font script="Bugi" typeface="Leelawadee UI"/>
-        <a:font script="Bopo" typeface="Microsoft JhengHei"/>
-        <a:font script="Java" typeface="Javanese Text"/>
-        <a:font script="Lisu" typeface="Segoe UI"/>
-        <a:font script="Mymr" typeface="Myanmar Text"/>
-        <a:font script="Nkoo" typeface="Ebrima"/>
-        <a:font script="Olck" typeface="Nirmala UI"/>
-        <a:font script="Osma" typeface="Ebrima"/>
-        <a:font script="Phag" typeface="Phagspa"/>
-        <a:font script="Syrn" typeface="Estrangelo Edessa"/>
-        <a:font script="Syrj" typeface="Estrangelo Edessa"/>
-        <a:font script="Syre" typeface="Estrangelo Edessa"/>
-        <a:font script="Sora" typeface="Nirmala UI"/>
-        <a:font script="Tale" typeface="Microsoft Tai Le"/>
-        <a:font script="Talu" typeface="Microsoft New Tai Lue"/>
-        <a:font script="Tfng" typeface="Ebrima"/>
       </a:minorFont>
     </a:fontScheme>
-    <a:fmtScheme name="Office">
+    <a:fmtScheme name="Office Theme">
       <a:fillStyleLst>
         <a:solidFill>
           <a:schemeClr val="phClr"/>
@@ -4420,7 +4404,7 @@
   <a:extraClrSchemeLst/>
   <a:extLst>
     <a:ext uri="{05A4C25C-085E-4340-85A3-A5531E510DB2}">
-      <thm15:themeFamily xmlns:thm15="http://schemas.microsoft.com/office/thememl/2012/main" name="Office Theme" id="{62F939B6-93AF-4DB8-9C6B-D6C7DFDC589F}" vid="{4A3C46E8-61CC-4603-A589-7422A47A8E4A}"/>
+      <thm15:themeFamily xmlns:thm15="http://schemas.microsoft.com/office/thememl/2012/main" name="Office Theme" id="{62F939B6-93AF-4DB8-9C6B-D6C7DFDC589F}" vid="{AE6F2518-B084-4896-AF52-66CC2144AA26}"/>
     </a:ext>
   </a:extLst>
 </a:theme>

</xml_diff>

<commit_message>
modified diagram and .gitignore
</commit_message>
<xml_diff>
--- a/Diagram/Use case diagram.pptx
+++ b/Diagram/Use case diagram.pptx
@@ -3050,7 +3050,7 @@
         </p:nvSpPr>
         <p:spPr>
           <a:xfrm>
-            <a:off x="3449503" y="449627"/>
+            <a:off x="3449502" y="532876"/>
             <a:ext cx="5292995" cy="584775"/>
           </a:xfrm>
           <a:prstGeom prst="rect">
@@ -3081,10 +3081,10 @@
       </p:sp>
       <p:grpSp>
         <p:nvGrpSpPr>
-          <p:cNvPr id="43" name="Group 42">
+          <p:cNvPr id="56" name="Group 55">
             <a:extLst>
               <a:ext uri="{FF2B5EF4-FFF2-40B4-BE49-F238E27FC236}">
-                <a16:creationId xmlns:a16="http://schemas.microsoft.com/office/drawing/2014/main" id="{738D2C8B-EE86-968A-D4BF-1195016A0817}"/>
+                <a16:creationId xmlns:a16="http://schemas.microsoft.com/office/drawing/2014/main" id="{1E4715BA-A5FD-A5A0-6229-09834270EC73}"/>
               </a:ext>
             </a:extLst>
           </p:cNvPr>
@@ -3093,388 +3093,12 @@
         </p:nvGrpSpPr>
         <p:grpSpPr>
           <a:xfrm>
-            <a:off x="2955328" y="1453461"/>
-            <a:ext cx="1800000" cy="1619415"/>
-            <a:chOff x="2737789" y="1097110"/>
-            <a:chExt cx="1800000" cy="1619415"/>
+            <a:off x="5251785" y="1321195"/>
+            <a:ext cx="1800001" cy="3376306"/>
+            <a:chOff x="5251785" y="1321195"/>
+            <a:chExt cx="1800001" cy="3376306"/>
           </a:xfrm>
         </p:grpSpPr>
-        <p:pic>
-          <p:nvPicPr>
-            <p:cNvPr id="17" name="Graphique 16" descr="Webcam avec un remplissage uni">
-              <a:extLst>
-                <a:ext uri="{FF2B5EF4-FFF2-40B4-BE49-F238E27FC236}">
-                  <a16:creationId xmlns:a16="http://schemas.microsoft.com/office/drawing/2014/main" id="{71590CFB-EDE0-AC8A-D089-DF6B9215304D}"/>
-                </a:ext>
-              </a:extLst>
-            </p:cNvPr>
-            <p:cNvPicPr>
-              <a:picLocks noChangeAspect="1"/>
-            </p:cNvPicPr>
-            <p:nvPr/>
-          </p:nvPicPr>
-          <p:blipFill>
-            <a:blip r:embed="rId2">
-              <a:extLst>
-                <a:ext uri="{28A0092B-C50C-407E-A947-70E740481C1C}">
-                  <a14:useLocalDpi xmlns:a14="http://schemas.microsoft.com/office/drawing/2010/main" val="0"/>
-                </a:ext>
-                <a:ext uri="{96DAC541-7B7A-43D3-8B79-37D633B846F1}">
-                  <asvg:svgBlip xmlns:asvg="http://schemas.microsoft.com/office/drawing/2016/SVG/main" r:embed="rId3"/>
-                </a:ext>
-              </a:extLst>
-            </a:blip>
-            <a:stretch>
-              <a:fillRect/>
-            </a:stretch>
-          </p:blipFill>
-          <p:spPr>
-            <a:xfrm>
-              <a:off x="3187789" y="1097110"/>
-              <a:ext cx="900000" cy="900000"/>
-            </a:xfrm>
-            <a:prstGeom prst="rect">
-              <a:avLst/>
-            </a:prstGeom>
-          </p:spPr>
-        </p:pic>
-        <p:sp>
-          <p:nvSpPr>
-            <p:cNvPr id="20" name="Rectangle 19">
-              <a:extLst>
-                <a:ext uri="{FF2B5EF4-FFF2-40B4-BE49-F238E27FC236}">
-                  <a16:creationId xmlns:a16="http://schemas.microsoft.com/office/drawing/2014/main" id="{E3A3DD2E-686F-0C8F-3A8A-C337957D9D68}"/>
-                </a:ext>
-              </a:extLst>
-            </p:cNvPr>
-            <p:cNvSpPr/>
-            <p:nvPr/>
-          </p:nvSpPr>
-          <p:spPr>
-            <a:xfrm>
-              <a:off x="2737789" y="1996525"/>
-              <a:ext cx="1800000" cy="720000"/>
-            </a:xfrm>
-            <a:prstGeom prst="rect">
-              <a:avLst/>
-            </a:prstGeom>
-            <a:solidFill>
-              <a:schemeClr val="accent2">
-                <a:lumMod val="20000"/>
-                <a:lumOff val="80000"/>
-              </a:schemeClr>
-            </a:solidFill>
-            <a:ln>
-              <a:noFill/>
-            </a:ln>
-          </p:spPr>
-          <p:style>
-            <a:lnRef idx="2">
-              <a:schemeClr val="dk1"/>
-            </a:lnRef>
-            <a:fillRef idx="1">
-              <a:schemeClr val="lt1"/>
-            </a:fillRef>
-            <a:effectRef idx="0">
-              <a:schemeClr val="dk1"/>
-            </a:effectRef>
-            <a:fontRef idx="minor">
-              <a:schemeClr val="dk1"/>
-            </a:fontRef>
-          </p:style>
-          <p:txBody>
-            <a:bodyPr rtlCol="0" anchor="ctr"/>
-            <a:lstStyle/>
-            <a:p>
-              <a:pPr algn="ctr"/>
-              <a:r>
-                <a:rPr lang="en-US" sz="1600" dirty="0">
-                  <a:latin typeface="Cambria" panose="02040503050406030204" pitchFamily="18" charset="0"/>
-                  <a:ea typeface="Cambria" panose="02040503050406030204" pitchFamily="18" charset="0"/>
-                </a:rPr>
-                <a:t>Capture images</a:t>
-              </a:r>
-              <a:endParaRPr lang="fr-FR" sz="1600" dirty="0">
-                <a:latin typeface="Cambria" panose="02040503050406030204" pitchFamily="18" charset="0"/>
-                <a:ea typeface="Cambria" panose="02040503050406030204" pitchFamily="18" charset="0"/>
-              </a:endParaRPr>
-            </a:p>
-          </p:txBody>
-        </p:sp>
-      </p:grpSp>
-      <p:grpSp>
-        <p:nvGrpSpPr>
-          <p:cNvPr id="41" name="Group 40">
-            <a:extLst>
-              <a:ext uri="{FF2B5EF4-FFF2-40B4-BE49-F238E27FC236}">
-                <a16:creationId xmlns:a16="http://schemas.microsoft.com/office/drawing/2014/main" id="{C612C62D-E39A-EA2D-C03E-A7A8F9A3D5F0}"/>
-              </a:ext>
-            </a:extLst>
-          </p:cNvPr>
-          <p:cNvGrpSpPr/>
-          <p:nvPr/>
-        </p:nvGrpSpPr>
-        <p:grpSpPr>
-          <a:xfrm>
-            <a:off x="7548243" y="1453461"/>
-            <a:ext cx="1800000" cy="2511908"/>
-            <a:chOff x="7293384" y="1097110"/>
-            <a:chExt cx="1800000" cy="2511908"/>
-          </a:xfrm>
-        </p:grpSpPr>
-        <p:pic>
-          <p:nvPicPr>
-            <p:cNvPr id="13" name="Graphique 12" descr="Synchronisation avec le cloud avec un remplissage uni">
-              <a:extLst>
-                <a:ext uri="{FF2B5EF4-FFF2-40B4-BE49-F238E27FC236}">
-                  <a16:creationId xmlns:a16="http://schemas.microsoft.com/office/drawing/2014/main" id="{9C3DFEFA-38DC-DF4F-003B-F1F1237D1071}"/>
-                </a:ext>
-              </a:extLst>
-            </p:cNvPr>
-            <p:cNvPicPr>
-              <a:picLocks noChangeAspect="1"/>
-            </p:cNvPicPr>
-            <p:nvPr/>
-          </p:nvPicPr>
-          <p:blipFill>
-            <a:blip r:embed="rId4">
-              <a:extLst>
-                <a:ext uri="{28A0092B-C50C-407E-A947-70E740481C1C}">
-                  <a14:useLocalDpi xmlns:a14="http://schemas.microsoft.com/office/drawing/2010/main" val="0"/>
-                </a:ext>
-                <a:ext uri="{96DAC541-7B7A-43D3-8B79-37D633B846F1}">
-                  <asvg:svgBlip xmlns:asvg="http://schemas.microsoft.com/office/drawing/2016/SVG/main" r:embed="rId5"/>
-                </a:ext>
-              </a:extLst>
-            </a:blip>
-            <a:stretch>
-              <a:fillRect/>
-            </a:stretch>
-          </p:blipFill>
-          <p:spPr>
-            <a:xfrm>
-              <a:off x="7743384" y="1097110"/>
-              <a:ext cx="900000" cy="900000"/>
-            </a:xfrm>
-            <a:prstGeom prst="rect">
-              <a:avLst/>
-            </a:prstGeom>
-          </p:spPr>
-        </p:pic>
-        <p:grpSp>
-          <p:nvGrpSpPr>
-            <p:cNvPr id="38" name="Group 37">
-              <a:extLst>
-                <a:ext uri="{FF2B5EF4-FFF2-40B4-BE49-F238E27FC236}">
-                  <a16:creationId xmlns:a16="http://schemas.microsoft.com/office/drawing/2014/main" id="{B5B9CDE3-8A0B-9F2C-D08C-F55D7FDF2A01}"/>
-                </a:ext>
-              </a:extLst>
-            </p:cNvPr>
-            <p:cNvGrpSpPr/>
-            <p:nvPr/>
-          </p:nvGrpSpPr>
-          <p:grpSpPr>
-            <a:xfrm>
-              <a:off x="7293384" y="1997110"/>
-              <a:ext cx="1800000" cy="1611908"/>
-              <a:chOff x="7293384" y="1997110"/>
-              <a:chExt cx="1800000" cy="1611908"/>
-            </a:xfrm>
-          </p:grpSpPr>
-          <p:sp>
-            <p:nvSpPr>
-              <p:cNvPr id="29" name="Rectangle 28">
-                <a:extLst>
-                  <a:ext uri="{FF2B5EF4-FFF2-40B4-BE49-F238E27FC236}">
-                    <a16:creationId xmlns:a16="http://schemas.microsoft.com/office/drawing/2014/main" id="{D37A9FA9-6751-EB66-685E-E50CDA00D452}"/>
-                  </a:ext>
-                </a:extLst>
-              </p:cNvPr>
-              <p:cNvSpPr/>
-              <p:nvPr/>
-            </p:nvSpPr>
-            <p:spPr>
-              <a:xfrm>
-                <a:off x="7293384" y="2709018"/>
-                <a:ext cx="1800000" cy="900000"/>
-              </a:xfrm>
-              <a:prstGeom prst="rect">
-                <a:avLst/>
-              </a:prstGeom>
-              <a:solidFill>
-                <a:schemeClr val="accent2">
-                  <a:lumMod val="40000"/>
-                  <a:lumOff val="60000"/>
-                </a:schemeClr>
-              </a:solidFill>
-              <a:ln>
-                <a:noFill/>
-              </a:ln>
-            </p:spPr>
-            <p:style>
-              <a:lnRef idx="2">
-                <a:schemeClr val="dk1"/>
-              </a:lnRef>
-              <a:fillRef idx="1">
-                <a:schemeClr val="lt1"/>
-              </a:fillRef>
-              <a:effectRef idx="0">
-                <a:schemeClr val="dk1"/>
-              </a:effectRef>
-              <a:fontRef idx="minor">
-                <a:schemeClr val="dk1"/>
-              </a:fontRef>
-            </p:style>
-            <p:txBody>
-              <a:bodyPr rtlCol="0" anchor="ctr"/>
-              <a:lstStyle/>
-              <a:p>
-                <a:pPr algn="ctr"/>
-                <a:endParaRPr lang="en-US" sz="1600" dirty="0">
-                  <a:latin typeface="Cambria" panose="02040503050406030204" pitchFamily="18" charset="0"/>
-                  <a:ea typeface="Cambria" panose="02040503050406030204" pitchFamily="18" charset="0"/>
-                </a:endParaRPr>
-              </a:p>
-              <a:p>
-                <a:pPr algn="ctr"/>
-                <a:r>
-                  <a:rPr lang="en-US" sz="1600" dirty="0">
-                    <a:latin typeface="Cambria" panose="02040503050406030204" pitchFamily="18" charset="0"/>
-                    <a:ea typeface="Cambria" panose="02040503050406030204" pitchFamily="18" charset="0"/>
-                  </a:rPr>
-                  <a:t>Publish instruction</a:t>
-                </a:r>
-                <a:endParaRPr lang="fr-FR" sz="1600" dirty="0">
-                  <a:latin typeface="Cambria" panose="02040503050406030204" pitchFamily="18" charset="0"/>
-                  <a:ea typeface="Cambria" panose="02040503050406030204" pitchFamily="18" charset="0"/>
-                </a:endParaRPr>
-              </a:p>
-            </p:txBody>
-          </p:sp>
-          <p:sp>
-            <p:nvSpPr>
-              <p:cNvPr id="28" name="Flowchart: Off-page Connector 27">
-                <a:extLst>
-                  <a:ext uri="{FF2B5EF4-FFF2-40B4-BE49-F238E27FC236}">
-                    <a16:creationId xmlns:a16="http://schemas.microsoft.com/office/drawing/2014/main" id="{4B1CE382-AE53-6681-24E2-E798118BB02A}"/>
-                  </a:ext>
-                </a:extLst>
-              </p:cNvPr>
-              <p:cNvSpPr/>
-              <p:nvPr/>
-            </p:nvSpPr>
-            <p:spPr>
-              <a:xfrm>
-                <a:off x="7293384" y="1997110"/>
-                <a:ext cx="1800000" cy="900000"/>
-              </a:xfrm>
-              <a:prstGeom prst="flowChartOffpageConnector">
-                <a:avLst/>
-              </a:prstGeom>
-              <a:solidFill>
-                <a:schemeClr val="accent2">
-                  <a:lumMod val="20000"/>
-                  <a:lumOff val="80000"/>
-                </a:schemeClr>
-              </a:solidFill>
-              <a:ln>
-                <a:noFill/>
-              </a:ln>
-            </p:spPr>
-            <p:style>
-              <a:lnRef idx="2">
-                <a:schemeClr val="dk1"/>
-              </a:lnRef>
-              <a:fillRef idx="1">
-                <a:schemeClr val="lt1"/>
-              </a:fillRef>
-              <a:effectRef idx="0">
-                <a:schemeClr val="dk1"/>
-              </a:effectRef>
-              <a:fontRef idx="minor">
-                <a:schemeClr val="dk1"/>
-              </a:fontRef>
-            </p:style>
-            <p:txBody>
-              <a:bodyPr rtlCol="0" anchor="ctr"/>
-              <a:lstStyle/>
-              <a:p>
-                <a:pPr algn="ctr"/>
-                <a:r>
-                  <a:rPr lang="en-US" sz="1600" dirty="0">
-                    <a:latin typeface="Cambria" panose="02040503050406030204" pitchFamily="18" charset="0"/>
-                    <a:ea typeface="Cambria" panose="02040503050406030204" pitchFamily="18" charset="0"/>
-                  </a:rPr>
-                  <a:t>Receive instruction from computer</a:t>
-                </a:r>
-                <a:endParaRPr lang="fr-FR" sz="1600" dirty="0">
-                  <a:latin typeface="Cambria" panose="02040503050406030204" pitchFamily="18" charset="0"/>
-                  <a:ea typeface="Cambria" panose="02040503050406030204" pitchFamily="18" charset="0"/>
-                </a:endParaRPr>
-              </a:p>
-            </p:txBody>
-          </p:sp>
-        </p:grpSp>
-      </p:grpSp>
-      <p:grpSp>
-        <p:nvGrpSpPr>
-          <p:cNvPr id="42" name="Group 41">
-            <a:extLst>
-              <a:ext uri="{FF2B5EF4-FFF2-40B4-BE49-F238E27FC236}">
-                <a16:creationId xmlns:a16="http://schemas.microsoft.com/office/drawing/2014/main" id="{0D4BB994-FDE9-ADB7-C95F-407F686CE420}"/>
-              </a:ext>
-            </a:extLst>
-          </p:cNvPr>
-          <p:cNvGrpSpPr/>
-          <p:nvPr/>
-        </p:nvGrpSpPr>
-        <p:grpSpPr>
-          <a:xfrm>
-            <a:off x="5251785" y="1453461"/>
-            <a:ext cx="1800001" cy="3246181"/>
-            <a:chOff x="5015586" y="1097110"/>
-            <a:chExt cx="1800001" cy="3246181"/>
-          </a:xfrm>
-        </p:grpSpPr>
-        <p:pic>
-          <p:nvPicPr>
-            <p:cNvPr id="19" name="Graphique 18" descr="Ordinateur avec un remplissage uni">
-              <a:extLst>
-                <a:ext uri="{FF2B5EF4-FFF2-40B4-BE49-F238E27FC236}">
-                  <a16:creationId xmlns:a16="http://schemas.microsoft.com/office/drawing/2014/main" id="{22F3FCBA-4825-C11A-818E-6B0A6A962A26}"/>
-                </a:ext>
-              </a:extLst>
-            </p:cNvPr>
-            <p:cNvPicPr>
-              <a:picLocks noChangeAspect="1"/>
-            </p:cNvPicPr>
-            <p:nvPr/>
-          </p:nvPicPr>
-          <p:blipFill>
-            <a:blip r:embed="rId6">
-              <a:extLst>
-                <a:ext uri="{28A0092B-C50C-407E-A947-70E740481C1C}">
-                  <a14:useLocalDpi xmlns:a14="http://schemas.microsoft.com/office/drawing/2010/main" val="0"/>
-                </a:ext>
-                <a:ext uri="{96DAC541-7B7A-43D3-8B79-37D633B846F1}">
-                  <asvg:svgBlip xmlns:asvg="http://schemas.microsoft.com/office/drawing/2016/SVG/main" r:embed="rId7"/>
-                </a:ext>
-              </a:extLst>
-            </a:blip>
-            <a:stretch>
-              <a:fillRect/>
-            </a:stretch>
-          </p:blipFill>
-          <p:spPr>
-            <a:xfrm>
-              <a:off x="5465586" y="1097110"/>
-              <a:ext cx="900000" cy="900000"/>
-            </a:xfrm>
-            <a:prstGeom prst="rect">
-              <a:avLst/>
-            </a:prstGeom>
-          </p:spPr>
-        </p:pic>
         <p:grpSp>
           <p:nvGrpSpPr>
             <p:cNvPr id="36" name="Group 35">
@@ -3489,7 +3113,7 @@
           </p:nvGrpSpPr>
           <p:grpSpPr>
             <a:xfrm>
-              <a:off x="5015586" y="1997110"/>
+              <a:off x="5251785" y="2351320"/>
               <a:ext cx="1800001" cy="2346181"/>
               <a:chOff x="5015586" y="1997110"/>
               <a:chExt cx="1800001" cy="2346181"/>
@@ -3689,9 +3313,112 @@
                     <a:latin typeface="Cambria" panose="02040503050406030204" pitchFamily="18" charset="0"/>
                     <a:ea typeface="Cambria" panose="02040503050406030204" pitchFamily="18" charset="0"/>
                   </a:rPr>
-                  <a:t>Detect hand</a:t>
+                  <a:t>Detect hand in image</a:t>
                 </a:r>
                 <a:endParaRPr lang="fr-FR" sz="1600" dirty="0">
+                  <a:latin typeface="Cambria" panose="02040503050406030204" pitchFamily="18" charset="0"/>
+                  <a:ea typeface="Cambria" panose="02040503050406030204" pitchFamily="18" charset="0"/>
+                </a:endParaRPr>
+              </a:p>
+            </p:txBody>
+          </p:sp>
+        </p:grpSp>
+        <p:grpSp>
+          <p:nvGrpSpPr>
+            <p:cNvPr id="37" name="Group 36">
+              <a:extLst>
+                <a:ext uri="{FF2B5EF4-FFF2-40B4-BE49-F238E27FC236}">
+                  <a16:creationId xmlns:a16="http://schemas.microsoft.com/office/drawing/2014/main" id="{6E4B563A-03EA-93EB-2B82-6D3BE2D01B1C}"/>
+                </a:ext>
+              </a:extLst>
+            </p:cNvPr>
+            <p:cNvGrpSpPr/>
+            <p:nvPr/>
+          </p:nvGrpSpPr>
+          <p:grpSpPr>
+            <a:xfrm>
+              <a:off x="5416432" y="1321195"/>
+              <a:ext cx="1470707" cy="1029931"/>
+              <a:chOff x="5416432" y="1321195"/>
+              <a:chExt cx="1470707" cy="1029931"/>
+            </a:xfrm>
+          </p:grpSpPr>
+          <p:pic>
+            <p:nvPicPr>
+              <p:cNvPr id="19" name="Graphique 18" descr="Ordinateur avec un remplissage uni">
+                <a:extLst>
+                  <a:ext uri="{FF2B5EF4-FFF2-40B4-BE49-F238E27FC236}">
+                    <a16:creationId xmlns:a16="http://schemas.microsoft.com/office/drawing/2014/main" id="{22F3FCBA-4825-C11A-818E-6B0A6A962A26}"/>
+                  </a:ext>
+                </a:extLst>
+              </p:cNvPr>
+              <p:cNvPicPr>
+                <a:picLocks noChangeAspect="1"/>
+              </p:cNvPicPr>
+              <p:nvPr/>
+            </p:nvPicPr>
+            <p:blipFill>
+              <a:blip r:embed="rId2">
+                <a:extLst>
+                  <a:ext uri="{28A0092B-C50C-407E-A947-70E740481C1C}">
+                    <a14:useLocalDpi xmlns:a14="http://schemas.microsoft.com/office/drawing/2010/main" val="0"/>
+                  </a:ext>
+                  <a:ext uri="{96DAC541-7B7A-43D3-8B79-37D633B846F1}">
+                    <asvg:svgBlip xmlns:asvg="http://schemas.microsoft.com/office/drawing/2016/SVG/main" r:embed="rId3"/>
+                  </a:ext>
+                </a:extLst>
+              </a:blip>
+              <a:stretch>
+                <a:fillRect/>
+              </a:stretch>
+            </p:blipFill>
+            <p:spPr>
+              <a:xfrm>
+                <a:off x="5701785" y="1321195"/>
+                <a:ext cx="900000" cy="900000"/>
+              </a:xfrm>
+              <a:prstGeom prst="rect">
+                <a:avLst/>
+              </a:prstGeom>
+            </p:spPr>
+          </p:pic>
+          <p:sp>
+            <p:nvSpPr>
+              <p:cNvPr id="6" name="TextBox 5">
+                <a:extLst>
+                  <a:ext uri="{FF2B5EF4-FFF2-40B4-BE49-F238E27FC236}">
+                    <a16:creationId xmlns:a16="http://schemas.microsoft.com/office/drawing/2014/main" id="{49988E71-D571-5158-EB0A-4569EDF15757}"/>
+                  </a:ext>
+                </a:extLst>
+              </p:cNvPr>
+              <p:cNvSpPr txBox="1"/>
+              <p:nvPr/>
+            </p:nvSpPr>
+            <p:spPr>
+              <a:xfrm>
+                <a:off x="5416432" y="2074127"/>
+                <a:ext cx="1470707" cy="276999"/>
+              </a:xfrm>
+              <a:prstGeom prst="rect">
+                <a:avLst/>
+              </a:prstGeom>
+              <a:noFill/>
+            </p:spPr>
+            <p:txBody>
+              <a:bodyPr wrap="square" rtlCol="0">
+                <a:spAutoFit/>
+              </a:bodyPr>
+              <a:lstStyle/>
+              <a:p>
+                <a:pPr algn="ctr"/>
+                <a:r>
+                  <a:rPr lang="fr-FR" sz="1200" dirty="0">
+                    <a:latin typeface="Cambria" panose="02040503050406030204" pitchFamily="18" charset="0"/>
+                    <a:ea typeface="Cambria" panose="02040503050406030204" pitchFamily="18" charset="0"/>
+                  </a:rPr>
+                  <a:t>Raspberry</a:t>
+                </a:r>
+                <a:endParaRPr lang="en-US" sz="1200" dirty="0">
                   <a:latin typeface="Cambria" panose="02040503050406030204" pitchFamily="18" charset="0"/>
                   <a:ea typeface="Cambria" panose="02040503050406030204" pitchFamily="18" charset="0"/>
                 </a:endParaRPr>
@@ -3702,10 +3429,10 @@
       </p:grpSp>
       <p:grpSp>
         <p:nvGrpSpPr>
-          <p:cNvPr id="44" name="Group 43">
+          <p:cNvPr id="57" name="Group 56">
             <a:extLst>
               <a:ext uri="{FF2B5EF4-FFF2-40B4-BE49-F238E27FC236}">
-                <a16:creationId xmlns:a16="http://schemas.microsoft.com/office/drawing/2014/main" id="{43FA4867-C48C-AE80-254A-EE59A12C9E7A}"/>
+                <a16:creationId xmlns:a16="http://schemas.microsoft.com/office/drawing/2014/main" id="{B25219CC-7076-0146-E5DB-10F5D20DA180}"/>
               </a:ext>
             </a:extLst>
           </p:cNvPr>
@@ -3714,157 +3441,276 @@
         </p:nvGrpSpPr>
         <p:grpSpPr>
           <a:xfrm>
-            <a:off x="658871" y="1453461"/>
-            <a:ext cx="1800000" cy="4840879"/>
-            <a:chOff x="658871" y="1097110"/>
-            <a:chExt cx="1800000" cy="4840879"/>
+            <a:off x="7548243" y="1321195"/>
+            <a:ext cx="1800000" cy="2642033"/>
+            <a:chOff x="7548243" y="1321195"/>
+            <a:chExt cx="1800000" cy="2642033"/>
           </a:xfrm>
         </p:grpSpPr>
-        <p:pic>
-          <p:nvPicPr>
-            <p:cNvPr id="5" name="Image 4" descr="Un jeune mentonnier lève le petit doigt">
+        <p:grpSp>
+          <p:nvGrpSpPr>
+            <p:cNvPr id="38" name="Group 37">
               <a:extLst>
                 <a:ext uri="{FF2B5EF4-FFF2-40B4-BE49-F238E27FC236}">
-                  <a16:creationId xmlns:a16="http://schemas.microsoft.com/office/drawing/2014/main" id="{6369174D-BF19-2381-C16A-5AA781F14427}"/>
+                  <a16:creationId xmlns:a16="http://schemas.microsoft.com/office/drawing/2014/main" id="{B5B9CDE3-8A0B-9F2C-D08C-F55D7FDF2A01}"/>
                 </a:ext>
               </a:extLst>
             </p:cNvPr>
-            <p:cNvPicPr>
-              <a:picLocks noChangeAspect="1"/>
-            </p:cNvPicPr>
+            <p:cNvGrpSpPr/>
             <p:nvPr/>
-          </p:nvPicPr>
-          <p:blipFill>
-            <a:blip r:embed="rId8">
-              <a:extLst>
-                <a:ext uri="{28A0092B-C50C-407E-A947-70E740481C1C}">
-                  <a14:useLocalDpi xmlns:a14="http://schemas.microsoft.com/office/drawing/2010/main" val="0"/>
-                </a:ext>
-              </a:extLst>
-            </a:blip>
-            <a:stretch>
-              <a:fillRect/>
-            </a:stretch>
-          </p:blipFill>
-          <p:spPr>
+          </p:nvGrpSpPr>
+          <p:grpSpPr>
             <a:xfrm>
-              <a:off x="1068381" y="2803151"/>
-              <a:ext cx="980980" cy="3134838"/>
+              <a:off x="7548243" y="2351320"/>
+              <a:ext cx="1800000" cy="1611908"/>
+              <a:chOff x="7293384" y="1997110"/>
+              <a:chExt cx="1800000" cy="1611908"/>
             </a:xfrm>
-            <a:prstGeom prst="rect">
-              <a:avLst/>
-            </a:prstGeom>
-          </p:spPr>
-        </p:pic>
-        <p:sp>
-          <p:nvSpPr>
-            <p:cNvPr id="33" name="Rectangle 32">
+          </p:grpSpPr>
+          <p:sp>
+            <p:nvSpPr>
+              <p:cNvPr id="29" name="Rectangle 28">
+                <a:extLst>
+                  <a:ext uri="{FF2B5EF4-FFF2-40B4-BE49-F238E27FC236}">
+                    <a16:creationId xmlns:a16="http://schemas.microsoft.com/office/drawing/2014/main" id="{D37A9FA9-6751-EB66-685E-E50CDA00D452}"/>
+                  </a:ext>
+                </a:extLst>
+              </p:cNvPr>
+              <p:cNvSpPr/>
+              <p:nvPr/>
+            </p:nvSpPr>
+            <p:spPr>
+              <a:xfrm>
+                <a:off x="7293384" y="2709018"/>
+                <a:ext cx="1800000" cy="900000"/>
+              </a:xfrm>
+              <a:prstGeom prst="rect">
+                <a:avLst/>
+              </a:prstGeom>
+              <a:solidFill>
+                <a:schemeClr val="accent2">
+                  <a:lumMod val="40000"/>
+                  <a:lumOff val="60000"/>
+                </a:schemeClr>
+              </a:solidFill>
+              <a:ln>
+                <a:noFill/>
+              </a:ln>
+            </p:spPr>
+            <p:style>
+              <a:lnRef idx="2">
+                <a:schemeClr val="dk1"/>
+              </a:lnRef>
+              <a:fillRef idx="1">
+                <a:schemeClr val="lt1"/>
+              </a:fillRef>
+              <a:effectRef idx="0">
+                <a:schemeClr val="dk1"/>
+              </a:effectRef>
+              <a:fontRef idx="minor">
+                <a:schemeClr val="dk1"/>
+              </a:fontRef>
+            </p:style>
+            <p:txBody>
+              <a:bodyPr rtlCol="0" anchor="ctr"/>
+              <a:lstStyle/>
+              <a:p>
+                <a:pPr algn="ctr"/>
+                <a:endParaRPr lang="en-US" sz="1600" dirty="0">
+                  <a:latin typeface="Cambria" panose="02040503050406030204" pitchFamily="18" charset="0"/>
+                  <a:ea typeface="Cambria" panose="02040503050406030204" pitchFamily="18" charset="0"/>
+                </a:endParaRPr>
+              </a:p>
+              <a:p>
+                <a:pPr algn="ctr"/>
+                <a:r>
+                  <a:rPr lang="en-US" sz="1600" dirty="0">
+                    <a:latin typeface="Cambria" panose="02040503050406030204" pitchFamily="18" charset="0"/>
+                    <a:ea typeface="Cambria" panose="02040503050406030204" pitchFamily="18" charset="0"/>
+                  </a:rPr>
+                  <a:t>Publish instruction</a:t>
+                </a:r>
+                <a:endParaRPr lang="fr-FR" sz="1600" dirty="0">
+                  <a:latin typeface="Cambria" panose="02040503050406030204" pitchFamily="18" charset="0"/>
+                  <a:ea typeface="Cambria" panose="02040503050406030204" pitchFamily="18" charset="0"/>
+                </a:endParaRPr>
+              </a:p>
+            </p:txBody>
+          </p:sp>
+          <p:sp>
+            <p:nvSpPr>
+              <p:cNvPr id="28" name="Flowchart: Off-page Connector 27">
+                <a:extLst>
+                  <a:ext uri="{FF2B5EF4-FFF2-40B4-BE49-F238E27FC236}">
+                    <a16:creationId xmlns:a16="http://schemas.microsoft.com/office/drawing/2014/main" id="{4B1CE382-AE53-6681-24E2-E798118BB02A}"/>
+                  </a:ext>
+                </a:extLst>
+              </p:cNvPr>
+              <p:cNvSpPr/>
+              <p:nvPr/>
+            </p:nvSpPr>
+            <p:spPr>
+              <a:xfrm>
+                <a:off x="7293384" y="1997110"/>
+                <a:ext cx="1800000" cy="900000"/>
+              </a:xfrm>
+              <a:prstGeom prst="flowChartOffpageConnector">
+                <a:avLst/>
+              </a:prstGeom>
+              <a:solidFill>
+                <a:schemeClr val="accent2">
+                  <a:lumMod val="20000"/>
+                  <a:lumOff val="80000"/>
+                </a:schemeClr>
+              </a:solidFill>
+              <a:ln>
+                <a:noFill/>
+              </a:ln>
+            </p:spPr>
+            <p:style>
+              <a:lnRef idx="2">
+                <a:schemeClr val="dk1"/>
+              </a:lnRef>
+              <a:fillRef idx="1">
+                <a:schemeClr val="lt1"/>
+              </a:fillRef>
+              <a:effectRef idx="0">
+                <a:schemeClr val="dk1"/>
+              </a:effectRef>
+              <a:fontRef idx="minor">
+                <a:schemeClr val="dk1"/>
+              </a:fontRef>
+            </p:style>
+            <p:txBody>
+              <a:bodyPr rtlCol="0" anchor="ctr"/>
+              <a:lstStyle/>
+              <a:p>
+                <a:pPr algn="ctr"/>
+                <a:r>
+                  <a:rPr lang="en-US" sz="1600" dirty="0">
+                    <a:latin typeface="Cambria" panose="02040503050406030204" pitchFamily="18" charset="0"/>
+                    <a:ea typeface="Cambria" panose="02040503050406030204" pitchFamily="18" charset="0"/>
+                  </a:rPr>
+                  <a:t>Receive instruction from computer</a:t>
+                </a:r>
+                <a:endParaRPr lang="fr-FR" sz="1600" dirty="0">
+                  <a:latin typeface="Cambria" panose="02040503050406030204" pitchFamily="18" charset="0"/>
+                  <a:ea typeface="Cambria" panose="02040503050406030204" pitchFamily="18" charset="0"/>
+                </a:endParaRPr>
+              </a:p>
+            </p:txBody>
+          </p:sp>
+        </p:grpSp>
+        <p:grpSp>
+          <p:nvGrpSpPr>
+            <p:cNvPr id="45" name="Group 44">
               <a:extLst>
                 <a:ext uri="{FF2B5EF4-FFF2-40B4-BE49-F238E27FC236}">
-                  <a16:creationId xmlns:a16="http://schemas.microsoft.com/office/drawing/2014/main" id="{AA7E1676-3DA9-8D6C-414A-50B0E109BF5F}"/>
+                  <a16:creationId xmlns:a16="http://schemas.microsoft.com/office/drawing/2014/main" id="{7D143604-3C6E-C227-85D0-66671DB0EF03}"/>
                 </a:ext>
               </a:extLst>
             </p:cNvPr>
-            <p:cNvSpPr/>
+            <p:cNvGrpSpPr/>
             <p:nvPr/>
-          </p:nvSpPr>
-          <p:spPr>
+          </p:nvGrpSpPr>
+          <p:grpSpPr>
             <a:xfrm>
-              <a:off x="658871" y="1994969"/>
-              <a:ext cx="1800000" cy="720000"/>
+              <a:off x="7712890" y="1321195"/>
+              <a:ext cx="1470707" cy="1029931"/>
+              <a:chOff x="7712890" y="1321195"/>
+              <a:chExt cx="1470707" cy="1029931"/>
             </a:xfrm>
-            <a:prstGeom prst="rect">
-              <a:avLst/>
-            </a:prstGeom>
-            <a:solidFill>
-              <a:schemeClr val="accent2">
-                <a:lumMod val="20000"/>
-                <a:lumOff val="80000"/>
-              </a:schemeClr>
-            </a:solidFill>
-            <a:ln>
+          </p:grpSpPr>
+          <p:pic>
+            <p:nvPicPr>
+              <p:cNvPr id="13" name="Graphique 12" descr="Synchronisation avec le cloud avec un remplissage uni">
+                <a:extLst>
+                  <a:ext uri="{FF2B5EF4-FFF2-40B4-BE49-F238E27FC236}">
+                    <a16:creationId xmlns:a16="http://schemas.microsoft.com/office/drawing/2014/main" id="{9C3DFEFA-38DC-DF4F-003B-F1F1237D1071}"/>
+                  </a:ext>
+                </a:extLst>
+              </p:cNvPr>
+              <p:cNvPicPr>
+                <a:picLocks noChangeAspect="1"/>
+              </p:cNvPicPr>
+              <p:nvPr/>
+            </p:nvPicPr>
+            <p:blipFill>
+              <a:blip r:embed="rId4">
+                <a:extLst>
+                  <a:ext uri="{28A0092B-C50C-407E-A947-70E740481C1C}">
+                    <a14:useLocalDpi xmlns:a14="http://schemas.microsoft.com/office/drawing/2010/main" val="0"/>
+                  </a:ext>
+                  <a:ext uri="{96DAC541-7B7A-43D3-8B79-37D633B846F1}">
+                    <asvg:svgBlip xmlns:asvg="http://schemas.microsoft.com/office/drawing/2016/SVG/main" r:embed="rId5"/>
+                  </a:ext>
+                </a:extLst>
+              </a:blip>
+              <a:stretch>
+                <a:fillRect/>
+              </a:stretch>
+            </p:blipFill>
+            <p:spPr>
+              <a:xfrm>
+                <a:off x="7998243" y="1321195"/>
+                <a:ext cx="900000" cy="900000"/>
+              </a:xfrm>
+              <a:prstGeom prst="rect">
+                <a:avLst/>
+              </a:prstGeom>
+            </p:spPr>
+          </p:pic>
+          <p:sp>
+            <p:nvSpPr>
+              <p:cNvPr id="7" name="TextBox 6">
+                <a:extLst>
+                  <a:ext uri="{FF2B5EF4-FFF2-40B4-BE49-F238E27FC236}">
+                    <a16:creationId xmlns:a16="http://schemas.microsoft.com/office/drawing/2014/main" id="{355C1BB9-FC38-6D11-7318-5845E2385CDD}"/>
+                  </a:ext>
+                </a:extLst>
+              </p:cNvPr>
+              <p:cNvSpPr txBox="1"/>
+              <p:nvPr/>
+            </p:nvSpPr>
+            <p:spPr>
+              <a:xfrm>
+                <a:off x="7712890" y="2074127"/>
+                <a:ext cx="1470707" cy="276999"/>
+              </a:xfrm>
+              <a:prstGeom prst="rect">
+                <a:avLst/>
+              </a:prstGeom>
               <a:noFill/>
-            </a:ln>
-          </p:spPr>
-          <p:style>
-            <a:lnRef idx="2">
-              <a:schemeClr val="dk1"/>
-            </a:lnRef>
-            <a:fillRef idx="1">
-              <a:schemeClr val="lt1"/>
-            </a:fillRef>
-            <a:effectRef idx="0">
-              <a:schemeClr val="dk1"/>
-            </a:effectRef>
-            <a:fontRef idx="minor">
-              <a:schemeClr val="dk1"/>
-            </a:fontRef>
-          </p:style>
-          <p:txBody>
-            <a:bodyPr rtlCol="0" anchor="ctr"/>
-            <a:lstStyle/>
-            <a:p>
-              <a:pPr algn="ctr"/>
-              <a:r>
-                <a:rPr lang="en-US" sz="1600" dirty="0">
+            </p:spPr>
+            <p:txBody>
+              <a:bodyPr wrap="square" rtlCol="0">
+                <a:spAutoFit/>
+              </a:bodyPr>
+              <a:lstStyle/>
+              <a:p>
+                <a:pPr algn="ctr"/>
+                <a:r>
+                  <a:rPr lang="fr-FR" sz="1200" dirty="0">
+                    <a:latin typeface="Cambria" panose="02040503050406030204" pitchFamily="18" charset="0"/>
+                    <a:ea typeface="Cambria" panose="02040503050406030204" pitchFamily="18" charset="0"/>
+                  </a:rPr>
+                  <a:t>MQTT server</a:t>
+                </a:r>
+                <a:endParaRPr lang="en-US" sz="1200" dirty="0">
                   <a:latin typeface="Cambria" panose="02040503050406030204" pitchFamily="18" charset="0"/>
                   <a:ea typeface="Cambria" panose="02040503050406030204" pitchFamily="18" charset="0"/>
-                </a:rPr>
-                <a:t>Give instruction with hand signs</a:t>
-              </a:r>
-              <a:endParaRPr lang="fr-FR" sz="1600" dirty="0">
-                <a:latin typeface="Cambria" panose="02040503050406030204" pitchFamily="18" charset="0"/>
-                <a:ea typeface="Cambria" panose="02040503050406030204" pitchFamily="18" charset="0"/>
-              </a:endParaRPr>
-            </a:p>
-          </p:txBody>
-        </p:sp>
-        <p:pic>
-          <p:nvPicPr>
-            <p:cNvPr id="22" name="Graphic 21" descr="Hang Loose Hand Gesture with solid fill">
-              <a:extLst>
-                <a:ext uri="{FF2B5EF4-FFF2-40B4-BE49-F238E27FC236}">
-                  <a16:creationId xmlns:a16="http://schemas.microsoft.com/office/drawing/2014/main" id="{EFA74D91-E152-4B58-C989-2D3EE4C1208C}"/>
-                </a:ext>
-              </a:extLst>
-            </p:cNvPr>
-            <p:cNvPicPr>
-              <a:picLocks noChangeAspect="1"/>
-            </p:cNvPicPr>
-            <p:nvPr/>
-          </p:nvPicPr>
-          <p:blipFill>
-            <a:blip r:embed="rId9">
-              <a:extLst>
-                <a:ext uri="{28A0092B-C50C-407E-A947-70E740481C1C}">
-                  <a14:useLocalDpi xmlns:a14="http://schemas.microsoft.com/office/drawing/2010/main" val="0"/>
-                </a:ext>
-                <a:ext uri="{96DAC541-7B7A-43D3-8B79-37D633B846F1}">
-                  <asvg:svgBlip xmlns:asvg="http://schemas.microsoft.com/office/drawing/2016/SVG/main" r:embed="rId10"/>
-                </a:ext>
-              </a:extLst>
-            </a:blip>
-            <a:stretch>
-              <a:fillRect/>
-            </a:stretch>
-          </p:blipFill>
-          <p:spPr>
-            <a:xfrm>
-              <a:off x="1108871" y="1097110"/>
-              <a:ext cx="900000" cy="900000"/>
-            </a:xfrm>
-            <a:prstGeom prst="rect">
-              <a:avLst/>
-            </a:prstGeom>
-          </p:spPr>
-        </p:pic>
+                </a:endParaRPr>
+              </a:p>
+            </p:txBody>
+          </p:sp>
+        </p:grpSp>
       </p:grpSp>
       <p:grpSp>
         <p:nvGrpSpPr>
-          <p:cNvPr id="40" name="Group 39">
+          <p:cNvPr id="58" name="Group 57">
             <a:extLst>
               <a:ext uri="{FF2B5EF4-FFF2-40B4-BE49-F238E27FC236}">
-                <a16:creationId xmlns:a16="http://schemas.microsoft.com/office/drawing/2014/main" id="{559D5785-7969-47DA-AB26-D67EB91BAAFC}"/>
+                <a16:creationId xmlns:a16="http://schemas.microsoft.com/office/drawing/2014/main" id="{1470A5FB-E774-3FB3-0601-ED218E26F624}"/>
               </a:ext>
             </a:extLst>
           </p:cNvPr>
@@ -3873,51 +3719,12 @@
         </p:nvGrpSpPr>
         <p:grpSpPr>
           <a:xfrm>
-            <a:off x="9844700" y="1453461"/>
-            <a:ext cx="1800000" cy="3231890"/>
-            <a:chOff x="9844700" y="1097110"/>
-            <a:chExt cx="1800000" cy="3231890"/>
+            <a:off x="9844700" y="1321195"/>
+            <a:ext cx="1800000" cy="3362015"/>
+            <a:chOff x="9844700" y="1321195"/>
+            <a:chExt cx="1800000" cy="3362015"/>
           </a:xfrm>
         </p:grpSpPr>
-        <p:pic>
-          <p:nvPicPr>
-            <p:cNvPr id="15" name="Graphique 14" descr="Quadrirotor avec un remplissage uni">
-              <a:extLst>
-                <a:ext uri="{FF2B5EF4-FFF2-40B4-BE49-F238E27FC236}">
-                  <a16:creationId xmlns:a16="http://schemas.microsoft.com/office/drawing/2014/main" id="{39E94A4C-2B54-2F14-BE11-E2B0E4E13873}"/>
-                </a:ext>
-              </a:extLst>
-            </p:cNvPr>
-            <p:cNvPicPr>
-              <a:picLocks noChangeAspect="1"/>
-            </p:cNvPicPr>
-            <p:nvPr/>
-          </p:nvPicPr>
-          <p:blipFill>
-            <a:blip r:embed="rId11">
-              <a:extLst>
-                <a:ext uri="{28A0092B-C50C-407E-A947-70E740481C1C}">
-                  <a14:useLocalDpi xmlns:a14="http://schemas.microsoft.com/office/drawing/2010/main" val="0"/>
-                </a:ext>
-                <a:ext uri="{96DAC541-7B7A-43D3-8B79-37D633B846F1}">
-                  <asvg:svgBlip xmlns:asvg="http://schemas.microsoft.com/office/drawing/2016/SVG/main" r:embed="rId12"/>
-                </a:ext>
-              </a:extLst>
-            </a:blip>
-            <a:stretch>
-              <a:fillRect/>
-            </a:stretch>
-          </p:blipFill>
-          <p:spPr>
-            <a:xfrm>
-              <a:off x="10294700" y="1097110"/>
-              <a:ext cx="900000" cy="900000"/>
-            </a:xfrm>
-            <a:prstGeom prst="rect">
-              <a:avLst/>
-            </a:prstGeom>
-          </p:spPr>
-        </p:pic>
         <p:grpSp>
           <p:nvGrpSpPr>
             <p:cNvPr id="39" name="Group 38">
@@ -3932,7 +3739,7 @@
           </p:nvGrpSpPr>
           <p:grpSpPr>
             <a:xfrm>
-              <a:off x="9844700" y="1997110"/>
+              <a:off x="9844700" y="2351320"/>
               <a:ext cx="1800000" cy="2331890"/>
               <a:chOff x="9844700" y="1997110"/>
               <a:chExt cx="1800000" cy="2331890"/>
@@ -4126,6 +3933,631 @@
                     <a:ea typeface="Cambria" panose="02040503050406030204" pitchFamily="18" charset="0"/>
                   </a:rPr>
                   <a:t>Subscribe to MQTT server</a:t>
+                </a:r>
+                <a:endParaRPr lang="fr-FR" sz="1600" dirty="0">
+                  <a:latin typeface="Cambria" panose="02040503050406030204" pitchFamily="18" charset="0"/>
+                  <a:ea typeface="Cambria" panose="02040503050406030204" pitchFamily="18" charset="0"/>
+                </a:endParaRPr>
+              </a:p>
+            </p:txBody>
+          </p:sp>
+        </p:grpSp>
+        <p:grpSp>
+          <p:nvGrpSpPr>
+            <p:cNvPr id="46" name="Group 45">
+              <a:extLst>
+                <a:ext uri="{FF2B5EF4-FFF2-40B4-BE49-F238E27FC236}">
+                  <a16:creationId xmlns:a16="http://schemas.microsoft.com/office/drawing/2014/main" id="{85BC8A2A-81F9-DE56-B7F9-58B7E143F0E4}"/>
+                </a:ext>
+              </a:extLst>
+            </p:cNvPr>
+            <p:cNvGrpSpPr/>
+            <p:nvPr/>
+          </p:nvGrpSpPr>
+          <p:grpSpPr>
+            <a:xfrm>
+              <a:off x="10009347" y="1321195"/>
+              <a:ext cx="1470707" cy="1029931"/>
+              <a:chOff x="10009347" y="1321195"/>
+              <a:chExt cx="1470707" cy="1029931"/>
+            </a:xfrm>
+          </p:grpSpPr>
+          <p:pic>
+            <p:nvPicPr>
+              <p:cNvPr id="15" name="Graphique 14" descr="Quadrirotor avec un remplissage uni">
+                <a:extLst>
+                  <a:ext uri="{FF2B5EF4-FFF2-40B4-BE49-F238E27FC236}">
+                    <a16:creationId xmlns:a16="http://schemas.microsoft.com/office/drawing/2014/main" id="{39E94A4C-2B54-2F14-BE11-E2B0E4E13873}"/>
+                  </a:ext>
+                </a:extLst>
+              </p:cNvPr>
+              <p:cNvPicPr>
+                <a:picLocks noChangeAspect="1"/>
+              </p:cNvPicPr>
+              <p:nvPr/>
+            </p:nvPicPr>
+            <p:blipFill>
+              <a:blip r:embed="rId6">
+                <a:extLst>
+                  <a:ext uri="{28A0092B-C50C-407E-A947-70E740481C1C}">
+                    <a14:useLocalDpi xmlns:a14="http://schemas.microsoft.com/office/drawing/2010/main" val="0"/>
+                  </a:ext>
+                  <a:ext uri="{96DAC541-7B7A-43D3-8B79-37D633B846F1}">
+                    <asvg:svgBlip xmlns:asvg="http://schemas.microsoft.com/office/drawing/2016/SVG/main" r:embed="rId7"/>
+                  </a:ext>
+                </a:extLst>
+              </a:blip>
+              <a:stretch>
+                <a:fillRect/>
+              </a:stretch>
+            </p:blipFill>
+            <p:spPr>
+              <a:xfrm>
+                <a:off x="10294700" y="1321195"/>
+                <a:ext cx="900000" cy="900000"/>
+              </a:xfrm>
+              <a:prstGeom prst="rect">
+                <a:avLst/>
+              </a:prstGeom>
+            </p:spPr>
+          </p:pic>
+          <p:sp>
+            <p:nvSpPr>
+              <p:cNvPr id="8" name="TextBox 7">
+                <a:extLst>
+                  <a:ext uri="{FF2B5EF4-FFF2-40B4-BE49-F238E27FC236}">
+                    <a16:creationId xmlns:a16="http://schemas.microsoft.com/office/drawing/2014/main" id="{667756C3-634C-3DA6-A88B-92F9AA31D2FF}"/>
+                  </a:ext>
+                </a:extLst>
+              </p:cNvPr>
+              <p:cNvSpPr txBox="1"/>
+              <p:nvPr/>
+            </p:nvSpPr>
+            <p:spPr>
+              <a:xfrm>
+                <a:off x="10009347" y="2074127"/>
+                <a:ext cx="1470707" cy="276999"/>
+              </a:xfrm>
+              <a:prstGeom prst="rect">
+                <a:avLst/>
+              </a:prstGeom>
+              <a:noFill/>
+            </p:spPr>
+            <p:txBody>
+              <a:bodyPr wrap="square" rtlCol="0">
+                <a:spAutoFit/>
+              </a:bodyPr>
+              <a:lstStyle/>
+              <a:p>
+                <a:pPr algn="ctr"/>
+                <a:r>
+                  <a:rPr lang="fr-FR" sz="1200" dirty="0">
+                    <a:latin typeface="Cambria" panose="02040503050406030204" pitchFamily="18" charset="0"/>
+                    <a:ea typeface="Cambria" panose="02040503050406030204" pitchFamily="18" charset="0"/>
+                  </a:rPr>
+                  <a:t>UAV</a:t>
+                </a:r>
+                <a:endParaRPr lang="en-US" sz="1200" dirty="0">
+                  <a:latin typeface="Cambria" panose="02040503050406030204" pitchFamily="18" charset="0"/>
+                  <a:ea typeface="Cambria" panose="02040503050406030204" pitchFamily="18" charset="0"/>
+                </a:endParaRPr>
+              </a:p>
+            </p:txBody>
+          </p:sp>
+        </p:grpSp>
+      </p:grpSp>
+      <p:grpSp>
+        <p:nvGrpSpPr>
+          <p:cNvPr id="59" name="Group 58">
+            <a:extLst>
+              <a:ext uri="{FF2B5EF4-FFF2-40B4-BE49-F238E27FC236}">
+                <a16:creationId xmlns:a16="http://schemas.microsoft.com/office/drawing/2014/main" id="{78E07122-A6E8-758B-38BB-A926964FE42B}"/>
+              </a:ext>
+            </a:extLst>
+          </p:cNvPr>
+          <p:cNvGrpSpPr/>
+          <p:nvPr/>
+        </p:nvGrpSpPr>
+        <p:grpSpPr>
+          <a:xfrm>
+            <a:off x="658871" y="1321195"/>
+            <a:ext cx="1800000" cy="4973145"/>
+            <a:chOff x="658871" y="1321195"/>
+            <a:chExt cx="1800000" cy="4973145"/>
+          </a:xfrm>
+        </p:grpSpPr>
+        <p:pic>
+          <p:nvPicPr>
+            <p:cNvPr id="5" name="Image 4" descr="Un jeune mentonnier lève le petit doigt">
+              <a:extLst>
+                <a:ext uri="{FF2B5EF4-FFF2-40B4-BE49-F238E27FC236}">
+                  <a16:creationId xmlns:a16="http://schemas.microsoft.com/office/drawing/2014/main" id="{6369174D-BF19-2381-C16A-5AA781F14427}"/>
+                </a:ext>
+              </a:extLst>
+            </p:cNvPr>
+            <p:cNvPicPr>
+              <a:picLocks noChangeAspect="1"/>
+            </p:cNvPicPr>
+            <p:nvPr/>
+          </p:nvPicPr>
+          <p:blipFill>
+            <a:blip r:embed="rId8">
+              <a:extLst>
+                <a:ext uri="{28A0092B-C50C-407E-A947-70E740481C1C}">
+                  <a14:useLocalDpi xmlns:a14="http://schemas.microsoft.com/office/drawing/2010/main" val="0"/>
+                </a:ext>
+              </a:extLst>
+            </a:blip>
+            <a:stretch>
+              <a:fillRect/>
+            </a:stretch>
+          </p:blipFill>
+          <p:spPr>
+            <a:xfrm>
+              <a:off x="1068381" y="3159502"/>
+              <a:ext cx="980980" cy="3134838"/>
+            </a:xfrm>
+            <a:prstGeom prst="rect">
+              <a:avLst/>
+            </a:prstGeom>
+          </p:spPr>
+        </p:pic>
+        <p:grpSp>
+          <p:nvGrpSpPr>
+            <p:cNvPr id="54" name="Group 53">
+              <a:extLst>
+                <a:ext uri="{FF2B5EF4-FFF2-40B4-BE49-F238E27FC236}">
+                  <a16:creationId xmlns:a16="http://schemas.microsoft.com/office/drawing/2014/main" id="{0865F1A0-E9BD-96C3-659E-652445702991}"/>
+                </a:ext>
+              </a:extLst>
+            </p:cNvPr>
+            <p:cNvGrpSpPr/>
+            <p:nvPr/>
+          </p:nvGrpSpPr>
+          <p:grpSpPr>
+            <a:xfrm>
+              <a:off x="658871" y="1321195"/>
+              <a:ext cx="1800000" cy="1750125"/>
+              <a:chOff x="658871" y="1321195"/>
+              <a:chExt cx="1800000" cy="1750125"/>
+            </a:xfrm>
+          </p:grpSpPr>
+          <p:sp>
+            <p:nvSpPr>
+              <p:cNvPr id="33" name="Rectangle 32">
+                <a:extLst>
+                  <a:ext uri="{FF2B5EF4-FFF2-40B4-BE49-F238E27FC236}">
+                    <a16:creationId xmlns:a16="http://schemas.microsoft.com/office/drawing/2014/main" id="{AA7E1676-3DA9-8D6C-414A-50B0E109BF5F}"/>
+                  </a:ext>
+                </a:extLst>
+              </p:cNvPr>
+              <p:cNvSpPr/>
+              <p:nvPr/>
+            </p:nvSpPr>
+            <p:spPr>
+              <a:xfrm>
+                <a:off x="658871" y="2351320"/>
+                <a:ext cx="1800000" cy="720000"/>
+              </a:xfrm>
+              <a:prstGeom prst="rect">
+                <a:avLst/>
+              </a:prstGeom>
+              <a:solidFill>
+                <a:schemeClr val="accent2">
+                  <a:lumMod val="20000"/>
+                  <a:lumOff val="80000"/>
+                </a:schemeClr>
+              </a:solidFill>
+              <a:ln>
+                <a:noFill/>
+              </a:ln>
+            </p:spPr>
+            <p:style>
+              <a:lnRef idx="2">
+                <a:schemeClr val="dk1"/>
+              </a:lnRef>
+              <a:fillRef idx="1">
+                <a:schemeClr val="lt1"/>
+              </a:fillRef>
+              <a:effectRef idx="0">
+                <a:schemeClr val="dk1"/>
+              </a:effectRef>
+              <a:fontRef idx="minor">
+                <a:schemeClr val="dk1"/>
+              </a:fontRef>
+            </p:style>
+            <p:txBody>
+              <a:bodyPr rtlCol="0" anchor="ctr"/>
+              <a:lstStyle/>
+              <a:p>
+                <a:pPr algn="ctr"/>
+                <a:r>
+                  <a:rPr lang="en-US" sz="1600" dirty="0">
+                    <a:latin typeface="Cambria" panose="02040503050406030204" pitchFamily="18" charset="0"/>
+                    <a:ea typeface="Cambria" panose="02040503050406030204" pitchFamily="18" charset="0"/>
+                  </a:rPr>
+                  <a:t>Give instruction with hand signs</a:t>
+                </a:r>
+                <a:endParaRPr lang="fr-FR" sz="1600" dirty="0">
+                  <a:latin typeface="Cambria" panose="02040503050406030204" pitchFamily="18" charset="0"/>
+                  <a:ea typeface="Cambria" panose="02040503050406030204" pitchFamily="18" charset="0"/>
+                </a:endParaRPr>
+              </a:p>
+            </p:txBody>
+          </p:sp>
+          <p:grpSp>
+            <p:nvGrpSpPr>
+              <p:cNvPr id="30" name="Group 29">
+                <a:extLst>
+                  <a:ext uri="{FF2B5EF4-FFF2-40B4-BE49-F238E27FC236}">
+                    <a16:creationId xmlns:a16="http://schemas.microsoft.com/office/drawing/2014/main" id="{D7485E7D-1755-AE1A-7D7A-9F1CB639E622}"/>
+                  </a:ext>
+                </a:extLst>
+              </p:cNvPr>
+              <p:cNvGrpSpPr/>
+              <p:nvPr/>
+            </p:nvGrpSpPr>
+            <p:grpSpPr>
+              <a:xfrm>
+                <a:off x="823518" y="1321195"/>
+                <a:ext cx="1470707" cy="1029931"/>
+                <a:chOff x="823518" y="1321195"/>
+                <a:chExt cx="1470707" cy="1029931"/>
+              </a:xfrm>
+            </p:grpSpPr>
+            <p:pic>
+              <p:nvPicPr>
+                <p:cNvPr id="22" name="Graphic 21" descr="Hang Loose Hand Gesture with solid fill">
+                  <a:extLst>
+                    <a:ext uri="{FF2B5EF4-FFF2-40B4-BE49-F238E27FC236}">
+                      <a16:creationId xmlns:a16="http://schemas.microsoft.com/office/drawing/2014/main" id="{EFA74D91-E152-4B58-C989-2D3EE4C1208C}"/>
+                    </a:ext>
+                  </a:extLst>
+                </p:cNvPr>
+                <p:cNvPicPr>
+                  <a:picLocks noChangeAspect="1"/>
+                </p:cNvPicPr>
+                <p:nvPr/>
+              </p:nvPicPr>
+              <p:blipFill>
+                <a:blip r:embed="rId9">
+                  <a:extLst>
+                    <a:ext uri="{28A0092B-C50C-407E-A947-70E740481C1C}">
+                      <a14:useLocalDpi xmlns:a14="http://schemas.microsoft.com/office/drawing/2010/main" val="0"/>
+                    </a:ext>
+                    <a:ext uri="{96DAC541-7B7A-43D3-8B79-37D633B846F1}">
+                      <asvg:svgBlip xmlns:asvg="http://schemas.microsoft.com/office/drawing/2016/SVG/main" r:embed="rId10"/>
+                    </a:ext>
+                  </a:extLst>
+                </a:blip>
+                <a:stretch>
+                  <a:fillRect/>
+                </a:stretch>
+              </p:blipFill>
+              <p:spPr>
+                <a:xfrm>
+                  <a:off x="1108871" y="1321195"/>
+                  <a:ext cx="900000" cy="900000"/>
+                </a:xfrm>
+                <a:prstGeom prst="rect">
+                  <a:avLst/>
+                </a:prstGeom>
+              </p:spPr>
+            </p:pic>
+            <p:sp>
+              <p:nvSpPr>
+                <p:cNvPr id="27" name="TextBox 26">
+                  <a:extLst>
+                    <a:ext uri="{FF2B5EF4-FFF2-40B4-BE49-F238E27FC236}">
+                      <a16:creationId xmlns:a16="http://schemas.microsoft.com/office/drawing/2014/main" id="{57EEF9B6-EC70-1711-0497-9A01540D5984}"/>
+                    </a:ext>
+                  </a:extLst>
+                </p:cNvPr>
+                <p:cNvSpPr txBox="1"/>
+                <p:nvPr/>
+              </p:nvSpPr>
+              <p:spPr>
+                <a:xfrm>
+                  <a:off x="823518" y="2074127"/>
+                  <a:ext cx="1470707" cy="276999"/>
+                </a:xfrm>
+                <a:prstGeom prst="rect">
+                  <a:avLst/>
+                </a:prstGeom>
+                <a:noFill/>
+              </p:spPr>
+              <p:txBody>
+                <a:bodyPr wrap="square" rtlCol="0">
+                  <a:spAutoFit/>
+                </a:bodyPr>
+                <a:lstStyle/>
+                <a:p>
+                  <a:pPr algn="ctr"/>
+                  <a:r>
+                    <a:rPr lang="fr-FR" sz="1200" dirty="0">
+                      <a:latin typeface="Cambria" panose="02040503050406030204" pitchFamily="18" charset="0"/>
+                      <a:ea typeface="Cambria" panose="02040503050406030204" pitchFamily="18" charset="0"/>
+                    </a:rPr>
+                    <a:t>User hand sign</a:t>
+                  </a:r>
+                  <a:endParaRPr lang="en-US" sz="1200" dirty="0">
+                    <a:latin typeface="Cambria" panose="02040503050406030204" pitchFamily="18" charset="0"/>
+                    <a:ea typeface="Cambria" panose="02040503050406030204" pitchFamily="18" charset="0"/>
+                  </a:endParaRPr>
+                </a:p>
+              </p:txBody>
+            </p:sp>
+          </p:grpSp>
+        </p:grpSp>
+      </p:grpSp>
+      <p:grpSp>
+        <p:nvGrpSpPr>
+          <p:cNvPr id="55" name="Group 54">
+            <a:extLst>
+              <a:ext uri="{FF2B5EF4-FFF2-40B4-BE49-F238E27FC236}">
+                <a16:creationId xmlns:a16="http://schemas.microsoft.com/office/drawing/2014/main" id="{78B0BD39-690B-666D-F2F7-98F21AC0AB20}"/>
+              </a:ext>
+            </a:extLst>
+          </p:cNvPr>
+          <p:cNvGrpSpPr/>
+          <p:nvPr/>
+        </p:nvGrpSpPr>
+        <p:grpSpPr>
+          <a:xfrm>
+            <a:off x="2955328" y="1321195"/>
+            <a:ext cx="1800000" cy="2642033"/>
+            <a:chOff x="2955327" y="1321195"/>
+            <a:chExt cx="1800000" cy="2642033"/>
+          </a:xfrm>
+        </p:grpSpPr>
+        <p:grpSp>
+          <p:nvGrpSpPr>
+            <p:cNvPr id="34" name="Group 33">
+              <a:extLst>
+                <a:ext uri="{FF2B5EF4-FFF2-40B4-BE49-F238E27FC236}">
+                  <a16:creationId xmlns:a16="http://schemas.microsoft.com/office/drawing/2014/main" id="{3592C8ED-EFE9-B021-C09B-CA8F1AD1ED05}"/>
+                </a:ext>
+              </a:extLst>
+            </p:cNvPr>
+            <p:cNvGrpSpPr/>
+            <p:nvPr/>
+          </p:nvGrpSpPr>
+          <p:grpSpPr>
+            <a:xfrm>
+              <a:off x="3119975" y="1321195"/>
+              <a:ext cx="1470707" cy="1029931"/>
+              <a:chOff x="3119975" y="1321195"/>
+              <a:chExt cx="1470707" cy="1029931"/>
+            </a:xfrm>
+          </p:grpSpPr>
+          <p:pic>
+            <p:nvPicPr>
+              <p:cNvPr id="17" name="Graphique 16" descr="Webcam avec un remplissage uni">
+                <a:extLst>
+                  <a:ext uri="{FF2B5EF4-FFF2-40B4-BE49-F238E27FC236}">
+                    <a16:creationId xmlns:a16="http://schemas.microsoft.com/office/drawing/2014/main" id="{71590CFB-EDE0-AC8A-D089-DF6B9215304D}"/>
+                  </a:ext>
+                </a:extLst>
+              </p:cNvPr>
+              <p:cNvPicPr>
+                <a:picLocks noChangeAspect="1"/>
+              </p:cNvPicPr>
+              <p:nvPr/>
+            </p:nvPicPr>
+            <p:blipFill>
+              <a:blip r:embed="rId11">
+                <a:extLst>
+                  <a:ext uri="{28A0092B-C50C-407E-A947-70E740481C1C}">
+                    <a14:useLocalDpi xmlns:a14="http://schemas.microsoft.com/office/drawing/2010/main" val="0"/>
+                  </a:ext>
+                  <a:ext uri="{96DAC541-7B7A-43D3-8B79-37D633B846F1}">
+                    <asvg:svgBlip xmlns:asvg="http://schemas.microsoft.com/office/drawing/2016/SVG/main" r:embed="rId12"/>
+                  </a:ext>
+                </a:extLst>
+              </a:blip>
+              <a:stretch>
+                <a:fillRect/>
+              </a:stretch>
+            </p:blipFill>
+            <p:spPr>
+              <a:xfrm>
+                <a:off x="3405328" y="1321195"/>
+                <a:ext cx="900000" cy="900000"/>
+              </a:xfrm>
+              <a:prstGeom prst="rect">
+                <a:avLst/>
+              </a:prstGeom>
+            </p:spPr>
+          </p:pic>
+          <p:sp>
+            <p:nvSpPr>
+              <p:cNvPr id="3" name="TextBox 2">
+                <a:extLst>
+                  <a:ext uri="{FF2B5EF4-FFF2-40B4-BE49-F238E27FC236}">
+                    <a16:creationId xmlns:a16="http://schemas.microsoft.com/office/drawing/2014/main" id="{A85407AF-9503-E814-BC52-9F8C6FF13742}"/>
+                  </a:ext>
+                </a:extLst>
+              </p:cNvPr>
+              <p:cNvSpPr txBox="1"/>
+              <p:nvPr/>
+            </p:nvSpPr>
+            <p:spPr>
+              <a:xfrm>
+                <a:off x="3119975" y="2074127"/>
+                <a:ext cx="1470707" cy="276999"/>
+              </a:xfrm>
+              <a:prstGeom prst="rect">
+                <a:avLst/>
+              </a:prstGeom>
+              <a:noFill/>
+            </p:spPr>
+            <p:txBody>
+              <a:bodyPr wrap="square" rtlCol="0">
+                <a:spAutoFit/>
+              </a:bodyPr>
+              <a:lstStyle/>
+              <a:p>
+                <a:pPr algn="ctr"/>
+                <a:r>
+                  <a:rPr lang="fr-FR" sz="1200" dirty="0">
+                    <a:latin typeface="Cambria" panose="02040503050406030204" pitchFamily="18" charset="0"/>
+                    <a:ea typeface="Cambria" panose="02040503050406030204" pitchFamily="18" charset="0"/>
+                  </a:rPr>
+                  <a:t>Camera</a:t>
+                </a:r>
+                <a:endParaRPr lang="en-US" sz="1200" dirty="0">
+                  <a:latin typeface="Cambria" panose="02040503050406030204" pitchFamily="18" charset="0"/>
+                  <a:ea typeface="Cambria" panose="02040503050406030204" pitchFamily="18" charset="0"/>
+                </a:endParaRPr>
+              </a:p>
+            </p:txBody>
+          </p:sp>
+        </p:grpSp>
+        <p:grpSp>
+          <p:nvGrpSpPr>
+            <p:cNvPr id="51" name="Group 50">
+              <a:extLst>
+                <a:ext uri="{FF2B5EF4-FFF2-40B4-BE49-F238E27FC236}">
+                  <a16:creationId xmlns:a16="http://schemas.microsoft.com/office/drawing/2014/main" id="{9EC0FFB6-A0B1-99F8-A422-7400C7BD49B8}"/>
+                </a:ext>
+              </a:extLst>
+            </p:cNvPr>
+            <p:cNvGrpSpPr/>
+            <p:nvPr/>
+          </p:nvGrpSpPr>
+          <p:grpSpPr>
+            <a:xfrm>
+              <a:off x="2955327" y="2351320"/>
+              <a:ext cx="1800000" cy="1611908"/>
+              <a:chOff x="7293384" y="1997110"/>
+              <a:chExt cx="1800000" cy="1611908"/>
+            </a:xfrm>
+          </p:grpSpPr>
+          <p:sp>
+            <p:nvSpPr>
+              <p:cNvPr id="52" name="Rectangle 51">
+                <a:extLst>
+                  <a:ext uri="{FF2B5EF4-FFF2-40B4-BE49-F238E27FC236}">
+                    <a16:creationId xmlns:a16="http://schemas.microsoft.com/office/drawing/2014/main" id="{2188C388-F5BF-05D3-749B-3DA1FD4E4D61}"/>
+                  </a:ext>
+                </a:extLst>
+              </p:cNvPr>
+              <p:cNvSpPr/>
+              <p:nvPr/>
+            </p:nvSpPr>
+            <p:spPr>
+              <a:xfrm>
+                <a:off x="7293384" y="2709018"/>
+                <a:ext cx="1800000" cy="900000"/>
+              </a:xfrm>
+              <a:prstGeom prst="rect">
+                <a:avLst/>
+              </a:prstGeom>
+              <a:solidFill>
+                <a:schemeClr val="accent2">
+                  <a:lumMod val="40000"/>
+                  <a:lumOff val="60000"/>
+                </a:schemeClr>
+              </a:solidFill>
+              <a:ln>
+                <a:noFill/>
+              </a:ln>
+            </p:spPr>
+            <p:style>
+              <a:lnRef idx="2">
+                <a:schemeClr val="dk1"/>
+              </a:lnRef>
+              <a:fillRef idx="1">
+                <a:schemeClr val="lt1"/>
+              </a:fillRef>
+              <a:effectRef idx="0">
+                <a:schemeClr val="dk1"/>
+              </a:effectRef>
+              <a:fontRef idx="minor">
+                <a:schemeClr val="dk1"/>
+              </a:fontRef>
+            </p:style>
+            <p:txBody>
+              <a:bodyPr rtlCol="0" anchor="ctr"/>
+              <a:lstStyle/>
+              <a:p>
+                <a:pPr algn="ctr"/>
+                <a:endParaRPr lang="en-US" sz="1600" dirty="0">
+                  <a:latin typeface="Cambria" panose="02040503050406030204" pitchFamily="18" charset="0"/>
+                  <a:ea typeface="Cambria" panose="02040503050406030204" pitchFamily="18" charset="0"/>
+                </a:endParaRPr>
+              </a:p>
+              <a:p>
+                <a:pPr algn="ctr"/>
+                <a:r>
+                  <a:rPr lang="en-US" sz="1600" dirty="0">
+                    <a:latin typeface="Cambria" panose="02040503050406030204" pitchFamily="18" charset="0"/>
+                    <a:ea typeface="Cambria" panose="02040503050406030204" pitchFamily="18" charset="0"/>
+                  </a:rPr>
+                  <a:t>Send images to the Raspberry</a:t>
+                </a:r>
+                <a:endParaRPr lang="fr-FR" sz="1600" dirty="0">
+                  <a:latin typeface="Cambria" panose="02040503050406030204" pitchFamily="18" charset="0"/>
+                  <a:ea typeface="Cambria" panose="02040503050406030204" pitchFamily="18" charset="0"/>
+                </a:endParaRPr>
+              </a:p>
+            </p:txBody>
+          </p:sp>
+          <p:sp>
+            <p:nvSpPr>
+              <p:cNvPr id="53" name="Flowchart: Off-page Connector 52">
+                <a:extLst>
+                  <a:ext uri="{FF2B5EF4-FFF2-40B4-BE49-F238E27FC236}">
+                    <a16:creationId xmlns:a16="http://schemas.microsoft.com/office/drawing/2014/main" id="{7FC31A9D-F226-E85D-9303-AF9357D3E290}"/>
+                  </a:ext>
+                </a:extLst>
+              </p:cNvPr>
+              <p:cNvSpPr/>
+              <p:nvPr/>
+            </p:nvSpPr>
+            <p:spPr>
+              <a:xfrm>
+                <a:off x="7293384" y="1997110"/>
+                <a:ext cx="1800000" cy="900000"/>
+              </a:xfrm>
+              <a:prstGeom prst="flowChartOffpageConnector">
+                <a:avLst/>
+              </a:prstGeom>
+              <a:solidFill>
+                <a:schemeClr val="accent2">
+                  <a:lumMod val="20000"/>
+                  <a:lumOff val="80000"/>
+                </a:schemeClr>
+              </a:solidFill>
+              <a:ln>
+                <a:noFill/>
+              </a:ln>
+            </p:spPr>
+            <p:style>
+              <a:lnRef idx="2">
+                <a:schemeClr val="dk1"/>
+              </a:lnRef>
+              <a:fillRef idx="1">
+                <a:schemeClr val="lt1"/>
+              </a:fillRef>
+              <a:effectRef idx="0">
+                <a:schemeClr val="dk1"/>
+              </a:effectRef>
+              <a:fontRef idx="minor">
+                <a:schemeClr val="dk1"/>
+              </a:fontRef>
+            </p:style>
+            <p:txBody>
+              <a:bodyPr rtlCol="0" anchor="ctr"/>
+              <a:lstStyle/>
+              <a:p>
+                <a:pPr algn="ctr"/>
+                <a:r>
+                  <a:rPr lang="en-US" sz="1600" dirty="0">
+                    <a:latin typeface="Cambria" panose="02040503050406030204" pitchFamily="18" charset="0"/>
+                    <a:ea typeface="Cambria" panose="02040503050406030204" pitchFamily="18" charset="0"/>
+                  </a:rPr>
+                  <a:t>Capture images</a:t>
                 </a:r>
                 <a:endParaRPr lang="fr-FR" sz="1600" dirty="0">
                   <a:latin typeface="Cambria" panose="02040503050406030204" pitchFamily="18" charset="0"/>

</xml_diff>

<commit_message>
added diagram and change main to camera_main
</commit_message>
<xml_diff>
--- a/Diagram/Use case diagram.pptx
+++ b/Diagram/Use case diagram.pptx
@@ -243,7 +243,7 @@
           <a:p>
             <a:fld id="{FACA4E01-6918-446C-9121-B61D3869F858}" type="datetimeFigureOut">
               <a:rPr lang="en-US" smtClean="0"/>
-              <a:t>11/4/2022</a:t>
+              <a:t>1/7/2023</a:t>
             </a:fld>
             <a:endParaRPr lang="en-US"/>
           </a:p>
@@ -285,7 +285,7 @@
           <a:p>
             <a:fld id="{351946EB-CC5B-4C7F-90DE-B507D3CE6B7D}" type="slidenum">
               <a:rPr lang="en-US" smtClean="0"/>
-              <a:t>‹N°›</a:t>
+              <a:t>‹#›</a:t>
             </a:fld>
             <a:endParaRPr lang="en-US"/>
           </a:p>
@@ -413,7 +413,7 @@
           <a:p>
             <a:fld id="{FACA4E01-6918-446C-9121-B61D3869F858}" type="datetimeFigureOut">
               <a:rPr lang="en-US" smtClean="0"/>
-              <a:t>11/4/2022</a:t>
+              <a:t>1/7/2023</a:t>
             </a:fld>
             <a:endParaRPr lang="en-US"/>
           </a:p>
@@ -455,7 +455,7 @@
           <a:p>
             <a:fld id="{351946EB-CC5B-4C7F-90DE-B507D3CE6B7D}" type="slidenum">
               <a:rPr lang="en-US" smtClean="0"/>
-              <a:t>‹N°›</a:t>
+              <a:t>‹#›</a:t>
             </a:fld>
             <a:endParaRPr lang="en-US"/>
           </a:p>
@@ -593,7 +593,7 @@
           <a:p>
             <a:fld id="{FACA4E01-6918-446C-9121-B61D3869F858}" type="datetimeFigureOut">
               <a:rPr lang="en-US" smtClean="0"/>
-              <a:t>11/4/2022</a:t>
+              <a:t>1/7/2023</a:t>
             </a:fld>
             <a:endParaRPr lang="en-US"/>
           </a:p>
@@ -635,7 +635,7 @@
           <a:p>
             <a:fld id="{351946EB-CC5B-4C7F-90DE-B507D3CE6B7D}" type="slidenum">
               <a:rPr lang="en-US" smtClean="0"/>
-              <a:t>‹N°›</a:t>
+              <a:t>‹#›</a:t>
             </a:fld>
             <a:endParaRPr lang="en-US"/>
           </a:p>
@@ -763,7 +763,7 @@
           <a:p>
             <a:fld id="{FACA4E01-6918-446C-9121-B61D3869F858}" type="datetimeFigureOut">
               <a:rPr lang="en-US" smtClean="0"/>
-              <a:t>11/4/2022</a:t>
+              <a:t>1/7/2023</a:t>
             </a:fld>
             <a:endParaRPr lang="en-US"/>
           </a:p>
@@ -805,7 +805,7 @@
           <a:p>
             <a:fld id="{351946EB-CC5B-4C7F-90DE-B507D3CE6B7D}" type="slidenum">
               <a:rPr lang="en-US" smtClean="0"/>
-              <a:t>‹N°›</a:t>
+              <a:t>‹#›</a:t>
             </a:fld>
             <a:endParaRPr lang="en-US"/>
           </a:p>
@@ -1009,7 +1009,7 @@
           <a:p>
             <a:fld id="{FACA4E01-6918-446C-9121-B61D3869F858}" type="datetimeFigureOut">
               <a:rPr lang="en-US" smtClean="0"/>
-              <a:t>11/4/2022</a:t>
+              <a:t>1/7/2023</a:t>
             </a:fld>
             <a:endParaRPr lang="en-US"/>
           </a:p>
@@ -1051,7 +1051,7 @@
           <a:p>
             <a:fld id="{351946EB-CC5B-4C7F-90DE-B507D3CE6B7D}" type="slidenum">
               <a:rPr lang="en-US" smtClean="0"/>
-              <a:t>‹N°›</a:t>
+              <a:t>‹#›</a:t>
             </a:fld>
             <a:endParaRPr lang="en-US"/>
           </a:p>
@@ -1241,7 +1241,7 @@
           <a:p>
             <a:fld id="{FACA4E01-6918-446C-9121-B61D3869F858}" type="datetimeFigureOut">
               <a:rPr lang="en-US" smtClean="0"/>
-              <a:t>11/4/2022</a:t>
+              <a:t>1/7/2023</a:t>
             </a:fld>
             <a:endParaRPr lang="en-US"/>
           </a:p>
@@ -1283,7 +1283,7 @@
           <a:p>
             <a:fld id="{351946EB-CC5B-4C7F-90DE-B507D3CE6B7D}" type="slidenum">
               <a:rPr lang="en-US" smtClean="0"/>
-              <a:t>‹N°›</a:t>
+              <a:t>‹#›</a:t>
             </a:fld>
             <a:endParaRPr lang="en-US"/>
           </a:p>
@@ -1608,7 +1608,7 @@
           <a:p>
             <a:fld id="{FACA4E01-6918-446C-9121-B61D3869F858}" type="datetimeFigureOut">
               <a:rPr lang="en-US" smtClean="0"/>
-              <a:t>11/4/2022</a:t>
+              <a:t>1/7/2023</a:t>
             </a:fld>
             <a:endParaRPr lang="en-US"/>
           </a:p>
@@ -1650,7 +1650,7 @@
           <a:p>
             <a:fld id="{351946EB-CC5B-4C7F-90DE-B507D3CE6B7D}" type="slidenum">
               <a:rPr lang="en-US" smtClean="0"/>
-              <a:t>‹N°›</a:t>
+              <a:t>‹#›</a:t>
             </a:fld>
             <a:endParaRPr lang="en-US"/>
           </a:p>
@@ -1726,7 +1726,7 @@
           <a:p>
             <a:fld id="{FACA4E01-6918-446C-9121-B61D3869F858}" type="datetimeFigureOut">
               <a:rPr lang="en-US" smtClean="0"/>
-              <a:t>11/4/2022</a:t>
+              <a:t>1/7/2023</a:t>
             </a:fld>
             <a:endParaRPr lang="en-US"/>
           </a:p>
@@ -1768,7 +1768,7 @@
           <a:p>
             <a:fld id="{351946EB-CC5B-4C7F-90DE-B507D3CE6B7D}" type="slidenum">
               <a:rPr lang="en-US" smtClean="0"/>
-              <a:t>‹N°›</a:t>
+              <a:t>‹#›</a:t>
             </a:fld>
             <a:endParaRPr lang="en-US"/>
           </a:p>
@@ -1821,7 +1821,7 @@
           <a:p>
             <a:fld id="{FACA4E01-6918-446C-9121-B61D3869F858}" type="datetimeFigureOut">
               <a:rPr lang="en-US" smtClean="0"/>
-              <a:t>11/4/2022</a:t>
+              <a:t>1/7/2023</a:t>
             </a:fld>
             <a:endParaRPr lang="en-US"/>
           </a:p>
@@ -1863,7 +1863,7 @@
           <a:p>
             <a:fld id="{351946EB-CC5B-4C7F-90DE-B507D3CE6B7D}" type="slidenum">
               <a:rPr lang="en-US" smtClean="0"/>
-              <a:t>‹N°›</a:t>
+              <a:t>‹#›</a:t>
             </a:fld>
             <a:endParaRPr lang="en-US"/>
           </a:p>
@@ -2098,7 +2098,7 @@
           <a:p>
             <a:fld id="{FACA4E01-6918-446C-9121-B61D3869F858}" type="datetimeFigureOut">
               <a:rPr lang="en-US" smtClean="0"/>
-              <a:t>11/4/2022</a:t>
+              <a:t>1/7/2023</a:t>
             </a:fld>
             <a:endParaRPr lang="en-US"/>
           </a:p>
@@ -2140,7 +2140,7 @@
           <a:p>
             <a:fld id="{351946EB-CC5B-4C7F-90DE-B507D3CE6B7D}" type="slidenum">
               <a:rPr lang="en-US" smtClean="0"/>
-              <a:t>‹N°›</a:t>
+              <a:t>‹#›</a:t>
             </a:fld>
             <a:endParaRPr lang="en-US"/>
           </a:p>
@@ -2355,7 +2355,7 @@
           <a:p>
             <a:fld id="{FACA4E01-6918-446C-9121-B61D3869F858}" type="datetimeFigureOut">
               <a:rPr lang="en-US" smtClean="0"/>
-              <a:t>11/4/2022</a:t>
+              <a:t>1/7/2023</a:t>
             </a:fld>
             <a:endParaRPr lang="en-US"/>
           </a:p>
@@ -2397,7 +2397,7 @@
           <a:p>
             <a:fld id="{351946EB-CC5B-4C7F-90DE-B507D3CE6B7D}" type="slidenum">
               <a:rPr lang="en-US" smtClean="0"/>
-              <a:t>‹N°›</a:t>
+              <a:t>‹#›</a:t>
             </a:fld>
             <a:endParaRPr lang="en-US"/>
           </a:p>
@@ -2568,7 +2568,7 @@
           <a:p>
             <a:fld id="{FACA4E01-6918-446C-9121-B61D3869F858}" type="datetimeFigureOut">
               <a:rPr lang="en-US" smtClean="0"/>
-              <a:t>11/4/2022</a:t>
+              <a:t>1/7/2023</a:t>
             </a:fld>
             <a:endParaRPr lang="en-US"/>
           </a:p>
@@ -2646,7 +2646,7 @@
           <a:p>
             <a:fld id="{351946EB-CC5B-4C7F-90DE-B507D3CE6B7D}" type="slidenum">
               <a:rPr lang="en-US" smtClean="0"/>
-              <a:t>‹N°›</a:t>
+              <a:t>‹#›</a:t>
             </a:fld>
             <a:endParaRPr lang="en-US"/>
           </a:p>
@@ -2973,118 +2973,12 @@
           <a:chExt cx="0" cy="0"/>
         </a:xfrm>
       </p:grpSpPr>
-      <p:sp>
-        <p:nvSpPr>
-          <p:cNvPr id="16" name="Arrow: Chevron 15">
+      <p:grpSp>
+        <p:nvGrpSpPr>
+          <p:cNvPr id="4" name="Group 3">
             <a:extLst>
               <a:ext uri="{FF2B5EF4-FFF2-40B4-BE49-F238E27FC236}">
-                <a16:creationId xmlns:a16="http://schemas.microsoft.com/office/drawing/2014/main" id="{5CA8368A-1351-3C2D-7170-1C2E99C9EBCB}"/>
-              </a:ext>
-            </a:extLst>
-          </p:cNvPr>
-          <p:cNvSpPr/>
-          <p:nvPr/>
-        </p:nvSpPr>
-        <p:spPr>
-          <a:xfrm>
-            <a:off x="282388" y="1413117"/>
-            <a:ext cx="11753968" cy="900000"/>
-          </a:xfrm>
-          <a:prstGeom prst="chevron">
-            <a:avLst>
-              <a:gd name="adj" fmla="val 35343"/>
-            </a:avLst>
-          </a:prstGeom>
-          <a:solidFill>
-            <a:schemeClr val="accent1">
-              <a:lumMod val="75000"/>
-              <a:alpha val="38000"/>
-            </a:schemeClr>
-          </a:solidFill>
-          <a:ln>
-            <a:noFill/>
-          </a:ln>
-        </p:spPr>
-        <p:style>
-          <a:lnRef idx="2">
-            <a:schemeClr val="accent1">
-              <a:shade val="50000"/>
-            </a:schemeClr>
-          </a:lnRef>
-          <a:fillRef idx="1">
-            <a:schemeClr val="accent1"/>
-          </a:fillRef>
-          <a:effectRef idx="0">
-            <a:schemeClr val="accent1"/>
-          </a:effectRef>
-          <a:fontRef idx="minor">
-            <a:schemeClr val="lt1"/>
-          </a:fontRef>
-        </p:style>
-        <p:txBody>
-          <a:bodyPr rtlCol="0" anchor="ctr"/>
-          <a:lstStyle/>
-          <a:p>
-            <a:pPr algn="ctr"/>
-            <a:endParaRPr lang="en-US" sz="1600">
-              <a:solidFill>
-                <a:schemeClr val="tx1"/>
-              </a:solidFill>
-              <a:latin typeface="Cambria" panose="02040503050406030204" pitchFamily="18" charset="0"/>
-              <a:ea typeface="Cambria" panose="02040503050406030204" pitchFamily="18" charset="0"/>
-            </a:endParaRPr>
-          </a:p>
-        </p:txBody>
-      </p:sp>
-      <p:sp>
-        <p:nvSpPr>
-          <p:cNvPr id="2" name="ZoneTexte 1">
-            <a:extLst>
-              <a:ext uri="{FF2B5EF4-FFF2-40B4-BE49-F238E27FC236}">
-                <a16:creationId xmlns:a16="http://schemas.microsoft.com/office/drawing/2014/main" id="{38EA7C1D-E82C-02B6-BABE-B901632F76BF}"/>
-              </a:ext>
-            </a:extLst>
-          </p:cNvPr>
-          <p:cNvSpPr txBox="1"/>
-          <p:nvPr/>
-        </p:nvSpPr>
-        <p:spPr>
-          <a:xfrm>
-            <a:off x="3449502" y="532876"/>
-            <a:ext cx="5292995" cy="584775"/>
-          </a:xfrm>
-          <a:prstGeom prst="rect">
-            <a:avLst/>
-          </a:prstGeom>
-          <a:noFill/>
-        </p:spPr>
-        <p:txBody>
-          <a:bodyPr wrap="square" rtlCol="0">
-            <a:spAutoFit/>
-          </a:bodyPr>
-          <a:lstStyle/>
-          <a:p>
-            <a:pPr algn="ctr"/>
-            <a:r>
-              <a:rPr lang="en-US" sz="3200" dirty="0">
-                <a:latin typeface="Cambria" panose="02040503050406030204" pitchFamily="18" charset="0"/>
-                <a:ea typeface="Cambria" panose="02040503050406030204" pitchFamily="18" charset="0"/>
-              </a:rPr>
-              <a:t>UAV controlled by hand signs</a:t>
-            </a:r>
-            <a:endParaRPr lang="fr-FR" sz="3200" dirty="0">
-              <a:latin typeface="Cambria" panose="02040503050406030204" pitchFamily="18" charset="0"/>
-              <a:ea typeface="Cambria" panose="02040503050406030204" pitchFamily="18" charset="0"/>
-            </a:endParaRPr>
-          </a:p>
-        </p:txBody>
-      </p:sp>
-      <p:grpSp>
-        <p:nvGrpSpPr>
-          <p:cNvPr id="56" name="Group 55">
-            <a:extLst>
-              <a:ext uri="{FF2B5EF4-FFF2-40B4-BE49-F238E27FC236}">
-                <a16:creationId xmlns:a16="http://schemas.microsoft.com/office/drawing/2014/main" id="{1E4715BA-A5FD-A5A0-6229-09834270EC73}"/>
+                <a16:creationId xmlns:a16="http://schemas.microsoft.com/office/drawing/2014/main" id="{D3D72F9D-A64F-E769-1084-60FA6BDD7720}"/>
               </a:ext>
             </a:extLst>
           </p:cNvPr>
@@ -3093,18 +2987,124 @@
         </p:nvGrpSpPr>
         <p:grpSpPr>
           <a:xfrm>
-            <a:off x="5251785" y="1321195"/>
-            <a:ext cx="1800001" cy="3376306"/>
-            <a:chOff x="5251785" y="1321195"/>
-            <a:chExt cx="1800001" cy="3376306"/>
+            <a:off x="282388" y="532876"/>
+            <a:ext cx="11753968" cy="5761464"/>
+            <a:chOff x="282388" y="532876"/>
+            <a:chExt cx="11753968" cy="5761464"/>
           </a:xfrm>
         </p:grpSpPr>
+        <p:sp>
+          <p:nvSpPr>
+            <p:cNvPr id="16" name="Arrow: Chevron 15">
+              <a:extLst>
+                <a:ext uri="{FF2B5EF4-FFF2-40B4-BE49-F238E27FC236}">
+                  <a16:creationId xmlns:a16="http://schemas.microsoft.com/office/drawing/2014/main" id="{5CA8368A-1351-3C2D-7170-1C2E99C9EBCB}"/>
+                </a:ext>
+              </a:extLst>
+            </p:cNvPr>
+            <p:cNvSpPr/>
+            <p:nvPr/>
+          </p:nvSpPr>
+          <p:spPr>
+            <a:xfrm>
+              <a:off x="282388" y="1413117"/>
+              <a:ext cx="11753968" cy="900000"/>
+            </a:xfrm>
+            <a:prstGeom prst="chevron">
+              <a:avLst>
+                <a:gd name="adj" fmla="val 35343"/>
+              </a:avLst>
+            </a:prstGeom>
+            <a:solidFill>
+              <a:schemeClr val="accent1">
+                <a:lumMod val="75000"/>
+                <a:alpha val="38000"/>
+              </a:schemeClr>
+            </a:solidFill>
+            <a:ln>
+              <a:noFill/>
+            </a:ln>
+          </p:spPr>
+          <p:style>
+            <a:lnRef idx="2">
+              <a:schemeClr val="accent1">
+                <a:shade val="50000"/>
+              </a:schemeClr>
+            </a:lnRef>
+            <a:fillRef idx="1">
+              <a:schemeClr val="accent1"/>
+            </a:fillRef>
+            <a:effectRef idx="0">
+              <a:schemeClr val="accent1"/>
+            </a:effectRef>
+            <a:fontRef idx="minor">
+              <a:schemeClr val="lt1"/>
+            </a:fontRef>
+          </p:style>
+          <p:txBody>
+            <a:bodyPr rtlCol="0" anchor="ctr"/>
+            <a:lstStyle/>
+            <a:p>
+              <a:pPr algn="ctr"/>
+              <a:endParaRPr lang="en-US" sz="1600">
+                <a:solidFill>
+                  <a:schemeClr val="tx1"/>
+                </a:solidFill>
+                <a:latin typeface="Cambria" panose="02040503050406030204" pitchFamily="18" charset="0"/>
+                <a:ea typeface="Cambria" panose="02040503050406030204" pitchFamily="18" charset="0"/>
+              </a:endParaRPr>
+            </a:p>
+          </p:txBody>
+        </p:sp>
+        <p:sp>
+          <p:nvSpPr>
+            <p:cNvPr id="2" name="ZoneTexte 1">
+              <a:extLst>
+                <a:ext uri="{FF2B5EF4-FFF2-40B4-BE49-F238E27FC236}">
+                  <a16:creationId xmlns:a16="http://schemas.microsoft.com/office/drawing/2014/main" id="{38EA7C1D-E82C-02B6-BABE-B901632F76BF}"/>
+                </a:ext>
+              </a:extLst>
+            </p:cNvPr>
+            <p:cNvSpPr txBox="1"/>
+            <p:nvPr/>
+          </p:nvSpPr>
+          <p:spPr>
+            <a:xfrm>
+              <a:off x="3449502" y="532876"/>
+              <a:ext cx="5292995" cy="584775"/>
+            </a:xfrm>
+            <a:prstGeom prst="rect">
+              <a:avLst/>
+            </a:prstGeom>
+            <a:noFill/>
+          </p:spPr>
+          <p:txBody>
+            <a:bodyPr wrap="square" rtlCol="0">
+              <a:spAutoFit/>
+            </a:bodyPr>
+            <a:lstStyle/>
+            <a:p>
+              <a:pPr algn="ctr"/>
+              <a:r>
+                <a:rPr lang="en-US" sz="3200" dirty="0">
+                  <a:latin typeface="Cambria" panose="02040503050406030204" pitchFamily="18" charset="0"/>
+                  <a:ea typeface="Cambria" panose="02040503050406030204" pitchFamily="18" charset="0"/>
+                </a:rPr>
+                <a:t>UAV controlled by hand signs</a:t>
+              </a:r>
+              <a:endParaRPr lang="fr-FR" sz="3200" dirty="0">
+                <a:latin typeface="Cambria" panose="02040503050406030204" pitchFamily="18" charset="0"/>
+                <a:ea typeface="Cambria" panose="02040503050406030204" pitchFamily="18" charset="0"/>
+              </a:endParaRPr>
+            </a:p>
+          </p:txBody>
+        </p:sp>
         <p:grpSp>
           <p:nvGrpSpPr>
-            <p:cNvPr id="36" name="Group 35">
+            <p:cNvPr id="56" name="Group 55">
               <a:extLst>
                 <a:ext uri="{FF2B5EF4-FFF2-40B4-BE49-F238E27FC236}">
-                  <a16:creationId xmlns:a16="http://schemas.microsoft.com/office/drawing/2014/main" id="{CAC4E735-5C0C-3193-B8D8-074FCA56090A}"/>
+                  <a16:creationId xmlns:a16="http://schemas.microsoft.com/office/drawing/2014/main" id="{1E4715BA-A5FD-A5A0-6229-09834270EC73}"/>
                 </a:ext>
               </a:extLst>
             </p:cNvPr>
@@ -3113,1084 +3113,18 @@
           </p:nvGrpSpPr>
           <p:grpSpPr>
             <a:xfrm>
-              <a:off x="5251785" y="2351320"/>
-              <a:ext cx="1800001" cy="2346181"/>
-              <a:chOff x="5015586" y="1997110"/>
-              <a:chExt cx="1800001" cy="2346181"/>
+              <a:off x="5251785" y="1321195"/>
+              <a:ext cx="1800001" cy="3376306"/>
+              <a:chOff x="5251785" y="1321195"/>
+              <a:chExt cx="1800001" cy="3376306"/>
             </a:xfrm>
           </p:grpSpPr>
-          <p:sp>
-            <p:nvSpPr>
-              <p:cNvPr id="25" name="Rectangle 24">
+          <p:grpSp>
+            <p:nvGrpSpPr>
+              <p:cNvPr id="36" name="Group 35">
                 <a:extLst>
                   <a:ext uri="{FF2B5EF4-FFF2-40B4-BE49-F238E27FC236}">
-                    <a16:creationId xmlns:a16="http://schemas.microsoft.com/office/drawing/2014/main" id="{53E2929C-0C7C-9AB5-D9EF-1AD813CB55D2}"/>
-                  </a:ext>
-                </a:extLst>
-              </p:cNvPr>
-              <p:cNvSpPr/>
-              <p:nvPr/>
-            </p:nvSpPr>
-            <p:spPr>
-              <a:xfrm>
-                <a:off x="5015587" y="3443291"/>
-                <a:ext cx="1800000" cy="900000"/>
-              </a:xfrm>
-              <a:prstGeom prst="rect">
-                <a:avLst/>
-              </a:prstGeom>
-              <a:solidFill>
-                <a:schemeClr val="accent2">
-                  <a:lumMod val="60000"/>
-                  <a:lumOff val="40000"/>
-                </a:schemeClr>
-              </a:solidFill>
-              <a:ln>
-                <a:noFill/>
-              </a:ln>
-            </p:spPr>
-            <p:style>
-              <a:lnRef idx="2">
-                <a:schemeClr val="dk1"/>
-              </a:lnRef>
-              <a:fillRef idx="1">
-                <a:schemeClr val="lt1"/>
-              </a:fillRef>
-              <a:effectRef idx="0">
-                <a:schemeClr val="dk1"/>
-              </a:effectRef>
-              <a:fontRef idx="minor">
-                <a:schemeClr val="dk1"/>
-              </a:fontRef>
-            </p:style>
-            <p:txBody>
-              <a:bodyPr rtlCol="0" anchor="ctr"/>
-              <a:lstStyle/>
-              <a:p>
-                <a:pPr algn="ctr"/>
-                <a:endParaRPr lang="en-US" sz="1600" dirty="0">
-                  <a:latin typeface="Cambria" panose="02040503050406030204" pitchFamily="18" charset="0"/>
-                  <a:ea typeface="Cambria" panose="02040503050406030204" pitchFamily="18" charset="0"/>
-                </a:endParaRPr>
-              </a:p>
-              <a:p>
-                <a:pPr algn="ctr"/>
-                <a:r>
-                  <a:rPr lang="en-US" sz="1600" dirty="0">
-                    <a:latin typeface="Cambria" panose="02040503050406030204" pitchFamily="18" charset="0"/>
-                    <a:ea typeface="Cambria" panose="02040503050406030204" pitchFamily="18" charset="0"/>
-                  </a:rPr>
-                  <a:t>Publish instructions</a:t>
-                </a:r>
-                <a:endParaRPr lang="fr-FR" sz="1600" dirty="0">
-                  <a:latin typeface="Cambria" panose="02040503050406030204" pitchFamily="18" charset="0"/>
-                  <a:ea typeface="Cambria" panose="02040503050406030204" pitchFamily="18" charset="0"/>
-                </a:endParaRPr>
-              </a:p>
-            </p:txBody>
-          </p:sp>
-          <p:sp>
-            <p:nvSpPr>
-              <p:cNvPr id="24" name="Flowchart: Off-page Connector 23">
-                <a:extLst>
-                  <a:ext uri="{FF2B5EF4-FFF2-40B4-BE49-F238E27FC236}">
-                    <a16:creationId xmlns:a16="http://schemas.microsoft.com/office/drawing/2014/main" id="{03190A97-7354-A01D-3A50-97EA6E6ED4CD}"/>
-                  </a:ext>
-                </a:extLst>
-              </p:cNvPr>
-              <p:cNvSpPr/>
-              <p:nvPr/>
-            </p:nvSpPr>
-            <p:spPr>
-              <a:xfrm>
-                <a:off x="5015586" y="2725269"/>
-                <a:ext cx="1800000" cy="900000"/>
-              </a:xfrm>
-              <a:prstGeom prst="flowChartOffpageConnector">
-                <a:avLst/>
-              </a:prstGeom>
-              <a:solidFill>
-                <a:schemeClr val="accent2">
-                  <a:lumMod val="40000"/>
-                  <a:lumOff val="60000"/>
-                </a:schemeClr>
-              </a:solidFill>
-              <a:ln>
-                <a:noFill/>
-              </a:ln>
-            </p:spPr>
-            <p:style>
-              <a:lnRef idx="2">
-                <a:schemeClr val="dk1"/>
-              </a:lnRef>
-              <a:fillRef idx="1">
-                <a:schemeClr val="lt1"/>
-              </a:fillRef>
-              <a:effectRef idx="0">
-                <a:schemeClr val="dk1"/>
-              </a:effectRef>
-              <a:fontRef idx="minor">
-                <a:schemeClr val="dk1"/>
-              </a:fontRef>
-            </p:style>
-            <p:txBody>
-              <a:bodyPr rtlCol="0" anchor="ctr"/>
-              <a:lstStyle/>
-              <a:p>
-                <a:pPr algn="ctr"/>
-                <a:endParaRPr lang="en-US" sz="1600" dirty="0">
-                  <a:latin typeface="Cambria" panose="02040503050406030204" pitchFamily="18" charset="0"/>
-                  <a:ea typeface="Cambria" panose="02040503050406030204" pitchFamily="18" charset="0"/>
-                </a:endParaRPr>
-              </a:p>
-              <a:p>
-                <a:pPr algn="ctr"/>
-                <a:r>
-                  <a:rPr lang="en-US" sz="1600" dirty="0">
-                    <a:latin typeface="Cambria" panose="02040503050406030204" pitchFamily="18" charset="0"/>
-                    <a:ea typeface="Cambria" panose="02040503050406030204" pitchFamily="18" charset="0"/>
-                  </a:rPr>
-                  <a:t>Recognize hand signs</a:t>
-                </a:r>
-                <a:endParaRPr lang="fr-FR" sz="1600" dirty="0">
-                  <a:latin typeface="Cambria" panose="02040503050406030204" pitchFamily="18" charset="0"/>
-                  <a:ea typeface="Cambria" panose="02040503050406030204" pitchFamily="18" charset="0"/>
-                </a:endParaRPr>
-              </a:p>
-            </p:txBody>
-          </p:sp>
-          <p:sp>
-            <p:nvSpPr>
-              <p:cNvPr id="23" name="Flowchart: Off-page Connector 22">
-                <a:extLst>
-                  <a:ext uri="{FF2B5EF4-FFF2-40B4-BE49-F238E27FC236}">
-                    <a16:creationId xmlns:a16="http://schemas.microsoft.com/office/drawing/2014/main" id="{5E86563B-D5EA-7C16-6FC2-D4D76032F9C8}"/>
-                  </a:ext>
-                </a:extLst>
-              </p:cNvPr>
-              <p:cNvSpPr/>
-              <p:nvPr/>
-            </p:nvSpPr>
-            <p:spPr>
-              <a:xfrm>
-                <a:off x="5015586" y="1997110"/>
-                <a:ext cx="1800000" cy="900000"/>
-              </a:xfrm>
-              <a:prstGeom prst="flowChartOffpageConnector">
-                <a:avLst/>
-              </a:prstGeom>
-              <a:solidFill>
-                <a:schemeClr val="accent2">
-                  <a:lumMod val="20000"/>
-                  <a:lumOff val="80000"/>
-                </a:schemeClr>
-              </a:solidFill>
-              <a:ln>
-                <a:noFill/>
-              </a:ln>
-            </p:spPr>
-            <p:style>
-              <a:lnRef idx="2">
-                <a:schemeClr val="dk1"/>
-              </a:lnRef>
-              <a:fillRef idx="1">
-                <a:schemeClr val="lt1"/>
-              </a:fillRef>
-              <a:effectRef idx="0">
-                <a:schemeClr val="dk1"/>
-              </a:effectRef>
-              <a:fontRef idx="minor">
-                <a:schemeClr val="dk1"/>
-              </a:fontRef>
-            </p:style>
-            <p:txBody>
-              <a:bodyPr rtlCol="0" anchor="ctr"/>
-              <a:lstStyle/>
-              <a:p>
-                <a:pPr algn="ctr"/>
-                <a:r>
-                  <a:rPr lang="en-US" sz="1600" dirty="0">
-                    <a:latin typeface="Cambria" panose="02040503050406030204" pitchFamily="18" charset="0"/>
-                    <a:ea typeface="Cambria" panose="02040503050406030204" pitchFamily="18" charset="0"/>
-                  </a:rPr>
-                  <a:t>Detect hand in image</a:t>
-                </a:r>
-                <a:endParaRPr lang="fr-FR" sz="1600" dirty="0">
-                  <a:latin typeface="Cambria" panose="02040503050406030204" pitchFamily="18" charset="0"/>
-                  <a:ea typeface="Cambria" panose="02040503050406030204" pitchFamily="18" charset="0"/>
-                </a:endParaRPr>
-              </a:p>
-            </p:txBody>
-          </p:sp>
-        </p:grpSp>
-        <p:grpSp>
-          <p:nvGrpSpPr>
-            <p:cNvPr id="37" name="Group 36">
-              <a:extLst>
-                <a:ext uri="{FF2B5EF4-FFF2-40B4-BE49-F238E27FC236}">
-                  <a16:creationId xmlns:a16="http://schemas.microsoft.com/office/drawing/2014/main" id="{6E4B563A-03EA-93EB-2B82-6D3BE2D01B1C}"/>
-                </a:ext>
-              </a:extLst>
-            </p:cNvPr>
-            <p:cNvGrpSpPr/>
-            <p:nvPr/>
-          </p:nvGrpSpPr>
-          <p:grpSpPr>
-            <a:xfrm>
-              <a:off x="5416432" y="1321195"/>
-              <a:ext cx="1470707" cy="1029931"/>
-              <a:chOff x="5416432" y="1321195"/>
-              <a:chExt cx="1470707" cy="1029931"/>
-            </a:xfrm>
-          </p:grpSpPr>
-          <p:pic>
-            <p:nvPicPr>
-              <p:cNvPr id="19" name="Graphique 18" descr="Ordinateur avec un remplissage uni">
-                <a:extLst>
-                  <a:ext uri="{FF2B5EF4-FFF2-40B4-BE49-F238E27FC236}">
-                    <a16:creationId xmlns:a16="http://schemas.microsoft.com/office/drawing/2014/main" id="{22F3FCBA-4825-C11A-818E-6B0A6A962A26}"/>
-                  </a:ext>
-                </a:extLst>
-              </p:cNvPr>
-              <p:cNvPicPr>
-                <a:picLocks noChangeAspect="1"/>
-              </p:cNvPicPr>
-              <p:nvPr/>
-            </p:nvPicPr>
-            <p:blipFill>
-              <a:blip r:embed="rId2">
-                <a:extLst>
-                  <a:ext uri="{28A0092B-C50C-407E-A947-70E740481C1C}">
-                    <a14:useLocalDpi xmlns:a14="http://schemas.microsoft.com/office/drawing/2010/main" val="0"/>
-                  </a:ext>
-                  <a:ext uri="{96DAC541-7B7A-43D3-8B79-37D633B846F1}">
-                    <asvg:svgBlip xmlns:asvg="http://schemas.microsoft.com/office/drawing/2016/SVG/main" r:embed="rId3"/>
-                  </a:ext>
-                </a:extLst>
-              </a:blip>
-              <a:stretch>
-                <a:fillRect/>
-              </a:stretch>
-            </p:blipFill>
-            <p:spPr>
-              <a:xfrm>
-                <a:off x="5701785" y="1321195"/>
-                <a:ext cx="900000" cy="900000"/>
-              </a:xfrm>
-              <a:prstGeom prst="rect">
-                <a:avLst/>
-              </a:prstGeom>
-            </p:spPr>
-          </p:pic>
-          <p:sp>
-            <p:nvSpPr>
-              <p:cNvPr id="6" name="TextBox 5">
-                <a:extLst>
-                  <a:ext uri="{FF2B5EF4-FFF2-40B4-BE49-F238E27FC236}">
-                    <a16:creationId xmlns:a16="http://schemas.microsoft.com/office/drawing/2014/main" id="{49988E71-D571-5158-EB0A-4569EDF15757}"/>
-                  </a:ext>
-                </a:extLst>
-              </p:cNvPr>
-              <p:cNvSpPr txBox="1"/>
-              <p:nvPr/>
-            </p:nvSpPr>
-            <p:spPr>
-              <a:xfrm>
-                <a:off x="5416432" y="2074127"/>
-                <a:ext cx="1470707" cy="276999"/>
-              </a:xfrm>
-              <a:prstGeom prst="rect">
-                <a:avLst/>
-              </a:prstGeom>
-              <a:noFill/>
-            </p:spPr>
-            <p:txBody>
-              <a:bodyPr wrap="square" rtlCol="0">
-                <a:spAutoFit/>
-              </a:bodyPr>
-              <a:lstStyle/>
-              <a:p>
-                <a:pPr algn="ctr"/>
-                <a:r>
-                  <a:rPr lang="fr-FR" sz="1200" dirty="0">
-                    <a:latin typeface="Cambria" panose="02040503050406030204" pitchFamily="18" charset="0"/>
-                    <a:ea typeface="Cambria" panose="02040503050406030204" pitchFamily="18" charset="0"/>
-                  </a:rPr>
-                  <a:t>Raspberry</a:t>
-                </a:r>
-                <a:endParaRPr lang="en-US" sz="1200" dirty="0">
-                  <a:latin typeface="Cambria" panose="02040503050406030204" pitchFamily="18" charset="0"/>
-                  <a:ea typeface="Cambria" panose="02040503050406030204" pitchFamily="18" charset="0"/>
-                </a:endParaRPr>
-              </a:p>
-            </p:txBody>
-          </p:sp>
-        </p:grpSp>
-      </p:grpSp>
-      <p:grpSp>
-        <p:nvGrpSpPr>
-          <p:cNvPr id="57" name="Group 56">
-            <a:extLst>
-              <a:ext uri="{FF2B5EF4-FFF2-40B4-BE49-F238E27FC236}">
-                <a16:creationId xmlns:a16="http://schemas.microsoft.com/office/drawing/2014/main" id="{B25219CC-7076-0146-E5DB-10F5D20DA180}"/>
-              </a:ext>
-            </a:extLst>
-          </p:cNvPr>
-          <p:cNvGrpSpPr/>
-          <p:nvPr/>
-        </p:nvGrpSpPr>
-        <p:grpSpPr>
-          <a:xfrm>
-            <a:off x="7548243" y="1321195"/>
-            <a:ext cx="1800000" cy="2642033"/>
-            <a:chOff x="7548243" y="1321195"/>
-            <a:chExt cx="1800000" cy="2642033"/>
-          </a:xfrm>
-        </p:grpSpPr>
-        <p:grpSp>
-          <p:nvGrpSpPr>
-            <p:cNvPr id="38" name="Group 37">
-              <a:extLst>
-                <a:ext uri="{FF2B5EF4-FFF2-40B4-BE49-F238E27FC236}">
-                  <a16:creationId xmlns:a16="http://schemas.microsoft.com/office/drawing/2014/main" id="{B5B9CDE3-8A0B-9F2C-D08C-F55D7FDF2A01}"/>
-                </a:ext>
-              </a:extLst>
-            </p:cNvPr>
-            <p:cNvGrpSpPr/>
-            <p:nvPr/>
-          </p:nvGrpSpPr>
-          <p:grpSpPr>
-            <a:xfrm>
-              <a:off x="7548243" y="2351320"/>
-              <a:ext cx="1800000" cy="1611908"/>
-              <a:chOff x="7293384" y="1997110"/>
-              <a:chExt cx="1800000" cy="1611908"/>
-            </a:xfrm>
-          </p:grpSpPr>
-          <p:sp>
-            <p:nvSpPr>
-              <p:cNvPr id="29" name="Rectangle 28">
-                <a:extLst>
-                  <a:ext uri="{FF2B5EF4-FFF2-40B4-BE49-F238E27FC236}">
-                    <a16:creationId xmlns:a16="http://schemas.microsoft.com/office/drawing/2014/main" id="{D37A9FA9-6751-EB66-685E-E50CDA00D452}"/>
-                  </a:ext>
-                </a:extLst>
-              </p:cNvPr>
-              <p:cNvSpPr/>
-              <p:nvPr/>
-            </p:nvSpPr>
-            <p:spPr>
-              <a:xfrm>
-                <a:off x="7293384" y="2709018"/>
-                <a:ext cx="1800000" cy="900000"/>
-              </a:xfrm>
-              <a:prstGeom prst="rect">
-                <a:avLst/>
-              </a:prstGeom>
-              <a:solidFill>
-                <a:schemeClr val="accent2">
-                  <a:lumMod val="40000"/>
-                  <a:lumOff val="60000"/>
-                </a:schemeClr>
-              </a:solidFill>
-              <a:ln>
-                <a:noFill/>
-              </a:ln>
-            </p:spPr>
-            <p:style>
-              <a:lnRef idx="2">
-                <a:schemeClr val="dk1"/>
-              </a:lnRef>
-              <a:fillRef idx="1">
-                <a:schemeClr val="lt1"/>
-              </a:fillRef>
-              <a:effectRef idx="0">
-                <a:schemeClr val="dk1"/>
-              </a:effectRef>
-              <a:fontRef idx="minor">
-                <a:schemeClr val="dk1"/>
-              </a:fontRef>
-            </p:style>
-            <p:txBody>
-              <a:bodyPr rtlCol="0" anchor="ctr"/>
-              <a:lstStyle/>
-              <a:p>
-                <a:pPr algn="ctr"/>
-                <a:endParaRPr lang="en-US" sz="1600" dirty="0">
-                  <a:latin typeface="Cambria" panose="02040503050406030204" pitchFamily="18" charset="0"/>
-                  <a:ea typeface="Cambria" panose="02040503050406030204" pitchFamily="18" charset="0"/>
-                </a:endParaRPr>
-              </a:p>
-              <a:p>
-                <a:pPr algn="ctr"/>
-                <a:r>
-                  <a:rPr lang="en-US" sz="1600" dirty="0">
-                    <a:latin typeface="Cambria" panose="02040503050406030204" pitchFamily="18" charset="0"/>
-                    <a:ea typeface="Cambria" panose="02040503050406030204" pitchFamily="18" charset="0"/>
-                  </a:rPr>
-                  <a:t>Send instructions to the client</a:t>
-                </a:r>
-                <a:endParaRPr lang="fr-FR" sz="1600" dirty="0">
-                  <a:latin typeface="Cambria" panose="02040503050406030204" pitchFamily="18" charset="0"/>
-                  <a:ea typeface="Cambria" panose="02040503050406030204" pitchFamily="18" charset="0"/>
-                </a:endParaRPr>
-              </a:p>
-            </p:txBody>
-          </p:sp>
-          <p:sp>
-            <p:nvSpPr>
-              <p:cNvPr id="28" name="Flowchart: Off-page Connector 27">
-                <a:extLst>
-                  <a:ext uri="{FF2B5EF4-FFF2-40B4-BE49-F238E27FC236}">
-                    <a16:creationId xmlns:a16="http://schemas.microsoft.com/office/drawing/2014/main" id="{4B1CE382-AE53-6681-24E2-E798118BB02A}"/>
-                  </a:ext>
-                </a:extLst>
-              </p:cNvPr>
-              <p:cNvSpPr/>
-              <p:nvPr/>
-            </p:nvSpPr>
-            <p:spPr>
-              <a:xfrm>
-                <a:off x="7293384" y="1997110"/>
-                <a:ext cx="1800000" cy="900000"/>
-              </a:xfrm>
-              <a:prstGeom prst="flowChartOffpageConnector">
-                <a:avLst/>
-              </a:prstGeom>
-              <a:solidFill>
-                <a:schemeClr val="accent2">
-                  <a:lumMod val="20000"/>
-                  <a:lumOff val="80000"/>
-                </a:schemeClr>
-              </a:solidFill>
-              <a:ln>
-                <a:noFill/>
-              </a:ln>
-            </p:spPr>
-            <p:style>
-              <a:lnRef idx="2">
-                <a:schemeClr val="dk1"/>
-              </a:lnRef>
-              <a:fillRef idx="1">
-                <a:schemeClr val="lt1"/>
-              </a:fillRef>
-              <a:effectRef idx="0">
-                <a:schemeClr val="dk1"/>
-              </a:effectRef>
-              <a:fontRef idx="minor">
-                <a:schemeClr val="dk1"/>
-              </a:fontRef>
-            </p:style>
-            <p:txBody>
-              <a:bodyPr rtlCol="0" anchor="ctr"/>
-              <a:lstStyle/>
-              <a:p>
-                <a:pPr algn="ctr"/>
-                <a:r>
-                  <a:rPr lang="en-US" sz="1600" dirty="0">
-                    <a:latin typeface="Cambria" panose="02040503050406030204" pitchFamily="18" charset="0"/>
-                    <a:ea typeface="Cambria" panose="02040503050406030204" pitchFamily="18" charset="0"/>
-                  </a:rPr>
-                  <a:t>Receive instructions from computer</a:t>
-                </a:r>
-                <a:endParaRPr lang="fr-FR" sz="1600" dirty="0">
-                  <a:latin typeface="Cambria" panose="02040503050406030204" pitchFamily="18" charset="0"/>
-                  <a:ea typeface="Cambria" panose="02040503050406030204" pitchFamily="18" charset="0"/>
-                </a:endParaRPr>
-              </a:p>
-            </p:txBody>
-          </p:sp>
-        </p:grpSp>
-        <p:grpSp>
-          <p:nvGrpSpPr>
-            <p:cNvPr id="45" name="Group 44">
-              <a:extLst>
-                <a:ext uri="{FF2B5EF4-FFF2-40B4-BE49-F238E27FC236}">
-                  <a16:creationId xmlns:a16="http://schemas.microsoft.com/office/drawing/2014/main" id="{7D143604-3C6E-C227-85D0-66671DB0EF03}"/>
-                </a:ext>
-              </a:extLst>
-            </p:cNvPr>
-            <p:cNvGrpSpPr/>
-            <p:nvPr/>
-          </p:nvGrpSpPr>
-          <p:grpSpPr>
-            <a:xfrm>
-              <a:off x="7712890" y="1321195"/>
-              <a:ext cx="1470707" cy="1029931"/>
-              <a:chOff x="7712890" y="1321195"/>
-              <a:chExt cx="1470707" cy="1029931"/>
-            </a:xfrm>
-          </p:grpSpPr>
-          <p:pic>
-            <p:nvPicPr>
-              <p:cNvPr id="13" name="Graphique 12" descr="Synchronisation avec le cloud avec un remplissage uni">
-                <a:extLst>
-                  <a:ext uri="{FF2B5EF4-FFF2-40B4-BE49-F238E27FC236}">
-                    <a16:creationId xmlns:a16="http://schemas.microsoft.com/office/drawing/2014/main" id="{9C3DFEFA-38DC-DF4F-003B-F1F1237D1071}"/>
-                  </a:ext>
-                </a:extLst>
-              </p:cNvPr>
-              <p:cNvPicPr>
-                <a:picLocks noChangeAspect="1"/>
-              </p:cNvPicPr>
-              <p:nvPr/>
-            </p:nvPicPr>
-            <p:blipFill>
-              <a:blip r:embed="rId4">
-                <a:extLst>
-                  <a:ext uri="{28A0092B-C50C-407E-A947-70E740481C1C}">
-                    <a14:useLocalDpi xmlns:a14="http://schemas.microsoft.com/office/drawing/2010/main" val="0"/>
-                  </a:ext>
-                  <a:ext uri="{96DAC541-7B7A-43D3-8B79-37D633B846F1}">
-                    <asvg:svgBlip xmlns:asvg="http://schemas.microsoft.com/office/drawing/2016/SVG/main" r:embed="rId5"/>
-                  </a:ext>
-                </a:extLst>
-              </a:blip>
-              <a:stretch>
-                <a:fillRect/>
-              </a:stretch>
-            </p:blipFill>
-            <p:spPr>
-              <a:xfrm>
-                <a:off x="7998243" y="1321195"/>
-                <a:ext cx="900000" cy="900000"/>
-              </a:xfrm>
-              <a:prstGeom prst="rect">
-                <a:avLst/>
-              </a:prstGeom>
-            </p:spPr>
-          </p:pic>
-          <p:sp>
-            <p:nvSpPr>
-              <p:cNvPr id="7" name="TextBox 6">
-                <a:extLst>
-                  <a:ext uri="{FF2B5EF4-FFF2-40B4-BE49-F238E27FC236}">
-                    <a16:creationId xmlns:a16="http://schemas.microsoft.com/office/drawing/2014/main" id="{355C1BB9-FC38-6D11-7318-5845E2385CDD}"/>
-                  </a:ext>
-                </a:extLst>
-              </p:cNvPr>
-              <p:cNvSpPr txBox="1"/>
-              <p:nvPr/>
-            </p:nvSpPr>
-            <p:spPr>
-              <a:xfrm>
-                <a:off x="7712890" y="2074127"/>
-                <a:ext cx="1470707" cy="276999"/>
-              </a:xfrm>
-              <a:prstGeom prst="rect">
-                <a:avLst/>
-              </a:prstGeom>
-              <a:noFill/>
-            </p:spPr>
-            <p:txBody>
-              <a:bodyPr wrap="square" rtlCol="0">
-                <a:spAutoFit/>
-              </a:bodyPr>
-              <a:lstStyle/>
-              <a:p>
-                <a:pPr algn="ctr"/>
-                <a:r>
-                  <a:rPr lang="fr-FR" sz="1200" dirty="0">
-                    <a:latin typeface="Cambria" panose="02040503050406030204" pitchFamily="18" charset="0"/>
-                    <a:ea typeface="Cambria" panose="02040503050406030204" pitchFamily="18" charset="0"/>
-                  </a:rPr>
-                  <a:t>MQTT server</a:t>
-                </a:r>
-                <a:endParaRPr lang="en-US" sz="1200" dirty="0">
-                  <a:latin typeface="Cambria" panose="02040503050406030204" pitchFamily="18" charset="0"/>
-                  <a:ea typeface="Cambria" panose="02040503050406030204" pitchFamily="18" charset="0"/>
-                </a:endParaRPr>
-              </a:p>
-            </p:txBody>
-          </p:sp>
-        </p:grpSp>
-      </p:grpSp>
-      <p:grpSp>
-        <p:nvGrpSpPr>
-          <p:cNvPr id="58" name="Group 57">
-            <a:extLst>
-              <a:ext uri="{FF2B5EF4-FFF2-40B4-BE49-F238E27FC236}">
-                <a16:creationId xmlns:a16="http://schemas.microsoft.com/office/drawing/2014/main" id="{1470A5FB-E774-3FB3-0601-ED218E26F624}"/>
-              </a:ext>
-            </a:extLst>
-          </p:cNvPr>
-          <p:cNvGrpSpPr/>
-          <p:nvPr/>
-        </p:nvGrpSpPr>
-        <p:grpSpPr>
-          <a:xfrm>
-            <a:off x="9844700" y="1321195"/>
-            <a:ext cx="1800000" cy="3362015"/>
-            <a:chOff x="9844700" y="1321195"/>
-            <a:chExt cx="1800000" cy="3362015"/>
-          </a:xfrm>
-        </p:grpSpPr>
-        <p:grpSp>
-          <p:nvGrpSpPr>
-            <p:cNvPr id="39" name="Group 38">
-              <a:extLst>
-                <a:ext uri="{FF2B5EF4-FFF2-40B4-BE49-F238E27FC236}">
-                  <a16:creationId xmlns:a16="http://schemas.microsoft.com/office/drawing/2014/main" id="{CB58834D-639A-2D02-2E26-A9C305E576FB}"/>
-                </a:ext>
-              </a:extLst>
-            </p:cNvPr>
-            <p:cNvGrpSpPr/>
-            <p:nvPr/>
-          </p:nvGrpSpPr>
-          <p:grpSpPr>
-            <a:xfrm>
-              <a:off x="9844700" y="2351320"/>
-              <a:ext cx="1800000" cy="2331890"/>
-              <a:chOff x="9844700" y="1997110"/>
-              <a:chExt cx="1800000" cy="2331890"/>
-            </a:xfrm>
-          </p:grpSpPr>
-          <p:sp>
-            <p:nvSpPr>
-              <p:cNvPr id="32" name="Rectangle 31">
-                <a:extLst>
-                  <a:ext uri="{FF2B5EF4-FFF2-40B4-BE49-F238E27FC236}">
-                    <a16:creationId xmlns:a16="http://schemas.microsoft.com/office/drawing/2014/main" id="{33670C0C-9224-13A4-4C5C-9A8FB346A605}"/>
-                  </a:ext>
-                </a:extLst>
-              </p:cNvPr>
-              <p:cNvSpPr/>
-              <p:nvPr/>
-            </p:nvSpPr>
-            <p:spPr>
-              <a:xfrm>
-                <a:off x="9844700" y="3429000"/>
-                <a:ext cx="1800000" cy="900000"/>
-              </a:xfrm>
-              <a:prstGeom prst="rect">
-                <a:avLst/>
-              </a:prstGeom>
-              <a:solidFill>
-                <a:schemeClr val="accent2">
-                  <a:lumMod val="60000"/>
-                  <a:lumOff val="40000"/>
-                </a:schemeClr>
-              </a:solidFill>
-              <a:ln>
-                <a:noFill/>
-              </a:ln>
-            </p:spPr>
-            <p:style>
-              <a:lnRef idx="2">
-                <a:schemeClr val="dk1"/>
-              </a:lnRef>
-              <a:fillRef idx="1">
-                <a:schemeClr val="lt1"/>
-              </a:fillRef>
-              <a:effectRef idx="0">
-                <a:schemeClr val="dk1"/>
-              </a:effectRef>
-              <a:fontRef idx="minor">
-                <a:schemeClr val="dk1"/>
-              </a:fontRef>
-            </p:style>
-            <p:txBody>
-              <a:bodyPr rtlCol="0" anchor="ctr"/>
-              <a:lstStyle/>
-              <a:p>
-                <a:pPr algn="ctr"/>
-                <a:r>
-                  <a:rPr lang="en-US" sz="1600" dirty="0">
-                    <a:latin typeface="Cambria" panose="02040503050406030204" pitchFamily="18" charset="0"/>
-                    <a:ea typeface="Cambria" panose="02040503050406030204" pitchFamily="18" charset="0"/>
-                  </a:rPr>
-                  <a:t>Execute instructions</a:t>
-                </a:r>
-                <a:endParaRPr lang="fr-FR" sz="1600" dirty="0">
-                  <a:latin typeface="Cambria" panose="02040503050406030204" pitchFamily="18" charset="0"/>
-                  <a:ea typeface="Cambria" panose="02040503050406030204" pitchFamily="18" charset="0"/>
-                </a:endParaRPr>
-              </a:p>
-            </p:txBody>
-          </p:sp>
-          <p:sp>
-            <p:nvSpPr>
-              <p:cNvPr id="35" name="Flowchart: Off-page Connector 34">
-                <a:extLst>
-                  <a:ext uri="{FF2B5EF4-FFF2-40B4-BE49-F238E27FC236}">
-                    <a16:creationId xmlns:a16="http://schemas.microsoft.com/office/drawing/2014/main" id="{A1761186-FBC0-3438-17B6-C96857676355}"/>
-                  </a:ext>
-                </a:extLst>
-              </p:cNvPr>
-              <p:cNvSpPr/>
-              <p:nvPr/>
-            </p:nvSpPr>
-            <p:spPr>
-              <a:xfrm>
-                <a:off x="9844700" y="2709018"/>
-                <a:ext cx="1800000" cy="900000"/>
-              </a:xfrm>
-              <a:prstGeom prst="flowChartOffpageConnector">
-                <a:avLst/>
-              </a:prstGeom>
-              <a:solidFill>
-                <a:schemeClr val="accent2">
-                  <a:lumMod val="40000"/>
-                  <a:lumOff val="60000"/>
-                </a:schemeClr>
-              </a:solidFill>
-              <a:ln>
-                <a:noFill/>
-              </a:ln>
-            </p:spPr>
-            <p:style>
-              <a:lnRef idx="2">
-                <a:schemeClr val="dk1"/>
-              </a:lnRef>
-              <a:fillRef idx="1">
-                <a:schemeClr val="lt1"/>
-              </a:fillRef>
-              <a:effectRef idx="0">
-                <a:schemeClr val="dk1"/>
-              </a:effectRef>
-              <a:fontRef idx="minor">
-                <a:schemeClr val="dk1"/>
-              </a:fontRef>
-            </p:style>
-            <p:txBody>
-              <a:bodyPr rtlCol="0" anchor="ctr"/>
-              <a:lstStyle/>
-              <a:p>
-                <a:pPr algn="ctr"/>
-                <a:endParaRPr lang="en-US" sz="1600" dirty="0">
-                  <a:latin typeface="Cambria" panose="02040503050406030204" pitchFamily="18" charset="0"/>
-                  <a:ea typeface="Cambria" panose="02040503050406030204" pitchFamily="18" charset="0"/>
-                </a:endParaRPr>
-              </a:p>
-              <a:p>
-                <a:pPr algn="ctr"/>
-                <a:r>
-                  <a:rPr lang="en-US" sz="1600" dirty="0">
-                    <a:latin typeface="Cambria" panose="02040503050406030204" pitchFamily="18" charset="0"/>
-                    <a:ea typeface="Cambria" panose="02040503050406030204" pitchFamily="18" charset="0"/>
-                  </a:rPr>
-                  <a:t>Receive instructions</a:t>
-                </a:r>
-                <a:endParaRPr lang="fr-FR" sz="1600" dirty="0">
-                  <a:latin typeface="Cambria" panose="02040503050406030204" pitchFamily="18" charset="0"/>
-                  <a:ea typeface="Cambria" panose="02040503050406030204" pitchFamily="18" charset="0"/>
-                </a:endParaRPr>
-              </a:p>
-            </p:txBody>
-          </p:sp>
-          <p:sp>
-            <p:nvSpPr>
-              <p:cNvPr id="31" name="Flowchart: Off-page Connector 30">
-                <a:extLst>
-                  <a:ext uri="{FF2B5EF4-FFF2-40B4-BE49-F238E27FC236}">
-                    <a16:creationId xmlns:a16="http://schemas.microsoft.com/office/drawing/2014/main" id="{03FA5EFB-93FB-FDFE-1430-733FC6BB9E5B}"/>
-                  </a:ext>
-                </a:extLst>
-              </p:cNvPr>
-              <p:cNvSpPr/>
-              <p:nvPr/>
-            </p:nvSpPr>
-            <p:spPr>
-              <a:xfrm>
-                <a:off x="9844700" y="1997110"/>
-                <a:ext cx="1800000" cy="900000"/>
-              </a:xfrm>
-              <a:prstGeom prst="flowChartOffpageConnector">
-                <a:avLst/>
-              </a:prstGeom>
-              <a:solidFill>
-                <a:schemeClr val="accent2">
-                  <a:lumMod val="20000"/>
-                  <a:lumOff val="80000"/>
-                </a:schemeClr>
-              </a:solidFill>
-              <a:ln>
-                <a:noFill/>
-              </a:ln>
-            </p:spPr>
-            <p:style>
-              <a:lnRef idx="2">
-                <a:schemeClr val="dk1"/>
-              </a:lnRef>
-              <a:fillRef idx="1">
-                <a:schemeClr val="lt1"/>
-              </a:fillRef>
-              <a:effectRef idx="0">
-                <a:schemeClr val="dk1"/>
-              </a:effectRef>
-              <a:fontRef idx="minor">
-                <a:schemeClr val="dk1"/>
-              </a:fontRef>
-            </p:style>
-            <p:txBody>
-              <a:bodyPr rtlCol="0" anchor="ctr"/>
-              <a:lstStyle/>
-              <a:p>
-                <a:pPr algn="ctr"/>
-                <a:r>
-                  <a:rPr lang="en-US" sz="1600" dirty="0">
-                    <a:latin typeface="Cambria" panose="02040503050406030204" pitchFamily="18" charset="0"/>
-                    <a:ea typeface="Cambria" panose="02040503050406030204" pitchFamily="18" charset="0"/>
-                  </a:rPr>
-                  <a:t>Subscribe to MQTT server</a:t>
-                </a:r>
-                <a:endParaRPr lang="fr-FR" sz="1600" dirty="0">
-                  <a:latin typeface="Cambria" panose="02040503050406030204" pitchFamily="18" charset="0"/>
-                  <a:ea typeface="Cambria" panose="02040503050406030204" pitchFamily="18" charset="0"/>
-                </a:endParaRPr>
-              </a:p>
-            </p:txBody>
-          </p:sp>
-        </p:grpSp>
-        <p:grpSp>
-          <p:nvGrpSpPr>
-            <p:cNvPr id="46" name="Group 45">
-              <a:extLst>
-                <a:ext uri="{FF2B5EF4-FFF2-40B4-BE49-F238E27FC236}">
-                  <a16:creationId xmlns:a16="http://schemas.microsoft.com/office/drawing/2014/main" id="{85BC8A2A-81F9-DE56-B7F9-58B7E143F0E4}"/>
-                </a:ext>
-              </a:extLst>
-            </p:cNvPr>
-            <p:cNvGrpSpPr/>
-            <p:nvPr/>
-          </p:nvGrpSpPr>
-          <p:grpSpPr>
-            <a:xfrm>
-              <a:off x="10009347" y="1321195"/>
-              <a:ext cx="1470707" cy="1029931"/>
-              <a:chOff x="10009347" y="1321195"/>
-              <a:chExt cx="1470707" cy="1029931"/>
-            </a:xfrm>
-          </p:grpSpPr>
-          <p:pic>
-            <p:nvPicPr>
-              <p:cNvPr id="15" name="Graphique 14" descr="Quadrirotor avec un remplissage uni">
-                <a:extLst>
-                  <a:ext uri="{FF2B5EF4-FFF2-40B4-BE49-F238E27FC236}">
-                    <a16:creationId xmlns:a16="http://schemas.microsoft.com/office/drawing/2014/main" id="{39E94A4C-2B54-2F14-BE11-E2B0E4E13873}"/>
-                  </a:ext>
-                </a:extLst>
-              </p:cNvPr>
-              <p:cNvPicPr>
-                <a:picLocks noChangeAspect="1"/>
-              </p:cNvPicPr>
-              <p:nvPr/>
-            </p:nvPicPr>
-            <p:blipFill>
-              <a:blip r:embed="rId6">
-                <a:extLst>
-                  <a:ext uri="{28A0092B-C50C-407E-A947-70E740481C1C}">
-                    <a14:useLocalDpi xmlns:a14="http://schemas.microsoft.com/office/drawing/2010/main" val="0"/>
-                  </a:ext>
-                  <a:ext uri="{96DAC541-7B7A-43D3-8B79-37D633B846F1}">
-                    <asvg:svgBlip xmlns:asvg="http://schemas.microsoft.com/office/drawing/2016/SVG/main" r:embed="rId7"/>
-                  </a:ext>
-                </a:extLst>
-              </a:blip>
-              <a:stretch>
-                <a:fillRect/>
-              </a:stretch>
-            </p:blipFill>
-            <p:spPr>
-              <a:xfrm>
-                <a:off x="10294700" y="1321195"/>
-                <a:ext cx="900000" cy="900000"/>
-              </a:xfrm>
-              <a:prstGeom prst="rect">
-                <a:avLst/>
-              </a:prstGeom>
-            </p:spPr>
-          </p:pic>
-          <p:sp>
-            <p:nvSpPr>
-              <p:cNvPr id="8" name="TextBox 7">
-                <a:extLst>
-                  <a:ext uri="{FF2B5EF4-FFF2-40B4-BE49-F238E27FC236}">
-                    <a16:creationId xmlns:a16="http://schemas.microsoft.com/office/drawing/2014/main" id="{667756C3-634C-3DA6-A88B-92F9AA31D2FF}"/>
-                  </a:ext>
-                </a:extLst>
-              </p:cNvPr>
-              <p:cNvSpPr txBox="1"/>
-              <p:nvPr/>
-            </p:nvSpPr>
-            <p:spPr>
-              <a:xfrm>
-                <a:off x="10009347" y="2074127"/>
-                <a:ext cx="1470707" cy="276999"/>
-              </a:xfrm>
-              <a:prstGeom prst="rect">
-                <a:avLst/>
-              </a:prstGeom>
-              <a:noFill/>
-            </p:spPr>
-            <p:txBody>
-              <a:bodyPr wrap="square" rtlCol="0">
-                <a:spAutoFit/>
-              </a:bodyPr>
-              <a:lstStyle/>
-              <a:p>
-                <a:pPr algn="ctr"/>
-                <a:r>
-                  <a:rPr lang="fr-FR" sz="1200" dirty="0">
-                    <a:latin typeface="Cambria" panose="02040503050406030204" pitchFamily="18" charset="0"/>
-                    <a:ea typeface="Cambria" panose="02040503050406030204" pitchFamily="18" charset="0"/>
-                  </a:rPr>
-                  <a:t>UAV</a:t>
-                </a:r>
-                <a:endParaRPr lang="en-US" sz="1200" dirty="0">
-                  <a:latin typeface="Cambria" panose="02040503050406030204" pitchFamily="18" charset="0"/>
-                  <a:ea typeface="Cambria" panose="02040503050406030204" pitchFamily="18" charset="0"/>
-                </a:endParaRPr>
-              </a:p>
-            </p:txBody>
-          </p:sp>
-        </p:grpSp>
-      </p:grpSp>
-      <p:grpSp>
-        <p:nvGrpSpPr>
-          <p:cNvPr id="59" name="Group 58">
-            <a:extLst>
-              <a:ext uri="{FF2B5EF4-FFF2-40B4-BE49-F238E27FC236}">
-                <a16:creationId xmlns:a16="http://schemas.microsoft.com/office/drawing/2014/main" id="{78E07122-A6E8-758B-38BB-A926964FE42B}"/>
-              </a:ext>
-            </a:extLst>
-          </p:cNvPr>
-          <p:cNvGrpSpPr/>
-          <p:nvPr/>
-        </p:nvGrpSpPr>
-        <p:grpSpPr>
-          <a:xfrm>
-            <a:off x="658871" y="1321195"/>
-            <a:ext cx="1800000" cy="4973145"/>
-            <a:chOff x="658871" y="1321195"/>
-            <a:chExt cx="1800000" cy="4973145"/>
-          </a:xfrm>
-        </p:grpSpPr>
-        <p:pic>
-          <p:nvPicPr>
-            <p:cNvPr id="5" name="Image 4" descr="Un jeune mentonnier lève le petit doigt">
-              <a:extLst>
-                <a:ext uri="{FF2B5EF4-FFF2-40B4-BE49-F238E27FC236}">
-                  <a16:creationId xmlns:a16="http://schemas.microsoft.com/office/drawing/2014/main" id="{6369174D-BF19-2381-C16A-5AA781F14427}"/>
-                </a:ext>
-              </a:extLst>
-            </p:cNvPr>
-            <p:cNvPicPr>
-              <a:picLocks noChangeAspect="1"/>
-            </p:cNvPicPr>
-            <p:nvPr/>
-          </p:nvPicPr>
-          <p:blipFill>
-            <a:blip r:embed="rId8">
-              <a:extLst>
-                <a:ext uri="{28A0092B-C50C-407E-A947-70E740481C1C}">
-                  <a14:useLocalDpi xmlns:a14="http://schemas.microsoft.com/office/drawing/2010/main" val="0"/>
-                </a:ext>
-              </a:extLst>
-            </a:blip>
-            <a:stretch>
-              <a:fillRect/>
-            </a:stretch>
-          </p:blipFill>
-          <p:spPr>
-            <a:xfrm>
-              <a:off x="1068381" y="3159502"/>
-              <a:ext cx="980980" cy="3134838"/>
-            </a:xfrm>
-            <a:prstGeom prst="rect">
-              <a:avLst/>
-            </a:prstGeom>
-          </p:spPr>
-        </p:pic>
-        <p:grpSp>
-          <p:nvGrpSpPr>
-            <p:cNvPr id="54" name="Group 53">
-              <a:extLst>
-                <a:ext uri="{FF2B5EF4-FFF2-40B4-BE49-F238E27FC236}">
-                  <a16:creationId xmlns:a16="http://schemas.microsoft.com/office/drawing/2014/main" id="{0865F1A0-E9BD-96C3-659E-652445702991}"/>
-                </a:ext>
-              </a:extLst>
-            </p:cNvPr>
-            <p:cNvGrpSpPr/>
-            <p:nvPr/>
-          </p:nvGrpSpPr>
-          <p:grpSpPr>
-            <a:xfrm>
-              <a:off x="658871" y="1321195"/>
-              <a:ext cx="1800000" cy="1750125"/>
-              <a:chOff x="658871" y="1321195"/>
-              <a:chExt cx="1800000" cy="1750125"/>
-            </a:xfrm>
-          </p:grpSpPr>
-          <p:sp>
-            <p:nvSpPr>
-              <p:cNvPr id="33" name="Rectangle 32">
-                <a:extLst>
-                  <a:ext uri="{FF2B5EF4-FFF2-40B4-BE49-F238E27FC236}">
-                    <a16:creationId xmlns:a16="http://schemas.microsoft.com/office/drawing/2014/main" id="{AA7E1676-3DA9-8D6C-414A-50B0E109BF5F}"/>
-                  </a:ext>
-                </a:extLst>
-              </p:cNvPr>
-              <p:cNvSpPr/>
-              <p:nvPr/>
-            </p:nvSpPr>
-            <p:spPr>
-              <a:xfrm>
-                <a:off x="658871" y="2351320"/>
-                <a:ext cx="1800000" cy="720000"/>
-              </a:xfrm>
-              <a:prstGeom prst="rect">
-                <a:avLst/>
-              </a:prstGeom>
-              <a:solidFill>
-                <a:schemeClr val="accent2">
-                  <a:lumMod val="20000"/>
-                  <a:lumOff val="80000"/>
-                </a:schemeClr>
-              </a:solidFill>
-              <a:ln>
-                <a:noFill/>
-              </a:ln>
-            </p:spPr>
-            <p:style>
-              <a:lnRef idx="2">
-                <a:schemeClr val="dk1"/>
-              </a:lnRef>
-              <a:fillRef idx="1">
-                <a:schemeClr val="lt1"/>
-              </a:fillRef>
-              <a:effectRef idx="0">
-                <a:schemeClr val="dk1"/>
-              </a:effectRef>
-              <a:fontRef idx="minor">
-                <a:schemeClr val="dk1"/>
-              </a:fontRef>
-            </p:style>
-            <p:txBody>
-              <a:bodyPr rtlCol="0" anchor="ctr"/>
-              <a:lstStyle/>
-              <a:p>
-                <a:pPr algn="ctr"/>
-                <a:r>
-                  <a:rPr lang="en-US" sz="1600" dirty="0">
-                    <a:latin typeface="Cambria" panose="02040503050406030204" pitchFamily="18" charset="0"/>
-                    <a:ea typeface="Cambria" panose="02040503050406030204" pitchFamily="18" charset="0"/>
-                  </a:rPr>
-                  <a:t>Give instruction with hand signs</a:t>
-                </a:r>
-                <a:endParaRPr lang="fr-FR" sz="1600" dirty="0">
-                  <a:latin typeface="Cambria" panose="02040503050406030204" pitchFamily="18" charset="0"/>
-                  <a:ea typeface="Cambria" panose="02040503050406030204" pitchFamily="18" charset="0"/>
-                </a:endParaRPr>
-              </a:p>
-            </p:txBody>
-          </p:sp>
-          <p:grpSp>
-            <p:nvGrpSpPr>
-              <p:cNvPr id="30" name="Group 29">
-                <a:extLst>
-                  <a:ext uri="{FF2B5EF4-FFF2-40B4-BE49-F238E27FC236}">
-                    <a16:creationId xmlns:a16="http://schemas.microsoft.com/office/drawing/2014/main" id="{D7485E7D-1755-AE1A-7D7A-9F1CB639E622}"/>
+                    <a16:creationId xmlns:a16="http://schemas.microsoft.com/office/drawing/2014/main" id="{CAC4E735-5C0C-3193-B8D8-074FCA56090A}"/>
                   </a:ext>
                 </a:extLst>
               </p:cNvPr>
@@ -4199,18 +3133,242 @@
             </p:nvGrpSpPr>
             <p:grpSpPr>
               <a:xfrm>
-                <a:off x="823518" y="1321195"/>
+                <a:off x="5251785" y="2351320"/>
+                <a:ext cx="1800001" cy="2346181"/>
+                <a:chOff x="5015586" y="1997110"/>
+                <a:chExt cx="1800001" cy="2346181"/>
+              </a:xfrm>
+            </p:grpSpPr>
+            <p:sp>
+              <p:nvSpPr>
+                <p:cNvPr id="25" name="Rectangle 24">
+                  <a:extLst>
+                    <a:ext uri="{FF2B5EF4-FFF2-40B4-BE49-F238E27FC236}">
+                      <a16:creationId xmlns:a16="http://schemas.microsoft.com/office/drawing/2014/main" id="{53E2929C-0C7C-9AB5-D9EF-1AD813CB55D2}"/>
+                    </a:ext>
+                  </a:extLst>
+                </p:cNvPr>
+                <p:cNvSpPr/>
+                <p:nvPr/>
+              </p:nvSpPr>
+              <p:spPr>
+                <a:xfrm>
+                  <a:off x="5015587" y="3443291"/>
+                  <a:ext cx="1800000" cy="900000"/>
+                </a:xfrm>
+                <a:prstGeom prst="rect">
+                  <a:avLst/>
+                </a:prstGeom>
+                <a:solidFill>
+                  <a:schemeClr val="accent2">
+                    <a:lumMod val="60000"/>
+                    <a:lumOff val="40000"/>
+                  </a:schemeClr>
+                </a:solidFill>
+                <a:ln>
+                  <a:noFill/>
+                </a:ln>
+              </p:spPr>
+              <p:style>
+                <a:lnRef idx="2">
+                  <a:schemeClr val="dk1"/>
+                </a:lnRef>
+                <a:fillRef idx="1">
+                  <a:schemeClr val="lt1"/>
+                </a:fillRef>
+                <a:effectRef idx="0">
+                  <a:schemeClr val="dk1"/>
+                </a:effectRef>
+                <a:fontRef idx="minor">
+                  <a:schemeClr val="dk1"/>
+                </a:fontRef>
+              </p:style>
+              <p:txBody>
+                <a:bodyPr rtlCol="0" anchor="ctr"/>
+                <a:lstStyle/>
+                <a:p>
+                  <a:pPr algn="ctr"/>
+                  <a:endParaRPr lang="en-US" sz="1600" dirty="0">
+                    <a:latin typeface="Cambria" panose="02040503050406030204" pitchFamily="18" charset="0"/>
+                    <a:ea typeface="Cambria" panose="02040503050406030204" pitchFamily="18" charset="0"/>
+                  </a:endParaRPr>
+                </a:p>
+                <a:p>
+                  <a:pPr algn="ctr"/>
+                  <a:r>
+                    <a:rPr lang="en-US" sz="1600" dirty="0">
+                      <a:latin typeface="Cambria" panose="02040503050406030204" pitchFamily="18" charset="0"/>
+                      <a:ea typeface="Cambria" panose="02040503050406030204" pitchFamily="18" charset="0"/>
+                    </a:rPr>
+                    <a:t>Publish instructions</a:t>
+                  </a:r>
+                  <a:endParaRPr lang="fr-FR" sz="1600" dirty="0">
+                    <a:latin typeface="Cambria" panose="02040503050406030204" pitchFamily="18" charset="0"/>
+                    <a:ea typeface="Cambria" panose="02040503050406030204" pitchFamily="18" charset="0"/>
+                  </a:endParaRPr>
+                </a:p>
+              </p:txBody>
+            </p:sp>
+            <p:sp>
+              <p:nvSpPr>
+                <p:cNvPr id="24" name="Flowchart: Off-page Connector 23">
+                  <a:extLst>
+                    <a:ext uri="{FF2B5EF4-FFF2-40B4-BE49-F238E27FC236}">
+                      <a16:creationId xmlns:a16="http://schemas.microsoft.com/office/drawing/2014/main" id="{03190A97-7354-A01D-3A50-97EA6E6ED4CD}"/>
+                    </a:ext>
+                  </a:extLst>
+                </p:cNvPr>
+                <p:cNvSpPr/>
+                <p:nvPr/>
+              </p:nvSpPr>
+              <p:spPr>
+                <a:xfrm>
+                  <a:off x="5015586" y="2725269"/>
+                  <a:ext cx="1800000" cy="900000"/>
+                </a:xfrm>
+                <a:prstGeom prst="flowChartOffpageConnector">
+                  <a:avLst/>
+                </a:prstGeom>
+                <a:solidFill>
+                  <a:schemeClr val="accent2">
+                    <a:lumMod val="40000"/>
+                    <a:lumOff val="60000"/>
+                  </a:schemeClr>
+                </a:solidFill>
+                <a:ln>
+                  <a:noFill/>
+                </a:ln>
+              </p:spPr>
+              <p:style>
+                <a:lnRef idx="2">
+                  <a:schemeClr val="dk1"/>
+                </a:lnRef>
+                <a:fillRef idx="1">
+                  <a:schemeClr val="lt1"/>
+                </a:fillRef>
+                <a:effectRef idx="0">
+                  <a:schemeClr val="dk1"/>
+                </a:effectRef>
+                <a:fontRef idx="minor">
+                  <a:schemeClr val="dk1"/>
+                </a:fontRef>
+              </p:style>
+              <p:txBody>
+                <a:bodyPr rtlCol="0" anchor="ctr"/>
+                <a:lstStyle/>
+                <a:p>
+                  <a:pPr algn="ctr"/>
+                  <a:endParaRPr lang="en-US" sz="1600" dirty="0">
+                    <a:latin typeface="Cambria" panose="02040503050406030204" pitchFamily="18" charset="0"/>
+                    <a:ea typeface="Cambria" panose="02040503050406030204" pitchFamily="18" charset="0"/>
+                  </a:endParaRPr>
+                </a:p>
+                <a:p>
+                  <a:pPr algn="ctr"/>
+                  <a:r>
+                    <a:rPr lang="en-US" sz="1600" dirty="0">
+                      <a:latin typeface="Cambria" panose="02040503050406030204" pitchFamily="18" charset="0"/>
+                      <a:ea typeface="Cambria" panose="02040503050406030204" pitchFamily="18" charset="0"/>
+                    </a:rPr>
+                    <a:t>Recognize hand signs</a:t>
+                  </a:r>
+                  <a:endParaRPr lang="fr-FR" sz="1600" dirty="0">
+                    <a:latin typeface="Cambria" panose="02040503050406030204" pitchFamily="18" charset="0"/>
+                    <a:ea typeface="Cambria" panose="02040503050406030204" pitchFamily="18" charset="0"/>
+                  </a:endParaRPr>
+                </a:p>
+              </p:txBody>
+            </p:sp>
+            <p:sp>
+              <p:nvSpPr>
+                <p:cNvPr id="23" name="Flowchart: Off-page Connector 22">
+                  <a:extLst>
+                    <a:ext uri="{FF2B5EF4-FFF2-40B4-BE49-F238E27FC236}">
+                      <a16:creationId xmlns:a16="http://schemas.microsoft.com/office/drawing/2014/main" id="{5E86563B-D5EA-7C16-6FC2-D4D76032F9C8}"/>
+                    </a:ext>
+                  </a:extLst>
+                </p:cNvPr>
+                <p:cNvSpPr/>
+                <p:nvPr/>
+              </p:nvSpPr>
+              <p:spPr>
+                <a:xfrm>
+                  <a:off x="5015586" y="1997110"/>
+                  <a:ext cx="1800000" cy="900000"/>
+                </a:xfrm>
+                <a:prstGeom prst="flowChartOffpageConnector">
+                  <a:avLst/>
+                </a:prstGeom>
+                <a:solidFill>
+                  <a:schemeClr val="accent2">
+                    <a:lumMod val="20000"/>
+                    <a:lumOff val="80000"/>
+                  </a:schemeClr>
+                </a:solidFill>
+                <a:ln>
+                  <a:noFill/>
+                </a:ln>
+              </p:spPr>
+              <p:style>
+                <a:lnRef idx="2">
+                  <a:schemeClr val="dk1"/>
+                </a:lnRef>
+                <a:fillRef idx="1">
+                  <a:schemeClr val="lt1"/>
+                </a:fillRef>
+                <a:effectRef idx="0">
+                  <a:schemeClr val="dk1"/>
+                </a:effectRef>
+                <a:fontRef idx="minor">
+                  <a:schemeClr val="dk1"/>
+                </a:fontRef>
+              </p:style>
+              <p:txBody>
+                <a:bodyPr rtlCol="0" anchor="ctr"/>
+                <a:lstStyle/>
+                <a:p>
+                  <a:pPr algn="ctr"/>
+                  <a:r>
+                    <a:rPr lang="en-US" sz="1600" dirty="0">
+                      <a:latin typeface="Cambria" panose="02040503050406030204" pitchFamily="18" charset="0"/>
+                      <a:ea typeface="Cambria" panose="02040503050406030204" pitchFamily="18" charset="0"/>
+                    </a:rPr>
+                    <a:t>Detect hand in image</a:t>
+                  </a:r>
+                  <a:endParaRPr lang="fr-FR" sz="1600" dirty="0">
+                    <a:latin typeface="Cambria" panose="02040503050406030204" pitchFamily="18" charset="0"/>
+                    <a:ea typeface="Cambria" panose="02040503050406030204" pitchFamily="18" charset="0"/>
+                  </a:endParaRPr>
+                </a:p>
+              </p:txBody>
+            </p:sp>
+          </p:grpSp>
+          <p:grpSp>
+            <p:nvGrpSpPr>
+              <p:cNvPr id="37" name="Group 36">
+                <a:extLst>
+                  <a:ext uri="{FF2B5EF4-FFF2-40B4-BE49-F238E27FC236}">
+                    <a16:creationId xmlns:a16="http://schemas.microsoft.com/office/drawing/2014/main" id="{6E4B563A-03EA-93EB-2B82-6D3BE2D01B1C}"/>
+                  </a:ext>
+                </a:extLst>
+              </p:cNvPr>
+              <p:cNvGrpSpPr/>
+              <p:nvPr/>
+            </p:nvGrpSpPr>
+            <p:grpSpPr>
+              <a:xfrm>
+                <a:off x="5416432" y="1321195"/>
                 <a:ext cx="1470707" cy="1029931"/>
-                <a:chOff x="823518" y="1321195"/>
+                <a:chOff x="5416432" y="1321195"/>
                 <a:chExt cx="1470707" cy="1029931"/>
               </a:xfrm>
             </p:grpSpPr>
             <p:pic>
               <p:nvPicPr>
-                <p:cNvPr id="22" name="Graphic 21" descr="Hang Loose Hand Gesture with solid fill">
+                <p:cNvPr id="19" name="Graphique 18" descr="Ordinateur avec un remplissage uni">
                   <a:extLst>
                     <a:ext uri="{FF2B5EF4-FFF2-40B4-BE49-F238E27FC236}">
-                      <a16:creationId xmlns:a16="http://schemas.microsoft.com/office/drawing/2014/main" id="{EFA74D91-E152-4B58-C989-2D3EE4C1208C}"/>
+                      <a16:creationId xmlns:a16="http://schemas.microsoft.com/office/drawing/2014/main" id="{22F3FCBA-4825-C11A-818E-6B0A6A962A26}"/>
                     </a:ext>
                   </a:extLst>
                 </p:cNvPr>
@@ -4220,13 +3378,13 @@
                 <p:nvPr/>
               </p:nvPicPr>
               <p:blipFill>
-                <a:blip r:embed="rId9">
+                <a:blip r:embed="rId2">
                   <a:extLst>
                     <a:ext uri="{28A0092B-C50C-407E-A947-70E740481C1C}">
                       <a14:useLocalDpi xmlns:a14="http://schemas.microsoft.com/office/drawing/2010/main" val="0"/>
                     </a:ext>
                     <a:ext uri="{96DAC541-7B7A-43D3-8B79-37D633B846F1}">
-                      <asvg:svgBlip xmlns:asvg="http://schemas.microsoft.com/office/drawing/2016/SVG/main" r:embed="rId10"/>
+                      <asvg:svgBlip xmlns:asvg="http://schemas.microsoft.com/office/drawing/2016/SVG/main" r:embed="rId3"/>
                     </a:ext>
                   </a:extLst>
                 </a:blip>
@@ -4236,7 +3394,7 @@
               </p:blipFill>
               <p:spPr>
                 <a:xfrm>
-                  <a:off x="1108871" y="1321195"/>
+                  <a:off x="5701785" y="1321195"/>
                   <a:ext cx="900000" cy="900000"/>
                 </a:xfrm>
                 <a:prstGeom prst="rect">
@@ -4246,10 +3404,10 @@
             </p:pic>
             <p:sp>
               <p:nvSpPr>
-                <p:cNvPr id="27" name="TextBox 26">
+                <p:cNvPr id="6" name="TextBox 5">
                   <a:extLst>
                     <a:ext uri="{FF2B5EF4-FFF2-40B4-BE49-F238E27FC236}">
-                      <a16:creationId xmlns:a16="http://schemas.microsoft.com/office/drawing/2014/main" id="{57EEF9B6-EC70-1711-0497-9A01540D5984}"/>
+                      <a16:creationId xmlns:a16="http://schemas.microsoft.com/office/drawing/2014/main" id="{49988E71-D571-5158-EB0A-4569EDF15757}"/>
                     </a:ext>
                   </a:extLst>
                 </p:cNvPr>
@@ -4258,7 +3416,7 @@
               </p:nvSpPr>
               <p:spPr>
                 <a:xfrm>
-                  <a:off x="823518" y="2074127"/>
+                  <a:off x="5416432" y="2074127"/>
                   <a:ext cx="1470707" cy="276999"/>
                 </a:xfrm>
                 <a:prstGeom prst="rect">
@@ -4278,7 +3436,7 @@
                       <a:latin typeface="Cambria" panose="02040503050406030204" pitchFamily="18" charset="0"/>
                       <a:ea typeface="Cambria" panose="02040503050406030204" pitchFamily="18" charset="0"/>
                     </a:rPr>
-                    <a:t>User hand sign</a:t>
+                    <a:t>Raspberry</a:t>
                   </a:r>
                   <a:endParaRPr lang="en-US" sz="1200" dirty="0">
                     <a:latin typeface="Cambria" panose="02040503050406030204" pitchFamily="18" charset="0"/>
@@ -4289,33 +3447,12 @@
             </p:sp>
           </p:grpSp>
         </p:grpSp>
-      </p:grpSp>
-      <p:grpSp>
-        <p:nvGrpSpPr>
-          <p:cNvPr id="55" name="Group 54">
-            <a:extLst>
-              <a:ext uri="{FF2B5EF4-FFF2-40B4-BE49-F238E27FC236}">
-                <a16:creationId xmlns:a16="http://schemas.microsoft.com/office/drawing/2014/main" id="{78B0BD39-690B-666D-F2F7-98F21AC0AB20}"/>
-              </a:ext>
-            </a:extLst>
-          </p:cNvPr>
-          <p:cNvGrpSpPr/>
-          <p:nvPr/>
-        </p:nvGrpSpPr>
-        <p:grpSpPr>
-          <a:xfrm>
-            <a:off x="2955328" y="1321195"/>
-            <a:ext cx="1800000" cy="2642033"/>
-            <a:chOff x="2955327" y="1321195"/>
-            <a:chExt cx="1800000" cy="2642033"/>
-          </a:xfrm>
-        </p:grpSpPr>
         <p:grpSp>
           <p:nvGrpSpPr>
-            <p:cNvPr id="34" name="Group 33">
+            <p:cNvPr id="57" name="Group 56">
               <a:extLst>
                 <a:ext uri="{FF2B5EF4-FFF2-40B4-BE49-F238E27FC236}">
-                  <a16:creationId xmlns:a16="http://schemas.microsoft.com/office/drawing/2014/main" id="{3592C8ED-EFE9-B021-C09B-CA8F1AD1ED05}"/>
+                  <a16:creationId xmlns:a16="http://schemas.microsoft.com/office/drawing/2014/main" id="{B25219CC-7076-0146-E5DB-10F5D20DA180}"/>
                 </a:ext>
               </a:extLst>
             </p:cNvPr>
@@ -4324,18 +3461,637 @@
           </p:nvGrpSpPr>
           <p:grpSpPr>
             <a:xfrm>
-              <a:off x="3119975" y="1321195"/>
-              <a:ext cx="1470707" cy="1029931"/>
-              <a:chOff x="3119975" y="1321195"/>
-              <a:chExt cx="1470707" cy="1029931"/>
+              <a:off x="7548243" y="1321195"/>
+              <a:ext cx="1800000" cy="2642033"/>
+              <a:chOff x="7548243" y="1321195"/>
+              <a:chExt cx="1800000" cy="2642033"/>
+            </a:xfrm>
+          </p:grpSpPr>
+          <p:grpSp>
+            <p:nvGrpSpPr>
+              <p:cNvPr id="38" name="Group 37">
+                <a:extLst>
+                  <a:ext uri="{FF2B5EF4-FFF2-40B4-BE49-F238E27FC236}">
+                    <a16:creationId xmlns:a16="http://schemas.microsoft.com/office/drawing/2014/main" id="{B5B9CDE3-8A0B-9F2C-D08C-F55D7FDF2A01}"/>
+                  </a:ext>
+                </a:extLst>
+              </p:cNvPr>
+              <p:cNvGrpSpPr/>
+              <p:nvPr/>
+            </p:nvGrpSpPr>
+            <p:grpSpPr>
+              <a:xfrm>
+                <a:off x="7548243" y="2351320"/>
+                <a:ext cx="1800000" cy="1611908"/>
+                <a:chOff x="7293384" y="1997110"/>
+                <a:chExt cx="1800000" cy="1611908"/>
+              </a:xfrm>
+            </p:grpSpPr>
+            <p:sp>
+              <p:nvSpPr>
+                <p:cNvPr id="29" name="Rectangle 28">
+                  <a:extLst>
+                    <a:ext uri="{FF2B5EF4-FFF2-40B4-BE49-F238E27FC236}">
+                      <a16:creationId xmlns:a16="http://schemas.microsoft.com/office/drawing/2014/main" id="{D37A9FA9-6751-EB66-685E-E50CDA00D452}"/>
+                    </a:ext>
+                  </a:extLst>
+                </p:cNvPr>
+                <p:cNvSpPr/>
+                <p:nvPr/>
+              </p:nvSpPr>
+              <p:spPr>
+                <a:xfrm>
+                  <a:off x="7293384" y="2709018"/>
+                  <a:ext cx="1800000" cy="900000"/>
+                </a:xfrm>
+                <a:prstGeom prst="rect">
+                  <a:avLst/>
+                </a:prstGeom>
+                <a:solidFill>
+                  <a:schemeClr val="accent2">
+                    <a:lumMod val="40000"/>
+                    <a:lumOff val="60000"/>
+                  </a:schemeClr>
+                </a:solidFill>
+                <a:ln>
+                  <a:noFill/>
+                </a:ln>
+              </p:spPr>
+              <p:style>
+                <a:lnRef idx="2">
+                  <a:schemeClr val="dk1"/>
+                </a:lnRef>
+                <a:fillRef idx="1">
+                  <a:schemeClr val="lt1"/>
+                </a:fillRef>
+                <a:effectRef idx="0">
+                  <a:schemeClr val="dk1"/>
+                </a:effectRef>
+                <a:fontRef idx="minor">
+                  <a:schemeClr val="dk1"/>
+                </a:fontRef>
+              </p:style>
+              <p:txBody>
+                <a:bodyPr rtlCol="0" anchor="ctr"/>
+                <a:lstStyle/>
+                <a:p>
+                  <a:pPr algn="ctr"/>
+                  <a:endParaRPr lang="en-US" sz="1600" dirty="0">
+                    <a:latin typeface="Cambria" panose="02040503050406030204" pitchFamily="18" charset="0"/>
+                    <a:ea typeface="Cambria" panose="02040503050406030204" pitchFamily="18" charset="0"/>
+                  </a:endParaRPr>
+                </a:p>
+                <a:p>
+                  <a:pPr algn="ctr"/>
+                  <a:r>
+                    <a:rPr lang="en-US" sz="1600" dirty="0">
+                      <a:latin typeface="Cambria" panose="02040503050406030204" pitchFamily="18" charset="0"/>
+                      <a:ea typeface="Cambria" panose="02040503050406030204" pitchFamily="18" charset="0"/>
+                    </a:rPr>
+                    <a:t>Send instructions to the client</a:t>
+                  </a:r>
+                  <a:endParaRPr lang="fr-FR" sz="1600" dirty="0">
+                    <a:latin typeface="Cambria" panose="02040503050406030204" pitchFamily="18" charset="0"/>
+                    <a:ea typeface="Cambria" panose="02040503050406030204" pitchFamily="18" charset="0"/>
+                  </a:endParaRPr>
+                </a:p>
+              </p:txBody>
+            </p:sp>
+            <p:sp>
+              <p:nvSpPr>
+                <p:cNvPr id="28" name="Flowchart: Off-page Connector 27">
+                  <a:extLst>
+                    <a:ext uri="{FF2B5EF4-FFF2-40B4-BE49-F238E27FC236}">
+                      <a16:creationId xmlns:a16="http://schemas.microsoft.com/office/drawing/2014/main" id="{4B1CE382-AE53-6681-24E2-E798118BB02A}"/>
+                    </a:ext>
+                  </a:extLst>
+                </p:cNvPr>
+                <p:cNvSpPr/>
+                <p:nvPr/>
+              </p:nvSpPr>
+              <p:spPr>
+                <a:xfrm>
+                  <a:off x="7293384" y="1997110"/>
+                  <a:ext cx="1800000" cy="900000"/>
+                </a:xfrm>
+                <a:prstGeom prst="flowChartOffpageConnector">
+                  <a:avLst/>
+                </a:prstGeom>
+                <a:solidFill>
+                  <a:schemeClr val="accent2">
+                    <a:lumMod val="20000"/>
+                    <a:lumOff val="80000"/>
+                  </a:schemeClr>
+                </a:solidFill>
+                <a:ln>
+                  <a:noFill/>
+                </a:ln>
+              </p:spPr>
+              <p:style>
+                <a:lnRef idx="2">
+                  <a:schemeClr val="dk1"/>
+                </a:lnRef>
+                <a:fillRef idx="1">
+                  <a:schemeClr val="lt1"/>
+                </a:fillRef>
+                <a:effectRef idx="0">
+                  <a:schemeClr val="dk1"/>
+                </a:effectRef>
+                <a:fontRef idx="minor">
+                  <a:schemeClr val="dk1"/>
+                </a:fontRef>
+              </p:style>
+              <p:txBody>
+                <a:bodyPr rtlCol="0" anchor="ctr"/>
+                <a:lstStyle/>
+                <a:p>
+                  <a:pPr algn="ctr"/>
+                  <a:r>
+                    <a:rPr lang="en-US" sz="1600" dirty="0">
+                      <a:latin typeface="Cambria" panose="02040503050406030204" pitchFamily="18" charset="0"/>
+                      <a:ea typeface="Cambria" panose="02040503050406030204" pitchFamily="18" charset="0"/>
+                    </a:rPr>
+                    <a:t>Receive instructions from computer</a:t>
+                  </a:r>
+                  <a:endParaRPr lang="fr-FR" sz="1600" dirty="0">
+                    <a:latin typeface="Cambria" panose="02040503050406030204" pitchFamily="18" charset="0"/>
+                    <a:ea typeface="Cambria" panose="02040503050406030204" pitchFamily="18" charset="0"/>
+                  </a:endParaRPr>
+                </a:p>
+              </p:txBody>
+            </p:sp>
+          </p:grpSp>
+          <p:grpSp>
+            <p:nvGrpSpPr>
+              <p:cNvPr id="45" name="Group 44">
+                <a:extLst>
+                  <a:ext uri="{FF2B5EF4-FFF2-40B4-BE49-F238E27FC236}">
+                    <a16:creationId xmlns:a16="http://schemas.microsoft.com/office/drawing/2014/main" id="{7D143604-3C6E-C227-85D0-66671DB0EF03}"/>
+                  </a:ext>
+                </a:extLst>
+              </p:cNvPr>
+              <p:cNvGrpSpPr/>
+              <p:nvPr/>
+            </p:nvGrpSpPr>
+            <p:grpSpPr>
+              <a:xfrm>
+                <a:off x="7712890" y="1321195"/>
+                <a:ext cx="1470707" cy="1029931"/>
+                <a:chOff x="7712890" y="1321195"/>
+                <a:chExt cx="1470707" cy="1029931"/>
+              </a:xfrm>
+            </p:grpSpPr>
+            <p:pic>
+              <p:nvPicPr>
+                <p:cNvPr id="13" name="Graphique 12" descr="Synchronisation avec le cloud avec un remplissage uni">
+                  <a:extLst>
+                    <a:ext uri="{FF2B5EF4-FFF2-40B4-BE49-F238E27FC236}">
+                      <a16:creationId xmlns:a16="http://schemas.microsoft.com/office/drawing/2014/main" id="{9C3DFEFA-38DC-DF4F-003B-F1F1237D1071}"/>
+                    </a:ext>
+                  </a:extLst>
+                </p:cNvPr>
+                <p:cNvPicPr>
+                  <a:picLocks noChangeAspect="1"/>
+                </p:cNvPicPr>
+                <p:nvPr/>
+              </p:nvPicPr>
+              <p:blipFill>
+                <a:blip r:embed="rId4">
+                  <a:extLst>
+                    <a:ext uri="{28A0092B-C50C-407E-A947-70E740481C1C}">
+                      <a14:useLocalDpi xmlns:a14="http://schemas.microsoft.com/office/drawing/2010/main" val="0"/>
+                    </a:ext>
+                    <a:ext uri="{96DAC541-7B7A-43D3-8B79-37D633B846F1}">
+                      <asvg:svgBlip xmlns:asvg="http://schemas.microsoft.com/office/drawing/2016/SVG/main" r:embed="rId5"/>
+                    </a:ext>
+                  </a:extLst>
+                </a:blip>
+                <a:stretch>
+                  <a:fillRect/>
+                </a:stretch>
+              </p:blipFill>
+              <p:spPr>
+                <a:xfrm>
+                  <a:off x="7998243" y="1321195"/>
+                  <a:ext cx="900000" cy="900000"/>
+                </a:xfrm>
+                <a:prstGeom prst="rect">
+                  <a:avLst/>
+                </a:prstGeom>
+              </p:spPr>
+            </p:pic>
+            <p:sp>
+              <p:nvSpPr>
+                <p:cNvPr id="7" name="TextBox 6">
+                  <a:extLst>
+                    <a:ext uri="{FF2B5EF4-FFF2-40B4-BE49-F238E27FC236}">
+                      <a16:creationId xmlns:a16="http://schemas.microsoft.com/office/drawing/2014/main" id="{355C1BB9-FC38-6D11-7318-5845E2385CDD}"/>
+                    </a:ext>
+                  </a:extLst>
+                </p:cNvPr>
+                <p:cNvSpPr txBox="1"/>
+                <p:nvPr/>
+              </p:nvSpPr>
+              <p:spPr>
+                <a:xfrm>
+                  <a:off x="7712890" y="2074127"/>
+                  <a:ext cx="1470707" cy="276999"/>
+                </a:xfrm>
+                <a:prstGeom prst="rect">
+                  <a:avLst/>
+                </a:prstGeom>
+                <a:noFill/>
+              </p:spPr>
+              <p:txBody>
+                <a:bodyPr wrap="square" rtlCol="0">
+                  <a:spAutoFit/>
+                </a:bodyPr>
+                <a:lstStyle/>
+                <a:p>
+                  <a:pPr algn="ctr"/>
+                  <a:r>
+                    <a:rPr lang="fr-FR" sz="1200" dirty="0">
+                      <a:latin typeface="Cambria" panose="02040503050406030204" pitchFamily="18" charset="0"/>
+                      <a:ea typeface="Cambria" panose="02040503050406030204" pitchFamily="18" charset="0"/>
+                    </a:rPr>
+                    <a:t>MQTT server</a:t>
+                  </a:r>
+                  <a:endParaRPr lang="en-US" sz="1200" dirty="0">
+                    <a:latin typeface="Cambria" panose="02040503050406030204" pitchFamily="18" charset="0"/>
+                    <a:ea typeface="Cambria" panose="02040503050406030204" pitchFamily="18" charset="0"/>
+                  </a:endParaRPr>
+                </a:p>
+              </p:txBody>
+            </p:sp>
+          </p:grpSp>
+        </p:grpSp>
+        <p:grpSp>
+          <p:nvGrpSpPr>
+            <p:cNvPr id="58" name="Group 57">
+              <a:extLst>
+                <a:ext uri="{FF2B5EF4-FFF2-40B4-BE49-F238E27FC236}">
+                  <a16:creationId xmlns:a16="http://schemas.microsoft.com/office/drawing/2014/main" id="{1470A5FB-E774-3FB3-0601-ED218E26F624}"/>
+                </a:ext>
+              </a:extLst>
+            </p:cNvPr>
+            <p:cNvGrpSpPr/>
+            <p:nvPr/>
+          </p:nvGrpSpPr>
+          <p:grpSpPr>
+            <a:xfrm>
+              <a:off x="9844700" y="1321195"/>
+              <a:ext cx="1800000" cy="3362015"/>
+              <a:chOff x="9844700" y="1321195"/>
+              <a:chExt cx="1800000" cy="3362015"/>
+            </a:xfrm>
+          </p:grpSpPr>
+          <p:grpSp>
+            <p:nvGrpSpPr>
+              <p:cNvPr id="39" name="Group 38">
+                <a:extLst>
+                  <a:ext uri="{FF2B5EF4-FFF2-40B4-BE49-F238E27FC236}">
+                    <a16:creationId xmlns:a16="http://schemas.microsoft.com/office/drawing/2014/main" id="{CB58834D-639A-2D02-2E26-A9C305E576FB}"/>
+                  </a:ext>
+                </a:extLst>
+              </p:cNvPr>
+              <p:cNvGrpSpPr/>
+              <p:nvPr/>
+            </p:nvGrpSpPr>
+            <p:grpSpPr>
+              <a:xfrm>
+                <a:off x="9844700" y="2351320"/>
+                <a:ext cx="1800000" cy="2331890"/>
+                <a:chOff x="9844700" y="1997110"/>
+                <a:chExt cx="1800000" cy="2331890"/>
+              </a:xfrm>
+            </p:grpSpPr>
+            <p:sp>
+              <p:nvSpPr>
+                <p:cNvPr id="32" name="Rectangle 31">
+                  <a:extLst>
+                    <a:ext uri="{FF2B5EF4-FFF2-40B4-BE49-F238E27FC236}">
+                      <a16:creationId xmlns:a16="http://schemas.microsoft.com/office/drawing/2014/main" id="{33670C0C-9224-13A4-4C5C-9A8FB346A605}"/>
+                    </a:ext>
+                  </a:extLst>
+                </p:cNvPr>
+                <p:cNvSpPr/>
+                <p:nvPr/>
+              </p:nvSpPr>
+              <p:spPr>
+                <a:xfrm>
+                  <a:off x="9844700" y="3429000"/>
+                  <a:ext cx="1800000" cy="900000"/>
+                </a:xfrm>
+                <a:prstGeom prst="rect">
+                  <a:avLst/>
+                </a:prstGeom>
+                <a:solidFill>
+                  <a:schemeClr val="accent2">
+                    <a:lumMod val="60000"/>
+                    <a:lumOff val="40000"/>
+                  </a:schemeClr>
+                </a:solidFill>
+                <a:ln>
+                  <a:noFill/>
+                </a:ln>
+              </p:spPr>
+              <p:style>
+                <a:lnRef idx="2">
+                  <a:schemeClr val="dk1"/>
+                </a:lnRef>
+                <a:fillRef idx="1">
+                  <a:schemeClr val="lt1"/>
+                </a:fillRef>
+                <a:effectRef idx="0">
+                  <a:schemeClr val="dk1"/>
+                </a:effectRef>
+                <a:fontRef idx="minor">
+                  <a:schemeClr val="dk1"/>
+                </a:fontRef>
+              </p:style>
+              <p:txBody>
+                <a:bodyPr rtlCol="0" anchor="ctr"/>
+                <a:lstStyle/>
+                <a:p>
+                  <a:pPr algn="ctr"/>
+                  <a:r>
+                    <a:rPr lang="en-US" sz="1600" dirty="0">
+                      <a:latin typeface="Cambria" panose="02040503050406030204" pitchFamily="18" charset="0"/>
+                      <a:ea typeface="Cambria" panose="02040503050406030204" pitchFamily="18" charset="0"/>
+                    </a:rPr>
+                    <a:t>Execute instructions</a:t>
+                  </a:r>
+                  <a:endParaRPr lang="fr-FR" sz="1600" dirty="0">
+                    <a:latin typeface="Cambria" panose="02040503050406030204" pitchFamily="18" charset="0"/>
+                    <a:ea typeface="Cambria" panose="02040503050406030204" pitchFamily="18" charset="0"/>
+                  </a:endParaRPr>
+                </a:p>
+              </p:txBody>
+            </p:sp>
+            <p:sp>
+              <p:nvSpPr>
+                <p:cNvPr id="35" name="Flowchart: Off-page Connector 34">
+                  <a:extLst>
+                    <a:ext uri="{FF2B5EF4-FFF2-40B4-BE49-F238E27FC236}">
+                      <a16:creationId xmlns:a16="http://schemas.microsoft.com/office/drawing/2014/main" id="{A1761186-FBC0-3438-17B6-C96857676355}"/>
+                    </a:ext>
+                  </a:extLst>
+                </p:cNvPr>
+                <p:cNvSpPr/>
+                <p:nvPr/>
+              </p:nvSpPr>
+              <p:spPr>
+                <a:xfrm>
+                  <a:off x="9844700" y="2709018"/>
+                  <a:ext cx="1800000" cy="900000"/>
+                </a:xfrm>
+                <a:prstGeom prst="flowChartOffpageConnector">
+                  <a:avLst/>
+                </a:prstGeom>
+                <a:solidFill>
+                  <a:schemeClr val="accent2">
+                    <a:lumMod val="40000"/>
+                    <a:lumOff val="60000"/>
+                  </a:schemeClr>
+                </a:solidFill>
+                <a:ln>
+                  <a:noFill/>
+                </a:ln>
+              </p:spPr>
+              <p:style>
+                <a:lnRef idx="2">
+                  <a:schemeClr val="dk1"/>
+                </a:lnRef>
+                <a:fillRef idx="1">
+                  <a:schemeClr val="lt1"/>
+                </a:fillRef>
+                <a:effectRef idx="0">
+                  <a:schemeClr val="dk1"/>
+                </a:effectRef>
+                <a:fontRef idx="minor">
+                  <a:schemeClr val="dk1"/>
+                </a:fontRef>
+              </p:style>
+              <p:txBody>
+                <a:bodyPr rtlCol="0" anchor="ctr"/>
+                <a:lstStyle/>
+                <a:p>
+                  <a:pPr algn="ctr"/>
+                  <a:endParaRPr lang="en-US" sz="1600" dirty="0">
+                    <a:latin typeface="Cambria" panose="02040503050406030204" pitchFamily="18" charset="0"/>
+                    <a:ea typeface="Cambria" panose="02040503050406030204" pitchFamily="18" charset="0"/>
+                  </a:endParaRPr>
+                </a:p>
+                <a:p>
+                  <a:pPr algn="ctr"/>
+                  <a:r>
+                    <a:rPr lang="en-US" sz="1600" dirty="0">
+                      <a:latin typeface="Cambria" panose="02040503050406030204" pitchFamily="18" charset="0"/>
+                      <a:ea typeface="Cambria" panose="02040503050406030204" pitchFamily="18" charset="0"/>
+                    </a:rPr>
+                    <a:t>Receive instructions</a:t>
+                  </a:r>
+                  <a:endParaRPr lang="fr-FR" sz="1600" dirty="0">
+                    <a:latin typeface="Cambria" panose="02040503050406030204" pitchFamily="18" charset="0"/>
+                    <a:ea typeface="Cambria" panose="02040503050406030204" pitchFamily="18" charset="0"/>
+                  </a:endParaRPr>
+                </a:p>
+              </p:txBody>
+            </p:sp>
+            <p:sp>
+              <p:nvSpPr>
+                <p:cNvPr id="31" name="Flowchart: Off-page Connector 30">
+                  <a:extLst>
+                    <a:ext uri="{FF2B5EF4-FFF2-40B4-BE49-F238E27FC236}">
+                      <a16:creationId xmlns:a16="http://schemas.microsoft.com/office/drawing/2014/main" id="{03FA5EFB-93FB-FDFE-1430-733FC6BB9E5B}"/>
+                    </a:ext>
+                  </a:extLst>
+                </p:cNvPr>
+                <p:cNvSpPr/>
+                <p:nvPr/>
+              </p:nvSpPr>
+              <p:spPr>
+                <a:xfrm>
+                  <a:off x="9844700" y="1997110"/>
+                  <a:ext cx="1800000" cy="900000"/>
+                </a:xfrm>
+                <a:prstGeom prst="flowChartOffpageConnector">
+                  <a:avLst/>
+                </a:prstGeom>
+                <a:solidFill>
+                  <a:schemeClr val="accent2">
+                    <a:lumMod val="20000"/>
+                    <a:lumOff val="80000"/>
+                  </a:schemeClr>
+                </a:solidFill>
+                <a:ln>
+                  <a:noFill/>
+                </a:ln>
+              </p:spPr>
+              <p:style>
+                <a:lnRef idx="2">
+                  <a:schemeClr val="dk1"/>
+                </a:lnRef>
+                <a:fillRef idx="1">
+                  <a:schemeClr val="lt1"/>
+                </a:fillRef>
+                <a:effectRef idx="0">
+                  <a:schemeClr val="dk1"/>
+                </a:effectRef>
+                <a:fontRef idx="minor">
+                  <a:schemeClr val="dk1"/>
+                </a:fontRef>
+              </p:style>
+              <p:txBody>
+                <a:bodyPr rtlCol="0" anchor="ctr"/>
+                <a:lstStyle/>
+                <a:p>
+                  <a:pPr algn="ctr"/>
+                  <a:r>
+                    <a:rPr lang="en-US" sz="1600" dirty="0">
+                      <a:latin typeface="Cambria" panose="02040503050406030204" pitchFamily="18" charset="0"/>
+                      <a:ea typeface="Cambria" panose="02040503050406030204" pitchFamily="18" charset="0"/>
+                    </a:rPr>
+                    <a:t>Subscribe to MQTT server</a:t>
+                  </a:r>
+                  <a:endParaRPr lang="fr-FR" sz="1600" dirty="0">
+                    <a:latin typeface="Cambria" panose="02040503050406030204" pitchFamily="18" charset="0"/>
+                    <a:ea typeface="Cambria" panose="02040503050406030204" pitchFamily="18" charset="0"/>
+                  </a:endParaRPr>
+                </a:p>
+              </p:txBody>
+            </p:sp>
+          </p:grpSp>
+          <p:grpSp>
+            <p:nvGrpSpPr>
+              <p:cNvPr id="46" name="Group 45">
+                <a:extLst>
+                  <a:ext uri="{FF2B5EF4-FFF2-40B4-BE49-F238E27FC236}">
+                    <a16:creationId xmlns:a16="http://schemas.microsoft.com/office/drawing/2014/main" id="{85BC8A2A-81F9-DE56-B7F9-58B7E143F0E4}"/>
+                  </a:ext>
+                </a:extLst>
+              </p:cNvPr>
+              <p:cNvGrpSpPr/>
+              <p:nvPr/>
+            </p:nvGrpSpPr>
+            <p:grpSpPr>
+              <a:xfrm>
+                <a:off x="10009347" y="1321195"/>
+                <a:ext cx="1470707" cy="1029931"/>
+                <a:chOff x="10009347" y="1321195"/>
+                <a:chExt cx="1470707" cy="1029931"/>
+              </a:xfrm>
+            </p:grpSpPr>
+            <p:pic>
+              <p:nvPicPr>
+                <p:cNvPr id="15" name="Graphique 14" descr="Quadrirotor avec un remplissage uni">
+                  <a:extLst>
+                    <a:ext uri="{FF2B5EF4-FFF2-40B4-BE49-F238E27FC236}">
+                      <a16:creationId xmlns:a16="http://schemas.microsoft.com/office/drawing/2014/main" id="{39E94A4C-2B54-2F14-BE11-E2B0E4E13873}"/>
+                    </a:ext>
+                  </a:extLst>
+                </p:cNvPr>
+                <p:cNvPicPr>
+                  <a:picLocks noChangeAspect="1"/>
+                </p:cNvPicPr>
+                <p:nvPr/>
+              </p:nvPicPr>
+              <p:blipFill>
+                <a:blip r:embed="rId6">
+                  <a:extLst>
+                    <a:ext uri="{28A0092B-C50C-407E-A947-70E740481C1C}">
+                      <a14:useLocalDpi xmlns:a14="http://schemas.microsoft.com/office/drawing/2010/main" val="0"/>
+                    </a:ext>
+                    <a:ext uri="{96DAC541-7B7A-43D3-8B79-37D633B846F1}">
+                      <asvg:svgBlip xmlns:asvg="http://schemas.microsoft.com/office/drawing/2016/SVG/main" r:embed="rId7"/>
+                    </a:ext>
+                  </a:extLst>
+                </a:blip>
+                <a:stretch>
+                  <a:fillRect/>
+                </a:stretch>
+              </p:blipFill>
+              <p:spPr>
+                <a:xfrm>
+                  <a:off x="10294700" y="1321195"/>
+                  <a:ext cx="900000" cy="900000"/>
+                </a:xfrm>
+                <a:prstGeom prst="rect">
+                  <a:avLst/>
+                </a:prstGeom>
+              </p:spPr>
+            </p:pic>
+            <p:sp>
+              <p:nvSpPr>
+                <p:cNvPr id="8" name="TextBox 7">
+                  <a:extLst>
+                    <a:ext uri="{FF2B5EF4-FFF2-40B4-BE49-F238E27FC236}">
+                      <a16:creationId xmlns:a16="http://schemas.microsoft.com/office/drawing/2014/main" id="{667756C3-634C-3DA6-A88B-92F9AA31D2FF}"/>
+                    </a:ext>
+                  </a:extLst>
+                </p:cNvPr>
+                <p:cNvSpPr txBox="1"/>
+                <p:nvPr/>
+              </p:nvSpPr>
+              <p:spPr>
+                <a:xfrm>
+                  <a:off x="10009347" y="2074127"/>
+                  <a:ext cx="1470707" cy="276999"/>
+                </a:xfrm>
+                <a:prstGeom prst="rect">
+                  <a:avLst/>
+                </a:prstGeom>
+                <a:noFill/>
+              </p:spPr>
+              <p:txBody>
+                <a:bodyPr wrap="square" rtlCol="0">
+                  <a:spAutoFit/>
+                </a:bodyPr>
+                <a:lstStyle/>
+                <a:p>
+                  <a:pPr algn="ctr"/>
+                  <a:r>
+                    <a:rPr lang="fr-FR" sz="1200" dirty="0">
+                      <a:latin typeface="Cambria" panose="02040503050406030204" pitchFamily="18" charset="0"/>
+                      <a:ea typeface="Cambria" panose="02040503050406030204" pitchFamily="18" charset="0"/>
+                    </a:rPr>
+                    <a:t>UAV</a:t>
+                  </a:r>
+                  <a:endParaRPr lang="en-US" sz="1200" dirty="0">
+                    <a:latin typeface="Cambria" panose="02040503050406030204" pitchFamily="18" charset="0"/>
+                    <a:ea typeface="Cambria" panose="02040503050406030204" pitchFamily="18" charset="0"/>
+                  </a:endParaRPr>
+                </a:p>
+              </p:txBody>
+            </p:sp>
+          </p:grpSp>
+        </p:grpSp>
+        <p:grpSp>
+          <p:nvGrpSpPr>
+            <p:cNvPr id="59" name="Group 58">
+              <a:extLst>
+                <a:ext uri="{FF2B5EF4-FFF2-40B4-BE49-F238E27FC236}">
+                  <a16:creationId xmlns:a16="http://schemas.microsoft.com/office/drawing/2014/main" id="{78E07122-A6E8-758B-38BB-A926964FE42B}"/>
+                </a:ext>
+              </a:extLst>
+            </p:cNvPr>
+            <p:cNvGrpSpPr/>
+            <p:nvPr/>
+          </p:nvGrpSpPr>
+          <p:grpSpPr>
+            <a:xfrm>
+              <a:off x="658871" y="1321195"/>
+              <a:ext cx="1800000" cy="4973145"/>
+              <a:chOff x="658871" y="1321195"/>
+              <a:chExt cx="1800000" cy="4973145"/>
             </a:xfrm>
           </p:grpSpPr>
           <p:pic>
             <p:nvPicPr>
-              <p:cNvPr id="17" name="Graphique 16" descr="Webcam avec un remplissage uni">
+              <p:cNvPr id="5" name="Image 4" descr="Un jeune mentonnier lève le petit doigt">
                 <a:extLst>
                   <a:ext uri="{FF2B5EF4-FFF2-40B4-BE49-F238E27FC236}">
-                    <a16:creationId xmlns:a16="http://schemas.microsoft.com/office/drawing/2014/main" id="{71590CFB-EDE0-AC8A-D089-DF6B9215304D}"/>
+                    <a16:creationId xmlns:a16="http://schemas.microsoft.com/office/drawing/2014/main" id="{6369174D-BF19-2381-C16A-5AA781F14427}"/>
                   </a:ext>
                 </a:extLst>
               </p:cNvPr>
@@ -4345,13 +4101,10 @@
               <p:nvPr/>
             </p:nvPicPr>
             <p:blipFill>
-              <a:blip r:embed="rId11">
+              <a:blip r:embed="rId8">
                 <a:extLst>
                   <a:ext uri="{28A0092B-C50C-407E-A947-70E740481C1C}">
                     <a14:useLocalDpi xmlns:a14="http://schemas.microsoft.com/office/drawing/2010/main" val="0"/>
-                  </a:ext>
-                  <a:ext uri="{96DAC541-7B7A-43D3-8B79-37D633B846F1}">
-                    <asvg:svgBlip xmlns:asvg="http://schemas.microsoft.com/office/drawing/2016/SVG/main" r:embed="rId12"/>
                   </a:ext>
                 </a:extLst>
               </a:blip>
@@ -4361,64 +4114,208 @@
             </p:blipFill>
             <p:spPr>
               <a:xfrm>
-                <a:off x="3405328" y="1321195"/>
-                <a:ext cx="900000" cy="900000"/>
+                <a:off x="1068381" y="3159502"/>
+                <a:ext cx="980980" cy="3134838"/>
               </a:xfrm>
               <a:prstGeom prst="rect">
                 <a:avLst/>
               </a:prstGeom>
             </p:spPr>
           </p:pic>
-          <p:sp>
-            <p:nvSpPr>
-              <p:cNvPr id="3" name="TextBox 2">
+          <p:grpSp>
+            <p:nvGrpSpPr>
+              <p:cNvPr id="54" name="Group 53">
                 <a:extLst>
                   <a:ext uri="{FF2B5EF4-FFF2-40B4-BE49-F238E27FC236}">
-                    <a16:creationId xmlns:a16="http://schemas.microsoft.com/office/drawing/2014/main" id="{A85407AF-9503-E814-BC52-9F8C6FF13742}"/>
+                    <a16:creationId xmlns:a16="http://schemas.microsoft.com/office/drawing/2014/main" id="{0865F1A0-E9BD-96C3-659E-652445702991}"/>
                   </a:ext>
                 </a:extLst>
               </p:cNvPr>
-              <p:cNvSpPr txBox="1"/>
+              <p:cNvGrpSpPr/>
               <p:nvPr/>
-            </p:nvSpPr>
-            <p:spPr>
+            </p:nvGrpSpPr>
+            <p:grpSpPr>
               <a:xfrm>
-                <a:off x="3119975" y="2074127"/>
-                <a:ext cx="1470707" cy="276999"/>
+                <a:off x="658871" y="1321195"/>
+                <a:ext cx="1800000" cy="1750125"/>
+                <a:chOff x="658871" y="1321195"/>
+                <a:chExt cx="1800000" cy="1750125"/>
               </a:xfrm>
-              <a:prstGeom prst="rect">
-                <a:avLst/>
-              </a:prstGeom>
-              <a:noFill/>
-            </p:spPr>
-            <p:txBody>
-              <a:bodyPr wrap="square" rtlCol="0">
-                <a:spAutoFit/>
-              </a:bodyPr>
-              <a:lstStyle/>
-              <a:p>
-                <a:pPr algn="ctr"/>
-                <a:r>
-                  <a:rPr lang="fr-FR" sz="1200" dirty="0">
+            </p:grpSpPr>
+            <p:sp>
+              <p:nvSpPr>
+                <p:cNvPr id="33" name="Rectangle 32">
+                  <a:extLst>
+                    <a:ext uri="{FF2B5EF4-FFF2-40B4-BE49-F238E27FC236}">
+                      <a16:creationId xmlns:a16="http://schemas.microsoft.com/office/drawing/2014/main" id="{AA7E1676-3DA9-8D6C-414A-50B0E109BF5F}"/>
+                    </a:ext>
+                  </a:extLst>
+                </p:cNvPr>
+                <p:cNvSpPr/>
+                <p:nvPr/>
+              </p:nvSpPr>
+              <p:spPr>
+                <a:xfrm>
+                  <a:off x="658871" y="2351320"/>
+                  <a:ext cx="1800000" cy="720000"/>
+                </a:xfrm>
+                <a:prstGeom prst="rect">
+                  <a:avLst/>
+                </a:prstGeom>
+                <a:solidFill>
+                  <a:schemeClr val="accent2">
+                    <a:lumMod val="20000"/>
+                    <a:lumOff val="80000"/>
+                  </a:schemeClr>
+                </a:solidFill>
+                <a:ln>
+                  <a:noFill/>
+                </a:ln>
+              </p:spPr>
+              <p:style>
+                <a:lnRef idx="2">
+                  <a:schemeClr val="dk1"/>
+                </a:lnRef>
+                <a:fillRef idx="1">
+                  <a:schemeClr val="lt1"/>
+                </a:fillRef>
+                <a:effectRef idx="0">
+                  <a:schemeClr val="dk1"/>
+                </a:effectRef>
+                <a:fontRef idx="minor">
+                  <a:schemeClr val="dk1"/>
+                </a:fontRef>
+              </p:style>
+              <p:txBody>
+                <a:bodyPr rtlCol="0" anchor="ctr"/>
+                <a:lstStyle/>
+                <a:p>
+                  <a:pPr algn="ctr"/>
+                  <a:r>
+                    <a:rPr lang="en-US" sz="1600" dirty="0">
+                      <a:latin typeface="Cambria" panose="02040503050406030204" pitchFamily="18" charset="0"/>
+                      <a:ea typeface="Cambria" panose="02040503050406030204" pitchFamily="18" charset="0"/>
+                    </a:rPr>
+                    <a:t>Give instruction with hand signs</a:t>
+                  </a:r>
+                  <a:endParaRPr lang="fr-FR" sz="1600" dirty="0">
                     <a:latin typeface="Cambria" panose="02040503050406030204" pitchFamily="18" charset="0"/>
                     <a:ea typeface="Cambria" panose="02040503050406030204" pitchFamily="18" charset="0"/>
-                  </a:rPr>
-                  <a:t>Camera</a:t>
-                </a:r>
-                <a:endParaRPr lang="en-US" sz="1200" dirty="0">
-                  <a:latin typeface="Cambria" panose="02040503050406030204" pitchFamily="18" charset="0"/>
-                  <a:ea typeface="Cambria" panose="02040503050406030204" pitchFamily="18" charset="0"/>
-                </a:endParaRPr>
-              </a:p>
-            </p:txBody>
-          </p:sp>
+                  </a:endParaRPr>
+                </a:p>
+              </p:txBody>
+            </p:sp>
+            <p:grpSp>
+              <p:nvGrpSpPr>
+                <p:cNvPr id="30" name="Group 29">
+                  <a:extLst>
+                    <a:ext uri="{FF2B5EF4-FFF2-40B4-BE49-F238E27FC236}">
+                      <a16:creationId xmlns:a16="http://schemas.microsoft.com/office/drawing/2014/main" id="{D7485E7D-1755-AE1A-7D7A-9F1CB639E622}"/>
+                    </a:ext>
+                  </a:extLst>
+                </p:cNvPr>
+                <p:cNvGrpSpPr/>
+                <p:nvPr/>
+              </p:nvGrpSpPr>
+              <p:grpSpPr>
+                <a:xfrm>
+                  <a:off x="823518" y="1321195"/>
+                  <a:ext cx="1470707" cy="1029931"/>
+                  <a:chOff x="823518" y="1321195"/>
+                  <a:chExt cx="1470707" cy="1029931"/>
+                </a:xfrm>
+              </p:grpSpPr>
+              <p:pic>
+                <p:nvPicPr>
+                  <p:cNvPr id="22" name="Graphic 21" descr="Hang Loose Hand Gesture with solid fill">
+                    <a:extLst>
+                      <a:ext uri="{FF2B5EF4-FFF2-40B4-BE49-F238E27FC236}">
+                        <a16:creationId xmlns:a16="http://schemas.microsoft.com/office/drawing/2014/main" id="{EFA74D91-E152-4B58-C989-2D3EE4C1208C}"/>
+                      </a:ext>
+                    </a:extLst>
+                  </p:cNvPr>
+                  <p:cNvPicPr>
+                    <a:picLocks noChangeAspect="1"/>
+                  </p:cNvPicPr>
+                  <p:nvPr/>
+                </p:nvPicPr>
+                <p:blipFill>
+                  <a:blip r:embed="rId9">
+                    <a:extLst>
+                      <a:ext uri="{28A0092B-C50C-407E-A947-70E740481C1C}">
+                        <a14:useLocalDpi xmlns:a14="http://schemas.microsoft.com/office/drawing/2010/main" val="0"/>
+                      </a:ext>
+                      <a:ext uri="{96DAC541-7B7A-43D3-8B79-37D633B846F1}">
+                        <asvg:svgBlip xmlns:asvg="http://schemas.microsoft.com/office/drawing/2016/SVG/main" r:embed="rId10"/>
+                      </a:ext>
+                    </a:extLst>
+                  </a:blip>
+                  <a:stretch>
+                    <a:fillRect/>
+                  </a:stretch>
+                </p:blipFill>
+                <p:spPr>
+                  <a:xfrm>
+                    <a:off x="1108871" y="1321195"/>
+                    <a:ext cx="900000" cy="900000"/>
+                  </a:xfrm>
+                  <a:prstGeom prst="rect">
+                    <a:avLst/>
+                  </a:prstGeom>
+                </p:spPr>
+              </p:pic>
+              <p:sp>
+                <p:nvSpPr>
+                  <p:cNvPr id="27" name="TextBox 26">
+                    <a:extLst>
+                      <a:ext uri="{FF2B5EF4-FFF2-40B4-BE49-F238E27FC236}">
+                        <a16:creationId xmlns:a16="http://schemas.microsoft.com/office/drawing/2014/main" id="{57EEF9B6-EC70-1711-0497-9A01540D5984}"/>
+                      </a:ext>
+                    </a:extLst>
+                  </p:cNvPr>
+                  <p:cNvSpPr txBox="1"/>
+                  <p:nvPr/>
+                </p:nvSpPr>
+                <p:spPr>
+                  <a:xfrm>
+                    <a:off x="823518" y="2074127"/>
+                    <a:ext cx="1470707" cy="276999"/>
+                  </a:xfrm>
+                  <a:prstGeom prst="rect">
+                    <a:avLst/>
+                  </a:prstGeom>
+                  <a:noFill/>
+                </p:spPr>
+                <p:txBody>
+                  <a:bodyPr wrap="square" rtlCol="0">
+                    <a:spAutoFit/>
+                  </a:bodyPr>
+                  <a:lstStyle/>
+                  <a:p>
+                    <a:pPr algn="ctr"/>
+                    <a:r>
+                      <a:rPr lang="fr-FR" sz="1200" dirty="0">
+                        <a:latin typeface="Cambria" panose="02040503050406030204" pitchFamily="18" charset="0"/>
+                        <a:ea typeface="Cambria" panose="02040503050406030204" pitchFamily="18" charset="0"/>
+                      </a:rPr>
+                      <a:t>User hand sign</a:t>
+                    </a:r>
+                    <a:endParaRPr lang="en-US" sz="1200" dirty="0">
+                      <a:latin typeface="Cambria" panose="02040503050406030204" pitchFamily="18" charset="0"/>
+                      <a:ea typeface="Cambria" panose="02040503050406030204" pitchFamily="18" charset="0"/>
+                    </a:endParaRPr>
+                  </a:p>
+                </p:txBody>
+              </p:sp>
+            </p:grpSp>
+          </p:grpSp>
         </p:grpSp>
         <p:grpSp>
           <p:nvGrpSpPr>
-            <p:cNvPr id="51" name="Group 50">
+            <p:cNvPr id="55" name="Group 54">
               <a:extLst>
                 <a:ext uri="{FF2B5EF4-FFF2-40B4-BE49-F238E27FC236}">
-                  <a16:creationId xmlns:a16="http://schemas.microsoft.com/office/drawing/2014/main" id="{9EC0FFB6-A0B1-99F8-A422-7400C7BD49B8}"/>
+                  <a16:creationId xmlns:a16="http://schemas.microsoft.com/office/drawing/2014/main" id="{78B0BD39-690B-666D-F2F7-98F21AC0AB20}"/>
                 </a:ext>
               </a:extLst>
             </p:cNvPr>
@@ -4427,183 +4324,307 @@
           </p:nvGrpSpPr>
           <p:grpSpPr>
             <a:xfrm>
-              <a:off x="2955327" y="2351320"/>
-              <a:ext cx="1800000" cy="1611908"/>
-              <a:chOff x="7293384" y="1997110"/>
-              <a:chExt cx="1800000" cy="1611908"/>
+              <a:off x="2955328" y="1321195"/>
+              <a:ext cx="1800000" cy="2642033"/>
+              <a:chOff x="2955327" y="1321195"/>
+              <a:chExt cx="1800000" cy="2642033"/>
             </a:xfrm>
           </p:grpSpPr>
-          <p:sp>
-            <p:nvSpPr>
-              <p:cNvPr id="52" name="Rectangle 51">
+          <p:grpSp>
+            <p:nvGrpSpPr>
+              <p:cNvPr id="34" name="Group 33">
                 <a:extLst>
                   <a:ext uri="{FF2B5EF4-FFF2-40B4-BE49-F238E27FC236}">
-                    <a16:creationId xmlns:a16="http://schemas.microsoft.com/office/drawing/2014/main" id="{2188C388-F5BF-05D3-749B-3DA1FD4E4D61}"/>
+                    <a16:creationId xmlns:a16="http://schemas.microsoft.com/office/drawing/2014/main" id="{3592C8ED-EFE9-B021-C09B-CA8F1AD1ED05}"/>
                   </a:ext>
                 </a:extLst>
               </p:cNvPr>
-              <p:cNvSpPr/>
+              <p:cNvGrpSpPr/>
               <p:nvPr/>
-            </p:nvSpPr>
-            <p:spPr>
+            </p:nvGrpSpPr>
+            <p:grpSpPr>
               <a:xfrm>
-                <a:off x="7293384" y="2709018"/>
-                <a:ext cx="1800000" cy="900000"/>
+                <a:off x="3119975" y="1321195"/>
+                <a:ext cx="1470707" cy="1029931"/>
+                <a:chOff x="3119975" y="1321195"/>
+                <a:chExt cx="1470707" cy="1029931"/>
               </a:xfrm>
-              <a:prstGeom prst="rect">
-                <a:avLst/>
-              </a:prstGeom>
-              <a:solidFill>
-                <a:schemeClr val="accent2">
-                  <a:lumMod val="40000"/>
-                  <a:lumOff val="60000"/>
-                </a:schemeClr>
-              </a:solidFill>
-              <a:ln>
+            </p:grpSpPr>
+            <p:pic>
+              <p:nvPicPr>
+                <p:cNvPr id="17" name="Graphique 16" descr="Webcam avec un remplissage uni">
+                  <a:extLst>
+                    <a:ext uri="{FF2B5EF4-FFF2-40B4-BE49-F238E27FC236}">
+                      <a16:creationId xmlns:a16="http://schemas.microsoft.com/office/drawing/2014/main" id="{71590CFB-EDE0-AC8A-D089-DF6B9215304D}"/>
+                    </a:ext>
+                  </a:extLst>
+                </p:cNvPr>
+                <p:cNvPicPr>
+                  <a:picLocks noChangeAspect="1"/>
+                </p:cNvPicPr>
+                <p:nvPr/>
+              </p:nvPicPr>
+              <p:blipFill>
+                <a:blip r:embed="rId11">
+                  <a:extLst>
+                    <a:ext uri="{28A0092B-C50C-407E-A947-70E740481C1C}">
+                      <a14:useLocalDpi xmlns:a14="http://schemas.microsoft.com/office/drawing/2010/main" val="0"/>
+                    </a:ext>
+                    <a:ext uri="{96DAC541-7B7A-43D3-8B79-37D633B846F1}">
+                      <asvg:svgBlip xmlns:asvg="http://schemas.microsoft.com/office/drawing/2016/SVG/main" r:embed="rId12"/>
+                    </a:ext>
+                  </a:extLst>
+                </a:blip>
+                <a:stretch>
+                  <a:fillRect/>
+                </a:stretch>
+              </p:blipFill>
+              <p:spPr>
+                <a:xfrm>
+                  <a:off x="3405328" y="1321195"/>
+                  <a:ext cx="900000" cy="900000"/>
+                </a:xfrm>
+                <a:prstGeom prst="rect">
+                  <a:avLst/>
+                </a:prstGeom>
+              </p:spPr>
+            </p:pic>
+            <p:sp>
+              <p:nvSpPr>
+                <p:cNvPr id="3" name="TextBox 2">
+                  <a:extLst>
+                    <a:ext uri="{FF2B5EF4-FFF2-40B4-BE49-F238E27FC236}">
+                      <a16:creationId xmlns:a16="http://schemas.microsoft.com/office/drawing/2014/main" id="{A85407AF-9503-E814-BC52-9F8C6FF13742}"/>
+                    </a:ext>
+                  </a:extLst>
+                </p:cNvPr>
+                <p:cNvSpPr txBox="1"/>
+                <p:nvPr/>
+              </p:nvSpPr>
+              <p:spPr>
+                <a:xfrm>
+                  <a:off x="3119975" y="2074127"/>
+                  <a:ext cx="1470707" cy="276999"/>
+                </a:xfrm>
+                <a:prstGeom prst="rect">
+                  <a:avLst/>
+                </a:prstGeom>
                 <a:noFill/>
-              </a:ln>
-            </p:spPr>
-            <p:style>
-              <a:lnRef idx="2">
-                <a:schemeClr val="dk1"/>
-              </a:lnRef>
-              <a:fillRef idx="1">
-                <a:schemeClr val="lt1"/>
-              </a:fillRef>
-              <a:effectRef idx="0">
-                <a:schemeClr val="dk1"/>
-              </a:effectRef>
-              <a:fontRef idx="minor">
-                <a:schemeClr val="dk1"/>
-              </a:fontRef>
-            </p:style>
-            <p:txBody>
-              <a:bodyPr rtlCol="0" anchor="ctr"/>
-              <a:lstStyle/>
-              <a:p>
-                <a:pPr algn="ctr"/>
-                <a:endParaRPr lang="en-US" sz="1600" dirty="0">
-                  <a:latin typeface="Cambria" panose="02040503050406030204" pitchFamily="18" charset="0"/>
-                  <a:ea typeface="Cambria" panose="02040503050406030204" pitchFamily="18" charset="0"/>
-                </a:endParaRPr>
-              </a:p>
-              <a:p>
-                <a:pPr algn="ctr"/>
-                <a:r>
-                  <a:rPr lang="en-US" sz="1600" dirty="0">
+              </p:spPr>
+              <p:txBody>
+                <a:bodyPr wrap="square" rtlCol="0">
+                  <a:spAutoFit/>
+                </a:bodyPr>
+                <a:lstStyle/>
+                <a:p>
+                  <a:pPr algn="ctr"/>
+                  <a:r>
+                    <a:rPr lang="fr-FR" sz="1200" dirty="0">
+                      <a:latin typeface="Cambria" panose="02040503050406030204" pitchFamily="18" charset="0"/>
+                      <a:ea typeface="Cambria" panose="02040503050406030204" pitchFamily="18" charset="0"/>
+                    </a:rPr>
+                    <a:t>Camera</a:t>
+                  </a:r>
+                  <a:endParaRPr lang="en-US" sz="1200" dirty="0">
                     <a:latin typeface="Cambria" panose="02040503050406030204" pitchFamily="18" charset="0"/>
                     <a:ea typeface="Cambria" panose="02040503050406030204" pitchFamily="18" charset="0"/>
-                  </a:rPr>
-                  <a:t>Send images to the Raspberry</a:t>
-                </a:r>
-                <a:endParaRPr lang="fr-FR" sz="1600" dirty="0">
-                  <a:latin typeface="Cambria" panose="02040503050406030204" pitchFamily="18" charset="0"/>
-                  <a:ea typeface="Cambria" panose="02040503050406030204" pitchFamily="18" charset="0"/>
-                </a:endParaRPr>
-              </a:p>
-            </p:txBody>
-          </p:sp>
-          <p:sp>
-            <p:nvSpPr>
-              <p:cNvPr id="53" name="Flowchart: Off-page Connector 52">
+                  </a:endParaRPr>
+                </a:p>
+              </p:txBody>
+            </p:sp>
+          </p:grpSp>
+          <p:grpSp>
+            <p:nvGrpSpPr>
+              <p:cNvPr id="51" name="Group 50">
                 <a:extLst>
                   <a:ext uri="{FF2B5EF4-FFF2-40B4-BE49-F238E27FC236}">
-                    <a16:creationId xmlns:a16="http://schemas.microsoft.com/office/drawing/2014/main" id="{7FC31A9D-F226-E85D-9303-AF9357D3E290}"/>
+                    <a16:creationId xmlns:a16="http://schemas.microsoft.com/office/drawing/2014/main" id="{9EC0FFB6-A0B1-99F8-A422-7400C7BD49B8}"/>
                   </a:ext>
                 </a:extLst>
               </p:cNvPr>
-              <p:cNvSpPr/>
+              <p:cNvGrpSpPr/>
               <p:nvPr/>
-            </p:nvSpPr>
-            <p:spPr>
+            </p:nvGrpSpPr>
+            <p:grpSpPr>
               <a:xfrm>
-                <a:off x="7293384" y="1997110"/>
-                <a:ext cx="1800000" cy="900000"/>
+                <a:off x="2955327" y="2351320"/>
+                <a:ext cx="1800000" cy="1611908"/>
+                <a:chOff x="7293384" y="1997110"/>
+                <a:chExt cx="1800000" cy="1611908"/>
               </a:xfrm>
-              <a:prstGeom prst="flowChartOffpageConnector">
-                <a:avLst/>
-              </a:prstGeom>
-              <a:solidFill>
-                <a:schemeClr val="accent2">
-                  <a:lumMod val="20000"/>
-                  <a:lumOff val="80000"/>
-                </a:schemeClr>
-              </a:solidFill>
-              <a:ln>
-                <a:noFill/>
-              </a:ln>
-            </p:spPr>
-            <p:style>
-              <a:lnRef idx="2">
-                <a:schemeClr val="dk1"/>
-              </a:lnRef>
-              <a:fillRef idx="1">
-                <a:schemeClr val="lt1"/>
-              </a:fillRef>
-              <a:effectRef idx="0">
-                <a:schemeClr val="dk1"/>
-              </a:effectRef>
-              <a:fontRef idx="minor">
-                <a:schemeClr val="dk1"/>
-              </a:fontRef>
-            </p:style>
-            <p:txBody>
-              <a:bodyPr rtlCol="0" anchor="ctr"/>
-              <a:lstStyle/>
-              <a:p>
-                <a:pPr algn="ctr"/>
-                <a:r>
-                  <a:rPr lang="en-US" sz="1600" dirty="0">
+            </p:grpSpPr>
+            <p:sp>
+              <p:nvSpPr>
+                <p:cNvPr id="52" name="Rectangle 51">
+                  <a:extLst>
+                    <a:ext uri="{FF2B5EF4-FFF2-40B4-BE49-F238E27FC236}">
+                      <a16:creationId xmlns:a16="http://schemas.microsoft.com/office/drawing/2014/main" id="{2188C388-F5BF-05D3-749B-3DA1FD4E4D61}"/>
+                    </a:ext>
+                  </a:extLst>
+                </p:cNvPr>
+                <p:cNvSpPr/>
+                <p:nvPr/>
+              </p:nvSpPr>
+              <p:spPr>
+                <a:xfrm>
+                  <a:off x="7293384" y="2709018"/>
+                  <a:ext cx="1800000" cy="900000"/>
+                </a:xfrm>
+                <a:prstGeom prst="rect">
+                  <a:avLst/>
+                </a:prstGeom>
+                <a:solidFill>
+                  <a:schemeClr val="accent2">
+                    <a:lumMod val="40000"/>
+                    <a:lumOff val="60000"/>
+                  </a:schemeClr>
+                </a:solidFill>
+                <a:ln>
+                  <a:noFill/>
+                </a:ln>
+              </p:spPr>
+              <p:style>
+                <a:lnRef idx="2">
+                  <a:schemeClr val="dk1"/>
+                </a:lnRef>
+                <a:fillRef idx="1">
+                  <a:schemeClr val="lt1"/>
+                </a:fillRef>
+                <a:effectRef idx="0">
+                  <a:schemeClr val="dk1"/>
+                </a:effectRef>
+                <a:fontRef idx="minor">
+                  <a:schemeClr val="dk1"/>
+                </a:fontRef>
+              </p:style>
+              <p:txBody>
+                <a:bodyPr rtlCol="0" anchor="ctr"/>
+                <a:lstStyle/>
+                <a:p>
+                  <a:pPr algn="ctr"/>
+                  <a:endParaRPr lang="en-US" sz="1600" dirty="0">
                     <a:latin typeface="Cambria" panose="02040503050406030204" pitchFamily="18" charset="0"/>
                     <a:ea typeface="Cambria" panose="02040503050406030204" pitchFamily="18" charset="0"/>
-                  </a:rPr>
-                  <a:t>Capture images</a:t>
-                </a:r>
-                <a:endParaRPr lang="fr-FR" sz="1600" dirty="0">
-                  <a:latin typeface="Cambria" panose="02040503050406030204" pitchFamily="18" charset="0"/>
-                  <a:ea typeface="Cambria" panose="02040503050406030204" pitchFamily="18" charset="0"/>
-                </a:endParaRPr>
-              </a:p>
-            </p:txBody>
-          </p:sp>
+                  </a:endParaRPr>
+                </a:p>
+                <a:p>
+                  <a:pPr algn="ctr"/>
+                  <a:r>
+                    <a:rPr lang="en-US" sz="1600" dirty="0">
+                      <a:latin typeface="Cambria" panose="02040503050406030204" pitchFamily="18" charset="0"/>
+                      <a:ea typeface="Cambria" panose="02040503050406030204" pitchFamily="18" charset="0"/>
+                    </a:rPr>
+                    <a:t>Send images to the Raspberry</a:t>
+                  </a:r>
+                  <a:endParaRPr lang="fr-FR" sz="1600" dirty="0">
+                    <a:latin typeface="Cambria" panose="02040503050406030204" pitchFamily="18" charset="0"/>
+                    <a:ea typeface="Cambria" panose="02040503050406030204" pitchFamily="18" charset="0"/>
+                  </a:endParaRPr>
+                </a:p>
+              </p:txBody>
+            </p:sp>
+            <p:sp>
+              <p:nvSpPr>
+                <p:cNvPr id="53" name="Flowchart: Off-page Connector 52">
+                  <a:extLst>
+                    <a:ext uri="{FF2B5EF4-FFF2-40B4-BE49-F238E27FC236}">
+                      <a16:creationId xmlns:a16="http://schemas.microsoft.com/office/drawing/2014/main" id="{7FC31A9D-F226-E85D-9303-AF9357D3E290}"/>
+                    </a:ext>
+                  </a:extLst>
+                </p:cNvPr>
+                <p:cNvSpPr/>
+                <p:nvPr/>
+              </p:nvSpPr>
+              <p:spPr>
+                <a:xfrm>
+                  <a:off x="7293384" y="1997110"/>
+                  <a:ext cx="1800000" cy="900000"/>
+                </a:xfrm>
+                <a:prstGeom prst="flowChartOffpageConnector">
+                  <a:avLst/>
+                </a:prstGeom>
+                <a:solidFill>
+                  <a:schemeClr val="accent2">
+                    <a:lumMod val="20000"/>
+                    <a:lumOff val="80000"/>
+                  </a:schemeClr>
+                </a:solidFill>
+                <a:ln>
+                  <a:noFill/>
+                </a:ln>
+              </p:spPr>
+              <p:style>
+                <a:lnRef idx="2">
+                  <a:schemeClr val="dk1"/>
+                </a:lnRef>
+                <a:fillRef idx="1">
+                  <a:schemeClr val="lt1"/>
+                </a:fillRef>
+                <a:effectRef idx="0">
+                  <a:schemeClr val="dk1"/>
+                </a:effectRef>
+                <a:fontRef idx="minor">
+                  <a:schemeClr val="dk1"/>
+                </a:fontRef>
+              </p:style>
+              <p:txBody>
+                <a:bodyPr rtlCol="0" anchor="ctr"/>
+                <a:lstStyle/>
+                <a:p>
+                  <a:pPr algn="ctr"/>
+                  <a:r>
+                    <a:rPr lang="en-US" sz="1600" dirty="0">
+                      <a:latin typeface="Cambria" panose="02040503050406030204" pitchFamily="18" charset="0"/>
+                      <a:ea typeface="Cambria" panose="02040503050406030204" pitchFamily="18" charset="0"/>
+                    </a:rPr>
+                    <a:t>Capture images</a:t>
+                  </a:r>
+                  <a:endParaRPr lang="fr-FR" sz="1600" dirty="0">
+                    <a:latin typeface="Cambria" panose="02040503050406030204" pitchFamily="18" charset="0"/>
+                    <a:ea typeface="Cambria" panose="02040503050406030204" pitchFamily="18" charset="0"/>
+                  </a:endParaRPr>
+                </a:p>
+              </p:txBody>
+            </p:sp>
+          </p:grpSp>
         </p:grpSp>
+        <p:pic>
+          <p:nvPicPr>
+            <p:cNvPr id="9" name="Image 8">
+              <a:extLst>
+                <a:ext uri="{FF2B5EF4-FFF2-40B4-BE49-F238E27FC236}">
+                  <a16:creationId xmlns:a16="http://schemas.microsoft.com/office/drawing/2014/main" id="{D94013AB-DEF6-8F95-6623-AF5193CD0BDA}"/>
+                </a:ext>
+              </a:extLst>
+            </p:cNvPr>
+            <p:cNvPicPr>
+              <a:picLocks noChangeAspect="1"/>
+            </p:cNvPicPr>
+            <p:nvPr/>
+          </p:nvPicPr>
+          <p:blipFill>
+            <a:blip r:embed="rId13">
+              <a:extLst>
+                <a:ext uri="{28A0092B-C50C-407E-A947-70E740481C1C}">
+                  <a14:useLocalDpi xmlns:a14="http://schemas.microsoft.com/office/drawing/2010/main" val="0"/>
+                </a:ext>
+              </a:extLst>
+            </a:blip>
+            <a:stretch>
+              <a:fillRect/>
+            </a:stretch>
+          </p:blipFill>
+          <p:spPr>
+            <a:xfrm>
+              <a:off x="11308231" y="2585454"/>
+              <a:ext cx="271299" cy="243640"/>
+            </a:xfrm>
+            <a:prstGeom prst="rect">
+              <a:avLst/>
+            </a:prstGeom>
+          </p:spPr>
+        </p:pic>
       </p:grpSp>
-      <p:pic>
-        <p:nvPicPr>
-          <p:cNvPr id="9" name="Image 8">
-            <a:extLst>
-              <a:ext uri="{FF2B5EF4-FFF2-40B4-BE49-F238E27FC236}">
-                <a16:creationId xmlns:a16="http://schemas.microsoft.com/office/drawing/2014/main" id="{D94013AB-DEF6-8F95-6623-AF5193CD0BDA}"/>
-              </a:ext>
-            </a:extLst>
-          </p:cNvPr>
-          <p:cNvPicPr>
-            <a:picLocks noChangeAspect="1"/>
-          </p:cNvPicPr>
-          <p:nvPr/>
-        </p:nvPicPr>
-        <p:blipFill>
-          <a:blip r:embed="rId13">
-            <a:extLst>
-              <a:ext uri="{28A0092B-C50C-407E-A947-70E740481C1C}">
-                <a14:useLocalDpi xmlns:a14="http://schemas.microsoft.com/office/drawing/2010/main" val="0"/>
-              </a:ext>
-            </a:extLst>
-          </a:blip>
-          <a:stretch>
-            <a:fillRect/>
-          </a:stretch>
-        </p:blipFill>
-        <p:spPr>
-          <a:xfrm>
-            <a:off x="11308231" y="2585454"/>
-            <a:ext cx="271299" cy="243640"/>
-          </a:xfrm>
-          <a:prstGeom prst="rect">
-            <a:avLst/>
-          </a:prstGeom>
-        </p:spPr>
-      </p:pic>
     </p:spTree>
     <p:extLst>
       <p:ext uri="{BB962C8B-B14F-4D97-AF65-F5344CB8AC3E}">

</xml_diff>